<commit_message>
Error handling. Logging output. Slide genration complete.
</commit_message>
<xml_diff>
--- a/PPTXExportPlugin/PPTXExportPlugin_Template.pptx
+++ b/PPTXExportPlugin/PPTXExportPlugin_Template.pptx
@@ -1007,10 +1007,10 @@
       </p:sp>
       <p:sp>
         <p:nvSpPr>
-          <p:cNvPr id="5" name="Changes background">
+          <p:cNvPr id="4" name="Changes_Background">
             <a:extLst>
               <a:ext uri="{FF2B5EF4-FFF2-40B4-BE49-F238E27FC236}">
-                <a16:creationId xmlns:a16="http://schemas.microsoft.com/office/drawing/2014/main" id="{256EE8F2-DE04-5DAC-1E60-581E8C72208C}"/>
+                <a16:creationId xmlns:a16="http://schemas.microsoft.com/office/drawing/2014/main" id="{EA28A555-4BD1-09D1-9794-5337C5B74973}"/>
               </a:ext>
             </a:extLst>
           </p:cNvPr>
@@ -1019,7 +1019,7 @@
         </p:nvSpPr>
         <p:spPr>
           <a:xfrm>
-            <a:off x="993913" y="1993126"/>
+            <a:off x="1702968" y="1516080"/>
             <a:ext cx="1371600" cy="1371600"/>
           </a:xfrm>
           <a:prstGeom prst="rect">
@@ -1068,10 +1068,10 @@
       </p:sp>
       <p:sp>
         <p:nvSpPr>
-          <p:cNvPr id="3" name="Content1">
+          <p:cNvPr id="9" name="Changes_Content">
             <a:extLst>
               <a:ext uri="{FF2B5EF4-FFF2-40B4-BE49-F238E27FC236}">
-                <a16:creationId xmlns:a16="http://schemas.microsoft.com/office/drawing/2014/main" id="{75533CEB-DBFF-06E5-8302-EBE4F9E15F08}"/>
+                <a16:creationId xmlns:a16="http://schemas.microsoft.com/office/drawing/2014/main" id="{A2B0BED6-651E-6877-AB8C-6D8C8271825A}"/>
               </a:ext>
             </a:extLst>
           </p:cNvPr>
@@ -1079,12 +1079,12 @@
             <a:spLocks noGrp="1"/>
           </p:cNvSpPr>
           <p:nvPr>
-            <p:ph idx="1"/>
+            <p:ph idx="10"/>
           </p:nvPr>
         </p:nvSpPr>
         <p:spPr>
           <a:xfrm>
-            <a:off x="993913" y="2362458"/>
+            <a:off x="1702968" y="1885412"/>
             <a:ext cx="1371600" cy="1002268"/>
           </a:xfrm>
         </p:spPr>
@@ -1143,10 +1143,59 @@
       </p:sp>
       <p:sp>
         <p:nvSpPr>
-          <p:cNvPr id="4" name="Changes background">
+          <p:cNvPr id="13" name="Changes_Title">
             <a:extLst>
               <a:ext uri="{FF2B5EF4-FFF2-40B4-BE49-F238E27FC236}">
-                <a16:creationId xmlns:a16="http://schemas.microsoft.com/office/drawing/2014/main" id="{EA28A555-4BD1-09D1-9794-5337C5B74973}"/>
+                <a16:creationId xmlns:a16="http://schemas.microsoft.com/office/drawing/2014/main" id="{82C29D6F-0E48-9214-0B35-AE90C780EFFF}"/>
+              </a:ext>
+            </a:extLst>
+          </p:cNvPr>
+          <p:cNvSpPr txBox="1"/>
+          <p:nvPr userDrawn="1"/>
+        </p:nvSpPr>
+        <p:spPr>
+          <a:xfrm>
+            <a:off x="1702968" y="1516080"/>
+            <a:ext cx="1371600" cy="369332"/>
+          </a:xfrm>
+          <a:prstGeom prst="rect">
+            <a:avLst/>
+          </a:prstGeom>
+          <a:noFill/>
+        </p:spPr>
+        <p:txBody>
+          <a:bodyPr wrap="square" rtlCol="0" anchor="ctr">
+            <a:spAutoFit/>
+          </a:bodyPr>
+          <a:lstStyle/>
+          <a:p>
+            <a:pPr algn="ctr"/>
+            <a:r>
+              <a:rPr lang="en-US" b="1" dirty="0">
+                <a:solidFill>
+                  <a:schemeClr val="bg1"/>
+                </a:solidFill>
+                <a:latin typeface="Segoe UI Light" panose="020B0502040204020203" pitchFamily="34" charset="0"/>
+                <a:cs typeface="Segoe UI Light" panose="020B0502040204020203" pitchFamily="34" charset="0"/>
+              </a:rPr>
+              <a:t>Changes</a:t>
+            </a:r>
+            <a:endParaRPr lang="de-DE" b="1" dirty="0">
+              <a:solidFill>
+                <a:schemeClr val="bg1"/>
+              </a:solidFill>
+              <a:latin typeface="Segoe UI Light" panose="020B0502040204020203" pitchFamily="34" charset="0"/>
+              <a:cs typeface="Segoe UI Light" panose="020B0502040204020203" pitchFamily="34" charset="0"/>
+            </a:endParaRPr>
+          </a:p>
+        </p:txBody>
+      </p:sp>
+      <p:sp>
+        <p:nvSpPr>
+          <p:cNvPr id="5" name="Items_Background">
+            <a:extLst>
+              <a:ext uri="{FF2B5EF4-FFF2-40B4-BE49-F238E27FC236}">
+                <a16:creationId xmlns:a16="http://schemas.microsoft.com/office/drawing/2014/main" id="{256EE8F2-DE04-5DAC-1E60-581E8C72208C}"/>
               </a:ext>
             </a:extLst>
           </p:cNvPr>
@@ -1155,7 +1204,7 @@
         </p:nvSpPr>
         <p:spPr>
           <a:xfrm>
-            <a:off x="2562989" y="1993126"/>
+            <a:off x="157655" y="1516080"/>
             <a:ext cx="1371600" cy="1371600"/>
           </a:xfrm>
           <a:prstGeom prst="rect">
@@ -1204,55 +1253,10 @@
       </p:sp>
       <p:sp>
         <p:nvSpPr>
-          <p:cNvPr id="8" name="Header2">
+          <p:cNvPr id="3" name="Items_Content">
             <a:extLst>
               <a:ext uri="{FF2B5EF4-FFF2-40B4-BE49-F238E27FC236}">
-                <a16:creationId xmlns:a16="http://schemas.microsoft.com/office/drawing/2014/main" id="{C0A962BF-A7D6-A297-3540-02133A8A35CC}"/>
-              </a:ext>
-            </a:extLst>
-          </p:cNvPr>
-          <p:cNvSpPr txBox="1"/>
-          <p:nvPr userDrawn="1"/>
-        </p:nvSpPr>
-        <p:spPr>
-          <a:xfrm>
-            <a:off x="2562989" y="1993126"/>
-            <a:ext cx="1371600" cy="369332"/>
-          </a:xfrm>
-          <a:prstGeom prst="rect">
-            <a:avLst/>
-          </a:prstGeom>
-          <a:noFill/>
-        </p:spPr>
-        <p:txBody>
-          <a:bodyPr wrap="square" rtlCol="0">
-            <a:spAutoFit/>
-          </a:bodyPr>
-          <a:lstStyle/>
-          <a:p>
-            <a:pPr algn="ctr"/>
-            <a:r>
-              <a:rPr lang="en-US" dirty="0">
-                <a:solidFill>
-                  <a:schemeClr val="bg1"/>
-                </a:solidFill>
-              </a:rPr>
-              <a:t>Changes</a:t>
-            </a:r>
-            <a:endParaRPr lang="de-DE" dirty="0">
-              <a:solidFill>
-                <a:schemeClr val="bg1"/>
-              </a:solidFill>
-            </a:endParaRPr>
-          </a:p>
-        </p:txBody>
-      </p:sp>
-      <p:sp>
-        <p:nvSpPr>
-          <p:cNvPr id="9" name="Content2">
-            <a:extLst>
-              <a:ext uri="{FF2B5EF4-FFF2-40B4-BE49-F238E27FC236}">
-                <a16:creationId xmlns:a16="http://schemas.microsoft.com/office/drawing/2014/main" id="{A2B0BED6-651E-6877-AB8C-6D8C8271825A}"/>
+                <a16:creationId xmlns:a16="http://schemas.microsoft.com/office/drawing/2014/main" id="{75533CEB-DBFF-06E5-8302-EBE4F9E15F08}"/>
               </a:ext>
             </a:extLst>
           </p:cNvPr>
@@ -1260,12 +1264,12 @@
             <a:spLocks noGrp="1"/>
           </p:cNvSpPr>
           <p:nvPr>
-            <p:ph idx="10"/>
+            <p:ph idx="1"/>
           </p:nvPr>
         </p:nvSpPr>
         <p:spPr>
           <a:xfrm>
-            <a:off x="2562989" y="2362458"/>
+            <a:off x="157655" y="1885412"/>
             <a:ext cx="1371600" cy="1002268"/>
           </a:xfrm>
         </p:spPr>
@@ -1324,76 +1328,50 @@
       </p:sp>
       <p:sp>
         <p:nvSpPr>
-          <p:cNvPr id="10" name="Header1">
+          <p:cNvPr id="12" name="Items_Title">
             <a:extLst>
               <a:ext uri="{FF2B5EF4-FFF2-40B4-BE49-F238E27FC236}">
-                <a16:creationId xmlns:a16="http://schemas.microsoft.com/office/drawing/2014/main" id="{DE4AE299-49F6-B334-2BE3-233B20A7B0FF}"/>
+                <a16:creationId xmlns:a16="http://schemas.microsoft.com/office/drawing/2014/main" id="{720ECD43-E781-4D3F-B159-772FC18FE7F2}"/>
               </a:ext>
             </a:extLst>
           </p:cNvPr>
-          <p:cNvSpPr>
-            <a:spLocks noGrp="1"/>
-          </p:cNvSpPr>
-          <p:nvPr>
-            <p:ph idx="11"/>
-          </p:nvPr>
+          <p:cNvSpPr txBox="1"/>
+          <p:nvPr userDrawn="1"/>
         </p:nvSpPr>
         <p:spPr>
           <a:xfrm>
-            <a:off x="993913" y="1993126"/>
+            <a:off x="157655" y="1516080"/>
             <a:ext cx="1371600" cy="369332"/>
           </a:xfrm>
+          <a:prstGeom prst="rect">
+            <a:avLst/>
+          </a:prstGeom>
+          <a:noFill/>
         </p:spPr>
         <p:txBody>
-          <a:bodyPr anchor="ctr">
-            <a:noAutofit/>
+          <a:bodyPr wrap="square" rtlCol="0" anchor="ctr">
+            <a:spAutoFit/>
           </a:bodyPr>
-          <a:lstStyle>
-            <a:lvl1pPr marL="0" indent="0" algn="ctr">
-              <a:spcBef>
-                <a:spcPts val="400"/>
-              </a:spcBef>
-              <a:buNone/>
-              <a:defRPr sz="2800" b="1">
+          <a:lstStyle/>
+          <a:p>
+            <a:pPr algn="ctr"/>
+            <a:r>
+              <a:rPr lang="en-US" b="1" dirty="0">
                 <a:solidFill>
                   <a:schemeClr val="bg1"/>
                 </a:solidFill>
                 <a:latin typeface="Segoe UI Light" panose="020B0502040204020203" pitchFamily="34" charset="0"/>
                 <a:cs typeface="Segoe UI Light" panose="020B0502040204020203" pitchFamily="34" charset="0"/>
-              </a:defRPr>
-            </a:lvl1pPr>
-            <a:lvl2pPr marL="457200" indent="0" algn="ctr">
-              <a:buNone/>
-              <a:defRPr sz="2800" b="1">
-                <a:latin typeface="Segoe UI Light" panose="020B0502040204020203" pitchFamily="34" charset="0"/>
-                <a:cs typeface="Segoe UI Light" panose="020B0502040204020203" pitchFamily="34" charset="0"/>
-              </a:defRPr>
-            </a:lvl2pPr>
-            <a:lvl3pPr marL="914400" indent="0" algn="ctr">
-              <a:buNone/>
-              <a:defRPr sz="2800" b="1">
-                <a:latin typeface="Segoe UI Light" panose="020B0502040204020203" pitchFamily="34" charset="0"/>
-                <a:cs typeface="Segoe UI Light" panose="020B0502040204020203" pitchFamily="34" charset="0"/>
-              </a:defRPr>
-            </a:lvl3pPr>
-            <a:lvl4pPr marL="1371600" indent="0" algn="ctr">
-              <a:buNone/>
-              <a:defRPr sz="2800" b="1">
-                <a:latin typeface="Segoe UI Light" panose="020B0502040204020203" pitchFamily="34" charset="0"/>
-                <a:cs typeface="Segoe UI Light" panose="020B0502040204020203" pitchFamily="34" charset="0"/>
-              </a:defRPr>
-            </a:lvl4pPr>
-            <a:lvl5pPr marL="1828800" indent="0" algn="ctr">
-              <a:buNone/>
-              <a:defRPr sz="2800" b="1">
-                <a:latin typeface="Segoe UI Light" panose="020B0502040204020203" pitchFamily="34" charset="0"/>
-                <a:cs typeface="Segoe UI Light" panose="020B0502040204020203" pitchFamily="34" charset="0"/>
-              </a:defRPr>
-            </a:lvl5pPr>
-          </a:lstStyle>
-          <a:p>
-            <a:pPr lvl="0"/>
-            <a:endParaRPr lang="de-DE" dirty="0"/>
+              </a:rPr>
+              <a:t>Items</a:t>
+            </a:r>
+            <a:endParaRPr lang="de-DE" b="1" dirty="0">
+              <a:solidFill>
+                <a:schemeClr val="bg1"/>
+              </a:solidFill>
+              <a:latin typeface="Segoe UI Light" panose="020B0502040204020203" pitchFamily="34" charset="0"/>
+              <a:cs typeface="Segoe UI Light" panose="020B0502040204020203" pitchFamily="34" charset="0"/>
+            </a:endParaRPr>
           </a:p>
         </p:txBody>
       </p:sp>
@@ -1817,7 +1795,7 @@
           <a:p>
             <a:fld id="{506867F6-8C78-486A-93BF-FCE4C882B7D7}" type="datetimeFigureOut">
               <a:rPr lang="de-DE" smtClean="0"/>
-              <a:t>19.12.2023</a:t>
+              <a:t>10.01.2024</a:t>
             </a:fld>
             <a:endParaRPr lang="de-DE"/>
           </a:p>

</xml_diff>

<commit_message>
PPTX export plugin - Completly working version 1.0
</commit_message>
<xml_diff>
--- a/PPTXExportPlugin/PPTXExportPlugin_Template.pptx
+++ b/PPTXExportPlugin/PPTXExportPlugin_Template.pptx
@@ -1007,10 +1007,10 @@
       </p:sp>
       <p:sp>
         <p:nvSpPr>
-          <p:cNvPr id="4" name="Changes_Background">
-            <a:extLst>
-              <a:ext uri="{FF2B5EF4-FFF2-40B4-BE49-F238E27FC236}">
-                <a16:creationId xmlns:a16="http://schemas.microsoft.com/office/drawing/2014/main" id="{EA28A555-4BD1-09D1-9794-5337C5B74973}"/>
+          <p:cNvPr id="5" name="Items_Background">
+            <a:extLst>
+              <a:ext uri="{FF2B5EF4-FFF2-40B4-BE49-F238E27FC236}">
+                <a16:creationId xmlns:a16="http://schemas.microsoft.com/office/drawing/2014/main" id="{256EE8F2-DE04-5DAC-1E60-581E8C72208C}"/>
               </a:ext>
             </a:extLst>
           </p:cNvPr>
@@ -1019,8 +1019,8 @@
         </p:nvSpPr>
         <p:spPr>
           <a:xfrm>
-            <a:off x="1702968" y="1516080"/>
-            <a:ext cx="1371600" cy="1371600"/>
+            <a:off x="157655" y="1516080"/>
+            <a:ext cx="1371600" cy="1401986"/>
           </a:xfrm>
           <a:prstGeom prst="rect">
             <a:avLst/>
@@ -1068,10 +1068,10 @@
       </p:sp>
       <p:sp>
         <p:nvSpPr>
-          <p:cNvPr id="9" name="Changes_Content">
-            <a:extLst>
-              <a:ext uri="{FF2B5EF4-FFF2-40B4-BE49-F238E27FC236}">
-                <a16:creationId xmlns:a16="http://schemas.microsoft.com/office/drawing/2014/main" id="{A2B0BED6-651E-6877-AB8C-6D8C8271825A}"/>
+          <p:cNvPr id="3" name="Items_Content">
+            <a:extLst>
+              <a:ext uri="{FF2B5EF4-FFF2-40B4-BE49-F238E27FC236}">
+                <a16:creationId xmlns:a16="http://schemas.microsoft.com/office/drawing/2014/main" id="{75533CEB-DBFF-06E5-8302-EBE4F9E15F08}"/>
               </a:ext>
             </a:extLst>
           </p:cNvPr>
@@ -1079,13 +1079,13 @@
             <a:spLocks noGrp="1"/>
           </p:cNvSpPr>
           <p:nvPr>
-            <p:ph idx="10"/>
+            <p:ph idx="1"/>
           </p:nvPr>
         </p:nvSpPr>
         <p:spPr>
           <a:xfrm>
-            <a:off x="1702968" y="1885412"/>
-            <a:ext cx="1371600" cy="1002268"/>
+            <a:off x="157655" y="1885412"/>
+            <a:ext cx="1371600" cy="1032654"/>
           </a:xfrm>
         </p:spPr>
         <p:txBody>
@@ -1143,59 +1143,10 @@
       </p:sp>
       <p:sp>
         <p:nvSpPr>
-          <p:cNvPr id="13" name="Changes_Title">
-            <a:extLst>
-              <a:ext uri="{FF2B5EF4-FFF2-40B4-BE49-F238E27FC236}">
-                <a16:creationId xmlns:a16="http://schemas.microsoft.com/office/drawing/2014/main" id="{82C29D6F-0E48-9214-0B35-AE90C780EFFF}"/>
-              </a:ext>
-            </a:extLst>
-          </p:cNvPr>
-          <p:cNvSpPr txBox="1"/>
-          <p:nvPr userDrawn="1"/>
-        </p:nvSpPr>
-        <p:spPr>
-          <a:xfrm>
-            <a:off x="1702968" y="1516080"/>
-            <a:ext cx="1371600" cy="369332"/>
-          </a:xfrm>
-          <a:prstGeom prst="rect">
-            <a:avLst/>
-          </a:prstGeom>
-          <a:noFill/>
-        </p:spPr>
-        <p:txBody>
-          <a:bodyPr wrap="square" rtlCol="0" anchor="ctr">
-            <a:spAutoFit/>
-          </a:bodyPr>
-          <a:lstStyle/>
-          <a:p>
-            <a:pPr algn="ctr"/>
-            <a:r>
-              <a:rPr lang="en-US" b="1" dirty="0">
-                <a:solidFill>
-                  <a:schemeClr val="bg1"/>
-                </a:solidFill>
-                <a:latin typeface="Segoe UI Light" panose="020B0502040204020203" pitchFamily="34" charset="0"/>
-                <a:cs typeface="Segoe UI Light" panose="020B0502040204020203" pitchFamily="34" charset="0"/>
-              </a:rPr>
-              <a:t>Changes</a:t>
-            </a:r>
-            <a:endParaRPr lang="de-DE" b="1" dirty="0">
-              <a:solidFill>
-                <a:schemeClr val="bg1"/>
-              </a:solidFill>
-              <a:latin typeface="Segoe UI Light" panose="020B0502040204020203" pitchFamily="34" charset="0"/>
-              <a:cs typeface="Segoe UI Light" panose="020B0502040204020203" pitchFamily="34" charset="0"/>
-            </a:endParaRPr>
-          </a:p>
-        </p:txBody>
-      </p:sp>
-      <p:sp>
-        <p:nvSpPr>
-          <p:cNvPr id="5" name="Items_Background">
-            <a:extLst>
-              <a:ext uri="{FF2B5EF4-FFF2-40B4-BE49-F238E27FC236}">
-                <a16:creationId xmlns:a16="http://schemas.microsoft.com/office/drawing/2014/main" id="{256EE8F2-DE04-5DAC-1E60-581E8C72208C}"/>
+          <p:cNvPr id="4" name="Changes_Background">
+            <a:extLst>
+              <a:ext uri="{FF2B5EF4-FFF2-40B4-BE49-F238E27FC236}">
+                <a16:creationId xmlns:a16="http://schemas.microsoft.com/office/drawing/2014/main" id="{EA28A555-4BD1-09D1-9794-5337C5B74973}"/>
               </a:ext>
             </a:extLst>
           </p:cNvPr>
@@ -1204,8 +1155,8 @@
         </p:nvSpPr>
         <p:spPr>
           <a:xfrm>
-            <a:off x="157655" y="1516080"/>
-            <a:ext cx="1371600" cy="1371600"/>
+            <a:off x="1702968" y="1516079"/>
+            <a:ext cx="1371600" cy="1401987"/>
           </a:xfrm>
           <a:prstGeom prst="rect">
             <a:avLst/>
@@ -1253,10 +1204,10 @@
       </p:sp>
       <p:sp>
         <p:nvSpPr>
-          <p:cNvPr id="3" name="Items_Content">
-            <a:extLst>
-              <a:ext uri="{FF2B5EF4-FFF2-40B4-BE49-F238E27FC236}">
-                <a16:creationId xmlns:a16="http://schemas.microsoft.com/office/drawing/2014/main" id="{75533CEB-DBFF-06E5-8302-EBE4F9E15F08}"/>
+          <p:cNvPr id="9" name="Changes_Content">
+            <a:extLst>
+              <a:ext uri="{FF2B5EF4-FFF2-40B4-BE49-F238E27FC236}">
+                <a16:creationId xmlns:a16="http://schemas.microsoft.com/office/drawing/2014/main" id="{A2B0BED6-651E-6877-AB8C-6D8C8271825A}"/>
               </a:ext>
             </a:extLst>
           </p:cNvPr>
@@ -1264,13 +1215,13 @@
             <a:spLocks noGrp="1"/>
           </p:cNvSpPr>
           <p:nvPr>
-            <p:ph idx="1"/>
+            <p:ph idx="10"/>
           </p:nvPr>
         </p:nvSpPr>
         <p:spPr>
           <a:xfrm>
-            <a:off x="157655" y="1885412"/>
-            <a:ext cx="1371600" cy="1002268"/>
+            <a:off x="1702968" y="1885412"/>
+            <a:ext cx="1371600" cy="1032654"/>
           </a:xfrm>
         </p:spPr>
         <p:txBody>
@@ -1328,10 +1279,71 @@
       </p:sp>
       <p:sp>
         <p:nvSpPr>
-          <p:cNvPr id="12" name="Items_Title">
-            <a:extLst>
-              <a:ext uri="{FF2B5EF4-FFF2-40B4-BE49-F238E27FC236}">
-                <a16:creationId xmlns:a16="http://schemas.microsoft.com/office/drawing/2014/main" id="{720ECD43-E781-4D3F-B159-772FC18FE7F2}"/>
+          <p:cNvPr id="6" name="States_Title">
+            <a:extLst>
+              <a:ext uri="{FF2B5EF4-FFF2-40B4-BE49-F238E27FC236}">
+                <a16:creationId xmlns:a16="http://schemas.microsoft.com/office/drawing/2014/main" id="{74F79346-9735-A75F-B1CC-77193E5CB7A1}"/>
+              </a:ext>
+            </a:extLst>
+          </p:cNvPr>
+          <p:cNvSpPr/>
+          <p:nvPr userDrawn="1"/>
+        </p:nvSpPr>
+        <p:spPr>
+          <a:xfrm>
+            <a:off x="3673309" y="1519652"/>
+            <a:ext cx="7834778" cy="365760"/>
+          </a:xfrm>
+          <a:prstGeom prst="rect">
+            <a:avLst/>
+          </a:prstGeom>
+          <a:gradFill flip="none" rotWithShape="1">
+            <a:gsLst>
+              <a:gs pos="0">
+                <a:srgbClr val="0279D4"/>
+              </a:gs>
+              <a:gs pos="100000">
+                <a:srgbClr val="549BEC"/>
+              </a:gs>
+            </a:gsLst>
+            <a:lin ang="2700000" scaled="1"/>
+            <a:tileRect/>
+          </a:gradFill>
+          <a:ln>
+            <a:noFill/>
+          </a:ln>
+        </p:spPr>
+        <p:style>
+          <a:lnRef idx="2">
+            <a:schemeClr val="accent1">
+              <a:shade val="15000"/>
+            </a:schemeClr>
+          </a:lnRef>
+          <a:fillRef idx="1">
+            <a:schemeClr val="accent1"/>
+          </a:fillRef>
+          <a:effectRef idx="0">
+            <a:schemeClr val="accent1"/>
+          </a:effectRef>
+          <a:fontRef idx="minor">
+            <a:schemeClr val="lt1"/>
+          </a:fontRef>
+        </p:style>
+        <p:txBody>
+          <a:bodyPr rtlCol="0" anchor="ctr"/>
+          <a:lstStyle/>
+          <a:p>
+            <a:pPr algn="ctr"/>
+            <a:endParaRPr lang="de-DE"/>
+          </a:p>
+        </p:txBody>
+      </p:sp>
+      <p:sp>
+        <p:nvSpPr>
+          <p:cNvPr id="8" name="States_Background">
+            <a:extLst>
+              <a:ext uri="{FF2B5EF4-FFF2-40B4-BE49-F238E27FC236}">
+                <a16:creationId xmlns:a16="http://schemas.microsoft.com/office/drawing/2014/main" id="{94348EE3-D5F7-A767-6FFA-CDDE8F96AB0C}"/>
               </a:ext>
             </a:extLst>
           </p:cNvPr>
@@ -1340,8 +1352,8 @@
         </p:nvSpPr>
         <p:spPr>
           <a:xfrm>
-            <a:off x="157655" y="1516080"/>
-            <a:ext cx="1371600" cy="369332"/>
+            <a:off x="3673308" y="1511074"/>
+            <a:ext cx="7834778" cy="369332"/>
           </a:xfrm>
           <a:prstGeom prst="rect">
             <a:avLst/>
@@ -1360,8 +1372,108 @@
                 <a:solidFill>
                   <a:schemeClr val="bg1"/>
                 </a:solidFill>
-                <a:latin typeface="Segoe UI Light" panose="020B0502040204020203" pitchFamily="34" charset="0"/>
-                <a:cs typeface="Segoe UI Light" panose="020B0502040204020203" pitchFamily="34" charset="0"/>
+                <a:latin typeface="Segoe UI" panose="020B0502040204020203" pitchFamily="34" charset="0"/>
+                <a:cs typeface="Segoe UI" panose="020B0502040204020203" pitchFamily="34" charset="0"/>
+              </a:rPr>
+              <a:t>States of changed items</a:t>
+            </a:r>
+            <a:endParaRPr lang="de-DE" b="1" dirty="0">
+              <a:solidFill>
+                <a:schemeClr val="bg1"/>
+              </a:solidFill>
+              <a:latin typeface="Segoe UI" panose="020B0502040204020203" pitchFamily="34" charset="0"/>
+              <a:cs typeface="Segoe UI" panose="020B0502040204020203" pitchFamily="34" charset="0"/>
+            </a:endParaRPr>
+          </a:p>
+        </p:txBody>
+      </p:sp>
+      <p:sp>
+        <p:nvSpPr>
+          <p:cNvPr id="13" name="Changes_Title">
+            <a:extLst>
+              <a:ext uri="{FF2B5EF4-FFF2-40B4-BE49-F238E27FC236}">
+                <a16:creationId xmlns:a16="http://schemas.microsoft.com/office/drawing/2014/main" id="{82C29D6F-0E48-9214-0B35-AE90C780EFFF}"/>
+              </a:ext>
+            </a:extLst>
+          </p:cNvPr>
+          <p:cNvSpPr txBox="1"/>
+          <p:nvPr userDrawn="1"/>
+        </p:nvSpPr>
+        <p:spPr>
+          <a:xfrm>
+            <a:off x="1702968" y="1516080"/>
+            <a:ext cx="1371600" cy="369332"/>
+          </a:xfrm>
+          <a:prstGeom prst="rect">
+            <a:avLst/>
+          </a:prstGeom>
+          <a:noFill/>
+        </p:spPr>
+        <p:txBody>
+          <a:bodyPr wrap="square" rtlCol="0" anchor="ctr">
+            <a:spAutoFit/>
+          </a:bodyPr>
+          <a:lstStyle/>
+          <a:p>
+            <a:pPr algn="ctr"/>
+            <a:r>
+              <a:rPr lang="en-US" b="1" dirty="0">
+                <a:solidFill>
+                  <a:schemeClr val="bg1"/>
+                </a:solidFill>
+                <a:latin typeface="Segoe UI" panose="020B0502040204020203" pitchFamily="34" charset="0"/>
+                <a:ea typeface="Segoe UI Black" panose="020B0A02040204020203" pitchFamily="34" charset="0"/>
+                <a:cs typeface="Segoe UI" panose="020B0502040204020203" pitchFamily="34" charset="0"/>
+              </a:rPr>
+              <a:t>Changes</a:t>
+            </a:r>
+            <a:endParaRPr lang="de-DE" b="1" dirty="0">
+              <a:solidFill>
+                <a:schemeClr val="bg1"/>
+              </a:solidFill>
+              <a:latin typeface="Segoe UI" panose="020B0502040204020203" pitchFamily="34" charset="0"/>
+              <a:ea typeface="Segoe UI Black" panose="020B0A02040204020203" pitchFamily="34" charset="0"/>
+              <a:cs typeface="Segoe UI" panose="020B0502040204020203" pitchFamily="34" charset="0"/>
+            </a:endParaRPr>
+          </a:p>
+        </p:txBody>
+      </p:sp>
+      <p:sp>
+        <p:nvSpPr>
+          <p:cNvPr id="12" name="Items_Title">
+            <a:extLst>
+              <a:ext uri="{FF2B5EF4-FFF2-40B4-BE49-F238E27FC236}">
+                <a16:creationId xmlns:a16="http://schemas.microsoft.com/office/drawing/2014/main" id="{720ECD43-E781-4D3F-B159-772FC18FE7F2}"/>
+              </a:ext>
+            </a:extLst>
+          </p:cNvPr>
+          <p:cNvSpPr txBox="1"/>
+          <p:nvPr userDrawn="1"/>
+        </p:nvSpPr>
+        <p:spPr>
+          <a:xfrm>
+            <a:off x="157655" y="1516080"/>
+            <a:ext cx="1371600" cy="369332"/>
+          </a:xfrm>
+          <a:prstGeom prst="rect">
+            <a:avLst/>
+          </a:prstGeom>
+          <a:noFill/>
+        </p:spPr>
+        <p:txBody>
+          <a:bodyPr wrap="square" rtlCol="0" anchor="ctr">
+            <a:spAutoFit/>
+          </a:bodyPr>
+          <a:lstStyle/>
+          <a:p>
+            <a:pPr algn="ctr"/>
+            <a:r>
+              <a:rPr lang="en-US" b="1" dirty="0">
+                <a:solidFill>
+                  <a:schemeClr val="bg1"/>
+                </a:solidFill>
+                <a:latin typeface="Segoe UI" panose="020B0502040204020203" pitchFamily="34" charset="0"/>
+                <a:cs typeface="Segoe UI" panose="020B0502040204020203" pitchFamily="34" charset="0"/>
               </a:rPr>
               <a:t>Items</a:t>
             </a:r>
@@ -1369,9 +1481,2565 @@
               <a:solidFill>
                 <a:schemeClr val="bg1"/>
               </a:solidFill>
-              <a:latin typeface="Segoe UI Light" panose="020B0502040204020203" pitchFamily="34" charset="0"/>
-              <a:cs typeface="Segoe UI Light" panose="020B0502040204020203" pitchFamily="34" charset="0"/>
+              <a:latin typeface="Segoe UI" panose="020B0502040204020203" pitchFamily="34" charset="0"/>
+              <a:cs typeface="Segoe UI" panose="020B0502040204020203" pitchFamily="34" charset="0"/>
             </a:endParaRPr>
+          </a:p>
+        </p:txBody>
+      </p:sp>
+      <p:sp>
+        <p:nvSpPr>
+          <p:cNvPr id="15" name="State_Background_1">
+            <a:extLst>
+              <a:ext uri="{FF2B5EF4-FFF2-40B4-BE49-F238E27FC236}">
+                <a16:creationId xmlns:a16="http://schemas.microsoft.com/office/drawing/2014/main" id="{2E849DD4-D7C5-E7E7-AB20-6B7C437D9CD7}"/>
+              </a:ext>
+            </a:extLst>
+          </p:cNvPr>
+          <p:cNvSpPr/>
+          <p:nvPr userDrawn="1"/>
+        </p:nvSpPr>
+        <p:spPr>
+          <a:xfrm>
+            <a:off x="3673309" y="2046342"/>
+            <a:ext cx="3840480" cy="365760"/>
+          </a:xfrm>
+          <a:prstGeom prst="rect">
+            <a:avLst/>
+          </a:prstGeom>
+          <a:gradFill flip="none" rotWithShape="1">
+            <a:gsLst>
+              <a:gs pos="0">
+                <a:srgbClr val="0279D4"/>
+              </a:gs>
+              <a:gs pos="100000">
+                <a:srgbClr val="549BEC"/>
+              </a:gs>
+            </a:gsLst>
+            <a:lin ang="2700000" scaled="1"/>
+            <a:tileRect/>
+          </a:gradFill>
+          <a:ln>
+            <a:noFill/>
+          </a:ln>
+        </p:spPr>
+        <p:style>
+          <a:lnRef idx="2">
+            <a:schemeClr val="accent1">
+              <a:shade val="15000"/>
+            </a:schemeClr>
+          </a:lnRef>
+          <a:fillRef idx="1">
+            <a:schemeClr val="accent1"/>
+          </a:fillRef>
+          <a:effectRef idx="0">
+            <a:schemeClr val="accent1"/>
+          </a:effectRef>
+          <a:fontRef idx="minor">
+            <a:schemeClr val="lt1"/>
+          </a:fontRef>
+        </p:style>
+        <p:txBody>
+          <a:bodyPr rtlCol="0" anchor="ctr"/>
+          <a:lstStyle/>
+          <a:p>
+            <a:pPr algn="ctr"/>
+            <a:endParaRPr lang="de-DE"/>
+          </a:p>
+        </p:txBody>
+      </p:sp>
+      <p:sp>
+        <p:nvSpPr>
+          <p:cNvPr id="16" name="State_Type_1">
+            <a:extLst>
+              <a:ext uri="{FF2B5EF4-FFF2-40B4-BE49-F238E27FC236}">
+                <a16:creationId xmlns:a16="http://schemas.microsoft.com/office/drawing/2014/main" id="{4F4EE6C1-5218-19E9-ACD1-DD0E1CE5CE5F}"/>
+              </a:ext>
+            </a:extLst>
+          </p:cNvPr>
+          <p:cNvSpPr>
+            <a:spLocks noGrp="1"/>
+          </p:cNvSpPr>
+          <p:nvPr>
+            <p:ph idx="11"/>
+          </p:nvPr>
+        </p:nvSpPr>
+        <p:spPr>
+          <a:xfrm>
+            <a:off x="3673309" y="2046343"/>
+            <a:ext cx="3200400" cy="365760"/>
+          </a:xfrm>
+        </p:spPr>
+        <p:txBody>
+          <a:bodyPr anchor="ctr">
+            <a:noAutofit/>
+          </a:bodyPr>
+          <a:lstStyle>
+            <a:lvl1pPr marL="0" indent="0" algn="r">
+              <a:spcBef>
+                <a:spcPts val="400"/>
+              </a:spcBef>
+              <a:buNone/>
+              <a:defRPr lang="de-DE" sz="1800" b="1" kern="1200" dirty="0">
+                <a:solidFill>
+                  <a:schemeClr val="bg1"/>
+                </a:solidFill>
+                <a:latin typeface="Segoe UI Light" panose="020B0502040204020203" pitchFamily="34" charset="0"/>
+                <a:ea typeface="+mn-ea"/>
+                <a:cs typeface="Segoe UI Light" panose="020B0502040204020203" pitchFamily="34" charset="0"/>
+              </a:defRPr>
+            </a:lvl1pPr>
+            <a:lvl2pPr marL="457200" indent="0" algn="ctr">
+              <a:buNone/>
+              <a:defRPr sz="2800" b="1">
+                <a:latin typeface="Segoe UI Light" panose="020B0502040204020203" pitchFamily="34" charset="0"/>
+                <a:cs typeface="Segoe UI Light" panose="020B0502040204020203" pitchFamily="34" charset="0"/>
+              </a:defRPr>
+            </a:lvl2pPr>
+            <a:lvl3pPr marL="914400" indent="0" algn="ctr">
+              <a:buNone/>
+              <a:defRPr sz="2800" b="1">
+                <a:latin typeface="Segoe UI Light" panose="020B0502040204020203" pitchFamily="34" charset="0"/>
+                <a:cs typeface="Segoe UI Light" panose="020B0502040204020203" pitchFamily="34" charset="0"/>
+              </a:defRPr>
+            </a:lvl3pPr>
+            <a:lvl4pPr marL="1371600" indent="0" algn="ctr">
+              <a:buNone/>
+              <a:defRPr sz="2800" b="1">
+                <a:latin typeface="Segoe UI Light" panose="020B0502040204020203" pitchFamily="34" charset="0"/>
+                <a:cs typeface="Segoe UI Light" panose="020B0502040204020203" pitchFamily="34" charset="0"/>
+              </a:defRPr>
+            </a:lvl4pPr>
+            <a:lvl5pPr marL="1828800" indent="0" algn="ctr">
+              <a:buNone/>
+              <a:defRPr sz="2800" b="1">
+                <a:latin typeface="Segoe UI Light" panose="020B0502040204020203" pitchFamily="34" charset="0"/>
+                <a:cs typeface="Segoe UI Light" panose="020B0502040204020203" pitchFamily="34" charset="0"/>
+              </a:defRPr>
+            </a:lvl5pPr>
+          </a:lstStyle>
+          <a:p>
+            <a:pPr lvl="0"/>
+            <a:endParaRPr lang="de-DE" dirty="0"/>
+          </a:p>
+        </p:txBody>
+      </p:sp>
+      <p:sp>
+        <p:nvSpPr>
+          <p:cNvPr id="21" name="State_Count_1">
+            <a:extLst>
+              <a:ext uri="{FF2B5EF4-FFF2-40B4-BE49-F238E27FC236}">
+                <a16:creationId xmlns:a16="http://schemas.microsoft.com/office/drawing/2014/main" id="{5C31202A-2E35-8388-C8F4-62CC09A57645}"/>
+              </a:ext>
+            </a:extLst>
+          </p:cNvPr>
+          <p:cNvSpPr>
+            <a:spLocks noGrp="1"/>
+          </p:cNvSpPr>
+          <p:nvPr>
+            <p:ph idx="12"/>
+          </p:nvPr>
+        </p:nvSpPr>
+        <p:spPr>
+          <a:xfrm>
+            <a:off x="6873709" y="2046342"/>
+            <a:ext cx="640080" cy="365760"/>
+          </a:xfrm>
+        </p:spPr>
+        <p:txBody>
+          <a:bodyPr anchor="ctr">
+            <a:noAutofit/>
+          </a:bodyPr>
+          <a:lstStyle>
+            <a:lvl1pPr marL="0" indent="0" algn="ctr">
+              <a:spcBef>
+                <a:spcPts val="400"/>
+              </a:spcBef>
+              <a:buNone/>
+              <a:defRPr lang="de-DE" sz="1800" b="1" kern="1200" dirty="0">
+                <a:solidFill>
+                  <a:schemeClr val="bg1"/>
+                </a:solidFill>
+                <a:latin typeface="Segoe UI Light" panose="020B0502040204020203" pitchFamily="34" charset="0"/>
+                <a:ea typeface="+mn-ea"/>
+                <a:cs typeface="Segoe UI Light" panose="020B0502040204020203" pitchFamily="34" charset="0"/>
+              </a:defRPr>
+            </a:lvl1pPr>
+            <a:lvl2pPr marL="457200" indent="0" algn="ctr">
+              <a:buNone/>
+              <a:defRPr sz="2800" b="1">
+                <a:latin typeface="Segoe UI Light" panose="020B0502040204020203" pitchFamily="34" charset="0"/>
+                <a:cs typeface="Segoe UI Light" panose="020B0502040204020203" pitchFamily="34" charset="0"/>
+              </a:defRPr>
+            </a:lvl2pPr>
+            <a:lvl3pPr marL="914400" indent="0" algn="ctr">
+              <a:buNone/>
+              <a:defRPr sz="2800" b="1">
+                <a:latin typeface="Segoe UI Light" panose="020B0502040204020203" pitchFamily="34" charset="0"/>
+                <a:cs typeface="Segoe UI Light" panose="020B0502040204020203" pitchFamily="34" charset="0"/>
+              </a:defRPr>
+            </a:lvl3pPr>
+            <a:lvl4pPr marL="1371600" indent="0" algn="ctr">
+              <a:buNone/>
+              <a:defRPr sz="2800" b="1">
+                <a:latin typeface="Segoe UI Light" panose="020B0502040204020203" pitchFamily="34" charset="0"/>
+                <a:cs typeface="Segoe UI Light" panose="020B0502040204020203" pitchFamily="34" charset="0"/>
+              </a:defRPr>
+            </a:lvl4pPr>
+            <a:lvl5pPr marL="1828800" indent="0" algn="ctr">
+              <a:buNone/>
+              <a:defRPr sz="2800" b="1">
+                <a:latin typeface="Segoe UI Light" panose="020B0502040204020203" pitchFamily="34" charset="0"/>
+                <a:cs typeface="Segoe UI Light" panose="020B0502040204020203" pitchFamily="34" charset="0"/>
+              </a:defRPr>
+            </a:lvl5pPr>
+          </a:lstStyle>
+          <a:p>
+            <a:pPr lvl="0"/>
+            <a:endParaRPr lang="de-DE" dirty="0"/>
+          </a:p>
+        </p:txBody>
+      </p:sp>
+      <p:sp>
+        <p:nvSpPr>
+          <p:cNvPr id="23" name="State_Background_2">
+            <a:extLst>
+              <a:ext uri="{FF2B5EF4-FFF2-40B4-BE49-F238E27FC236}">
+                <a16:creationId xmlns:a16="http://schemas.microsoft.com/office/drawing/2014/main" id="{98B1560E-16B6-203E-3029-0191EEDAFC7B}"/>
+              </a:ext>
+            </a:extLst>
+          </p:cNvPr>
+          <p:cNvSpPr/>
+          <p:nvPr userDrawn="1"/>
+        </p:nvSpPr>
+        <p:spPr>
+          <a:xfrm>
+            <a:off x="3673309" y="2564457"/>
+            <a:ext cx="3840480" cy="365760"/>
+          </a:xfrm>
+          <a:prstGeom prst="rect">
+            <a:avLst/>
+          </a:prstGeom>
+          <a:gradFill flip="none" rotWithShape="1">
+            <a:gsLst>
+              <a:gs pos="0">
+                <a:srgbClr val="0279D4"/>
+              </a:gs>
+              <a:gs pos="100000">
+                <a:srgbClr val="549BEC"/>
+              </a:gs>
+            </a:gsLst>
+            <a:lin ang="2700000" scaled="1"/>
+            <a:tileRect/>
+          </a:gradFill>
+          <a:ln>
+            <a:noFill/>
+          </a:ln>
+        </p:spPr>
+        <p:style>
+          <a:lnRef idx="2">
+            <a:schemeClr val="accent1">
+              <a:shade val="15000"/>
+            </a:schemeClr>
+          </a:lnRef>
+          <a:fillRef idx="1">
+            <a:schemeClr val="accent1"/>
+          </a:fillRef>
+          <a:effectRef idx="0">
+            <a:schemeClr val="accent1"/>
+          </a:effectRef>
+          <a:fontRef idx="minor">
+            <a:schemeClr val="lt1"/>
+          </a:fontRef>
+        </p:style>
+        <p:txBody>
+          <a:bodyPr rtlCol="0" anchor="ctr"/>
+          <a:lstStyle/>
+          <a:p>
+            <a:pPr algn="ctr"/>
+            <a:endParaRPr lang="de-DE"/>
+          </a:p>
+        </p:txBody>
+      </p:sp>
+      <p:sp>
+        <p:nvSpPr>
+          <p:cNvPr id="24" name="State_Type_2">
+            <a:extLst>
+              <a:ext uri="{FF2B5EF4-FFF2-40B4-BE49-F238E27FC236}">
+                <a16:creationId xmlns:a16="http://schemas.microsoft.com/office/drawing/2014/main" id="{613CAF29-A1DA-AF3A-4D4E-174AFDEC3F06}"/>
+              </a:ext>
+            </a:extLst>
+          </p:cNvPr>
+          <p:cNvSpPr>
+            <a:spLocks noGrp="1"/>
+          </p:cNvSpPr>
+          <p:nvPr>
+            <p:ph idx="13"/>
+          </p:nvPr>
+        </p:nvSpPr>
+        <p:spPr>
+          <a:xfrm>
+            <a:off x="3673309" y="2564458"/>
+            <a:ext cx="3200400" cy="365760"/>
+          </a:xfrm>
+        </p:spPr>
+        <p:txBody>
+          <a:bodyPr anchor="ctr">
+            <a:noAutofit/>
+          </a:bodyPr>
+          <a:lstStyle>
+            <a:lvl1pPr marL="0" indent="0" algn="r">
+              <a:spcBef>
+                <a:spcPts val="400"/>
+              </a:spcBef>
+              <a:buNone/>
+              <a:defRPr lang="de-DE" sz="1800" b="1" kern="1200" dirty="0">
+                <a:solidFill>
+                  <a:schemeClr val="bg1"/>
+                </a:solidFill>
+                <a:latin typeface="Segoe UI Light" panose="020B0502040204020203" pitchFamily="34" charset="0"/>
+                <a:ea typeface="+mn-ea"/>
+                <a:cs typeface="Segoe UI Light" panose="020B0502040204020203" pitchFamily="34" charset="0"/>
+              </a:defRPr>
+            </a:lvl1pPr>
+            <a:lvl2pPr marL="457200" indent="0" algn="ctr">
+              <a:buNone/>
+              <a:defRPr sz="2800" b="1">
+                <a:latin typeface="Segoe UI Light" panose="020B0502040204020203" pitchFamily="34" charset="0"/>
+                <a:cs typeface="Segoe UI Light" panose="020B0502040204020203" pitchFamily="34" charset="0"/>
+              </a:defRPr>
+            </a:lvl2pPr>
+            <a:lvl3pPr marL="914400" indent="0" algn="ctr">
+              <a:buNone/>
+              <a:defRPr sz="2800" b="1">
+                <a:latin typeface="Segoe UI Light" panose="020B0502040204020203" pitchFamily="34" charset="0"/>
+                <a:cs typeface="Segoe UI Light" panose="020B0502040204020203" pitchFamily="34" charset="0"/>
+              </a:defRPr>
+            </a:lvl3pPr>
+            <a:lvl4pPr marL="1371600" indent="0" algn="ctr">
+              <a:buNone/>
+              <a:defRPr sz="2800" b="1">
+                <a:latin typeface="Segoe UI Light" panose="020B0502040204020203" pitchFamily="34" charset="0"/>
+                <a:cs typeface="Segoe UI Light" panose="020B0502040204020203" pitchFamily="34" charset="0"/>
+              </a:defRPr>
+            </a:lvl4pPr>
+            <a:lvl5pPr marL="1828800" indent="0" algn="ctr">
+              <a:buNone/>
+              <a:defRPr sz="2800" b="1">
+                <a:latin typeface="Segoe UI Light" panose="020B0502040204020203" pitchFamily="34" charset="0"/>
+                <a:cs typeface="Segoe UI Light" panose="020B0502040204020203" pitchFamily="34" charset="0"/>
+              </a:defRPr>
+            </a:lvl5pPr>
+          </a:lstStyle>
+          <a:p>
+            <a:pPr lvl="0"/>
+            <a:endParaRPr lang="de-DE" dirty="0"/>
+          </a:p>
+        </p:txBody>
+      </p:sp>
+      <p:sp>
+        <p:nvSpPr>
+          <p:cNvPr id="25" name="State_Count_2">
+            <a:extLst>
+              <a:ext uri="{FF2B5EF4-FFF2-40B4-BE49-F238E27FC236}">
+                <a16:creationId xmlns:a16="http://schemas.microsoft.com/office/drawing/2014/main" id="{909591DE-D52B-0654-5C47-0197BBA89A51}"/>
+              </a:ext>
+            </a:extLst>
+          </p:cNvPr>
+          <p:cNvSpPr>
+            <a:spLocks noGrp="1"/>
+          </p:cNvSpPr>
+          <p:nvPr>
+            <p:ph idx="14"/>
+          </p:nvPr>
+        </p:nvSpPr>
+        <p:spPr>
+          <a:xfrm>
+            <a:off x="6873709" y="2564457"/>
+            <a:ext cx="640080" cy="365760"/>
+          </a:xfrm>
+        </p:spPr>
+        <p:txBody>
+          <a:bodyPr anchor="ctr">
+            <a:noAutofit/>
+          </a:bodyPr>
+          <a:lstStyle>
+            <a:lvl1pPr marL="0" indent="0" algn="ctr">
+              <a:spcBef>
+                <a:spcPts val="400"/>
+              </a:spcBef>
+              <a:buNone/>
+              <a:defRPr lang="de-DE" sz="1800" b="1" kern="1200" dirty="0">
+                <a:solidFill>
+                  <a:schemeClr val="bg1"/>
+                </a:solidFill>
+                <a:latin typeface="Segoe UI Light" panose="020B0502040204020203" pitchFamily="34" charset="0"/>
+                <a:ea typeface="+mn-ea"/>
+                <a:cs typeface="Segoe UI Light" panose="020B0502040204020203" pitchFamily="34" charset="0"/>
+              </a:defRPr>
+            </a:lvl1pPr>
+            <a:lvl2pPr marL="457200" indent="0" algn="ctr">
+              <a:buNone/>
+              <a:defRPr sz="2800" b="1">
+                <a:latin typeface="Segoe UI Light" panose="020B0502040204020203" pitchFamily="34" charset="0"/>
+                <a:cs typeface="Segoe UI Light" panose="020B0502040204020203" pitchFamily="34" charset="0"/>
+              </a:defRPr>
+            </a:lvl2pPr>
+            <a:lvl3pPr marL="914400" indent="0" algn="ctr">
+              <a:buNone/>
+              <a:defRPr sz="2800" b="1">
+                <a:latin typeface="Segoe UI Light" panose="020B0502040204020203" pitchFamily="34" charset="0"/>
+                <a:cs typeface="Segoe UI Light" panose="020B0502040204020203" pitchFamily="34" charset="0"/>
+              </a:defRPr>
+            </a:lvl3pPr>
+            <a:lvl4pPr marL="1371600" indent="0" algn="ctr">
+              <a:buNone/>
+              <a:defRPr sz="2800" b="1">
+                <a:latin typeface="Segoe UI Light" panose="020B0502040204020203" pitchFamily="34" charset="0"/>
+                <a:cs typeface="Segoe UI Light" panose="020B0502040204020203" pitchFamily="34" charset="0"/>
+              </a:defRPr>
+            </a:lvl4pPr>
+            <a:lvl5pPr marL="1828800" indent="0" algn="ctr">
+              <a:buNone/>
+              <a:defRPr sz="2800" b="1">
+                <a:latin typeface="Segoe UI Light" panose="020B0502040204020203" pitchFamily="34" charset="0"/>
+                <a:cs typeface="Segoe UI Light" panose="020B0502040204020203" pitchFamily="34" charset="0"/>
+              </a:defRPr>
+            </a:lvl5pPr>
+          </a:lstStyle>
+          <a:p>
+            <a:pPr lvl="0"/>
+            <a:endParaRPr lang="de-DE" dirty="0"/>
+          </a:p>
+        </p:txBody>
+      </p:sp>
+      <p:sp>
+        <p:nvSpPr>
+          <p:cNvPr id="26" name="State_Background_3">
+            <a:extLst>
+              <a:ext uri="{FF2B5EF4-FFF2-40B4-BE49-F238E27FC236}">
+                <a16:creationId xmlns:a16="http://schemas.microsoft.com/office/drawing/2014/main" id="{42BE5FC6-EB9D-9A0F-2C57-117C121AB96F}"/>
+              </a:ext>
+            </a:extLst>
+          </p:cNvPr>
+          <p:cNvSpPr/>
+          <p:nvPr userDrawn="1"/>
+        </p:nvSpPr>
+        <p:spPr>
+          <a:xfrm>
+            <a:off x="3673309" y="3082571"/>
+            <a:ext cx="3840480" cy="365760"/>
+          </a:xfrm>
+          <a:prstGeom prst="rect">
+            <a:avLst/>
+          </a:prstGeom>
+          <a:gradFill flip="none" rotWithShape="1">
+            <a:gsLst>
+              <a:gs pos="0">
+                <a:srgbClr val="0279D4"/>
+              </a:gs>
+              <a:gs pos="100000">
+                <a:srgbClr val="549BEC"/>
+              </a:gs>
+            </a:gsLst>
+            <a:lin ang="2700000" scaled="1"/>
+            <a:tileRect/>
+          </a:gradFill>
+          <a:ln>
+            <a:noFill/>
+          </a:ln>
+        </p:spPr>
+        <p:style>
+          <a:lnRef idx="2">
+            <a:schemeClr val="accent1">
+              <a:shade val="15000"/>
+            </a:schemeClr>
+          </a:lnRef>
+          <a:fillRef idx="1">
+            <a:schemeClr val="accent1"/>
+          </a:fillRef>
+          <a:effectRef idx="0">
+            <a:schemeClr val="accent1"/>
+          </a:effectRef>
+          <a:fontRef idx="minor">
+            <a:schemeClr val="lt1"/>
+          </a:fontRef>
+        </p:style>
+        <p:txBody>
+          <a:bodyPr rtlCol="0" anchor="ctr"/>
+          <a:lstStyle/>
+          <a:p>
+            <a:pPr algn="ctr"/>
+            <a:endParaRPr lang="de-DE"/>
+          </a:p>
+        </p:txBody>
+      </p:sp>
+      <p:sp>
+        <p:nvSpPr>
+          <p:cNvPr id="27" name="State_Type_3">
+            <a:extLst>
+              <a:ext uri="{FF2B5EF4-FFF2-40B4-BE49-F238E27FC236}">
+                <a16:creationId xmlns:a16="http://schemas.microsoft.com/office/drawing/2014/main" id="{3AE457DF-1850-5783-11EC-A98DACB03381}"/>
+              </a:ext>
+            </a:extLst>
+          </p:cNvPr>
+          <p:cNvSpPr>
+            <a:spLocks noGrp="1"/>
+          </p:cNvSpPr>
+          <p:nvPr>
+            <p:ph idx="15"/>
+          </p:nvPr>
+        </p:nvSpPr>
+        <p:spPr>
+          <a:xfrm>
+            <a:off x="3673309" y="3082572"/>
+            <a:ext cx="3200400" cy="365760"/>
+          </a:xfrm>
+        </p:spPr>
+        <p:txBody>
+          <a:bodyPr anchor="ctr">
+            <a:noAutofit/>
+          </a:bodyPr>
+          <a:lstStyle>
+            <a:lvl1pPr marL="0" indent="0" algn="r">
+              <a:spcBef>
+                <a:spcPts val="400"/>
+              </a:spcBef>
+              <a:buNone/>
+              <a:defRPr lang="de-DE" sz="1800" b="1" kern="1200" dirty="0">
+                <a:solidFill>
+                  <a:schemeClr val="bg1"/>
+                </a:solidFill>
+                <a:latin typeface="Segoe UI Light" panose="020B0502040204020203" pitchFamily="34" charset="0"/>
+                <a:ea typeface="+mn-ea"/>
+                <a:cs typeface="Segoe UI Light" panose="020B0502040204020203" pitchFamily="34" charset="0"/>
+              </a:defRPr>
+            </a:lvl1pPr>
+            <a:lvl2pPr marL="457200" indent="0" algn="ctr">
+              <a:buNone/>
+              <a:defRPr sz="2800" b="1">
+                <a:latin typeface="Segoe UI Light" panose="020B0502040204020203" pitchFamily="34" charset="0"/>
+                <a:cs typeface="Segoe UI Light" panose="020B0502040204020203" pitchFamily="34" charset="0"/>
+              </a:defRPr>
+            </a:lvl2pPr>
+            <a:lvl3pPr marL="914400" indent="0" algn="ctr">
+              <a:buNone/>
+              <a:defRPr sz="2800" b="1">
+                <a:latin typeface="Segoe UI Light" panose="020B0502040204020203" pitchFamily="34" charset="0"/>
+                <a:cs typeface="Segoe UI Light" panose="020B0502040204020203" pitchFamily="34" charset="0"/>
+              </a:defRPr>
+            </a:lvl3pPr>
+            <a:lvl4pPr marL="1371600" indent="0" algn="ctr">
+              <a:buNone/>
+              <a:defRPr sz="2800" b="1">
+                <a:latin typeface="Segoe UI Light" panose="020B0502040204020203" pitchFamily="34" charset="0"/>
+                <a:cs typeface="Segoe UI Light" panose="020B0502040204020203" pitchFamily="34" charset="0"/>
+              </a:defRPr>
+            </a:lvl4pPr>
+            <a:lvl5pPr marL="1828800" indent="0" algn="ctr">
+              <a:buNone/>
+              <a:defRPr sz="2800" b="1">
+                <a:latin typeface="Segoe UI Light" panose="020B0502040204020203" pitchFamily="34" charset="0"/>
+                <a:cs typeface="Segoe UI Light" panose="020B0502040204020203" pitchFamily="34" charset="0"/>
+              </a:defRPr>
+            </a:lvl5pPr>
+          </a:lstStyle>
+          <a:p>
+            <a:pPr lvl="0"/>
+            <a:endParaRPr lang="de-DE" dirty="0"/>
+          </a:p>
+        </p:txBody>
+      </p:sp>
+      <p:sp>
+        <p:nvSpPr>
+          <p:cNvPr id="28" name="State_Count_3">
+            <a:extLst>
+              <a:ext uri="{FF2B5EF4-FFF2-40B4-BE49-F238E27FC236}">
+                <a16:creationId xmlns:a16="http://schemas.microsoft.com/office/drawing/2014/main" id="{D7E9B3C3-C9BA-157C-E65C-3B1687CFA546}"/>
+              </a:ext>
+            </a:extLst>
+          </p:cNvPr>
+          <p:cNvSpPr>
+            <a:spLocks noGrp="1"/>
+          </p:cNvSpPr>
+          <p:nvPr>
+            <p:ph idx="16"/>
+          </p:nvPr>
+        </p:nvSpPr>
+        <p:spPr>
+          <a:xfrm>
+            <a:off x="6873709" y="3082571"/>
+            <a:ext cx="640080" cy="365760"/>
+          </a:xfrm>
+        </p:spPr>
+        <p:txBody>
+          <a:bodyPr anchor="ctr">
+            <a:noAutofit/>
+          </a:bodyPr>
+          <a:lstStyle>
+            <a:lvl1pPr marL="0" indent="0" algn="ctr">
+              <a:spcBef>
+                <a:spcPts val="400"/>
+              </a:spcBef>
+              <a:buNone/>
+              <a:defRPr lang="de-DE" sz="1800" b="1" kern="1200" dirty="0">
+                <a:solidFill>
+                  <a:schemeClr val="bg1"/>
+                </a:solidFill>
+                <a:latin typeface="Segoe UI Light" panose="020B0502040204020203" pitchFamily="34" charset="0"/>
+                <a:ea typeface="+mn-ea"/>
+                <a:cs typeface="Segoe UI Light" panose="020B0502040204020203" pitchFamily="34" charset="0"/>
+              </a:defRPr>
+            </a:lvl1pPr>
+            <a:lvl2pPr marL="457200" indent="0" algn="ctr">
+              <a:buNone/>
+              <a:defRPr sz="2800" b="1">
+                <a:latin typeface="Segoe UI Light" panose="020B0502040204020203" pitchFamily="34" charset="0"/>
+                <a:cs typeface="Segoe UI Light" panose="020B0502040204020203" pitchFamily="34" charset="0"/>
+              </a:defRPr>
+            </a:lvl2pPr>
+            <a:lvl3pPr marL="914400" indent="0" algn="ctr">
+              <a:buNone/>
+              <a:defRPr sz="2800" b="1">
+                <a:latin typeface="Segoe UI Light" panose="020B0502040204020203" pitchFamily="34" charset="0"/>
+                <a:cs typeface="Segoe UI Light" panose="020B0502040204020203" pitchFamily="34" charset="0"/>
+              </a:defRPr>
+            </a:lvl3pPr>
+            <a:lvl4pPr marL="1371600" indent="0" algn="ctr">
+              <a:buNone/>
+              <a:defRPr sz="2800" b="1">
+                <a:latin typeface="Segoe UI Light" panose="020B0502040204020203" pitchFamily="34" charset="0"/>
+                <a:cs typeface="Segoe UI Light" panose="020B0502040204020203" pitchFamily="34" charset="0"/>
+              </a:defRPr>
+            </a:lvl4pPr>
+            <a:lvl5pPr marL="1828800" indent="0" algn="ctr">
+              <a:buNone/>
+              <a:defRPr sz="2800" b="1">
+                <a:latin typeface="Segoe UI Light" panose="020B0502040204020203" pitchFamily="34" charset="0"/>
+                <a:cs typeface="Segoe UI Light" panose="020B0502040204020203" pitchFamily="34" charset="0"/>
+              </a:defRPr>
+            </a:lvl5pPr>
+          </a:lstStyle>
+          <a:p>
+            <a:pPr lvl="0"/>
+            <a:endParaRPr lang="de-DE" dirty="0"/>
+          </a:p>
+        </p:txBody>
+      </p:sp>
+      <p:sp>
+        <p:nvSpPr>
+          <p:cNvPr id="29" name="State_Background_4">
+            <a:extLst>
+              <a:ext uri="{FF2B5EF4-FFF2-40B4-BE49-F238E27FC236}">
+                <a16:creationId xmlns:a16="http://schemas.microsoft.com/office/drawing/2014/main" id="{E0102368-EBD0-B7BF-C047-2C7E91CA95E7}"/>
+              </a:ext>
+            </a:extLst>
+          </p:cNvPr>
+          <p:cNvSpPr/>
+          <p:nvPr userDrawn="1"/>
+        </p:nvSpPr>
+        <p:spPr>
+          <a:xfrm>
+            <a:off x="3673309" y="3566562"/>
+            <a:ext cx="3840480" cy="365760"/>
+          </a:xfrm>
+          <a:prstGeom prst="rect">
+            <a:avLst/>
+          </a:prstGeom>
+          <a:gradFill flip="none" rotWithShape="1">
+            <a:gsLst>
+              <a:gs pos="0">
+                <a:srgbClr val="0279D4"/>
+              </a:gs>
+              <a:gs pos="100000">
+                <a:srgbClr val="549BEC"/>
+              </a:gs>
+            </a:gsLst>
+            <a:lin ang="2700000" scaled="1"/>
+            <a:tileRect/>
+          </a:gradFill>
+          <a:ln>
+            <a:noFill/>
+          </a:ln>
+        </p:spPr>
+        <p:style>
+          <a:lnRef idx="2">
+            <a:schemeClr val="accent1">
+              <a:shade val="15000"/>
+            </a:schemeClr>
+          </a:lnRef>
+          <a:fillRef idx="1">
+            <a:schemeClr val="accent1"/>
+          </a:fillRef>
+          <a:effectRef idx="0">
+            <a:schemeClr val="accent1"/>
+          </a:effectRef>
+          <a:fontRef idx="minor">
+            <a:schemeClr val="lt1"/>
+          </a:fontRef>
+        </p:style>
+        <p:txBody>
+          <a:bodyPr rtlCol="0" anchor="ctr"/>
+          <a:lstStyle/>
+          <a:p>
+            <a:pPr algn="ctr"/>
+            <a:endParaRPr lang="de-DE"/>
+          </a:p>
+        </p:txBody>
+      </p:sp>
+      <p:sp>
+        <p:nvSpPr>
+          <p:cNvPr id="30" name="State_Type_4">
+            <a:extLst>
+              <a:ext uri="{FF2B5EF4-FFF2-40B4-BE49-F238E27FC236}">
+                <a16:creationId xmlns:a16="http://schemas.microsoft.com/office/drawing/2014/main" id="{F65097D0-69EC-E1DE-C427-D07299B6B5F0}"/>
+              </a:ext>
+            </a:extLst>
+          </p:cNvPr>
+          <p:cNvSpPr>
+            <a:spLocks noGrp="1"/>
+          </p:cNvSpPr>
+          <p:nvPr>
+            <p:ph idx="17"/>
+          </p:nvPr>
+        </p:nvSpPr>
+        <p:spPr>
+          <a:xfrm>
+            <a:off x="3673309" y="3566563"/>
+            <a:ext cx="3200400" cy="365760"/>
+          </a:xfrm>
+        </p:spPr>
+        <p:txBody>
+          <a:bodyPr anchor="ctr">
+            <a:noAutofit/>
+          </a:bodyPr>
+          <a:lstStyle>
+            <a:lvl1pPr marL="0" indent="0" algn="r">
+              <a:spcBef>
+                <a:spcPts val="400"/>
+              </a:spcBef>
+              <a:buNone/>
+              <a:defRPr lang="de-DE" sz="1800" b="1" kern="1200" dirty="0">
+                <a:solidFill>
+                  <a:schemeClr val="bg1"/>
+                </a:solidFill>
+                <a:latin typeface="Segoe UI Light" panose="020B0502040204020203" pitchFamily="34" charset="0"/>
+                <a:ea typeface="+mn-ea"/>
+                <a:cs typeface="Segoe UI Light" panose="020B0502040204020203" pitchFamily="34" charset="0"/>
+              </a:defRPr>
+            </a:lvl1pPr>
+            <a:lvl2pPr marL="457200" indent="0" algn="ctr">
+              <a:buNone/>
+              <a:defRPr sz="2800" b="1">
+                <a:latin typeface="Segoe UI Light" panose="020B0502040204020203" pitchFamily="34" charset="0"/>
+                <a:cs typeface="Segoe UI Light" panose="020B0502040204020203" pitchFamily="34" charset="0"/>
+              </a:defRPr>
+            </a:lvl2pPr>
+            <a:lvl3pPr marL="914400" indent="0" algn="ctr">
+              <a:buNone/>
+              <a:defRPr sz="2800" b="1">
+                <a:latin typeface="Segoe UI Light" panose="020B0502040204020203" pitchFamily="34" charset="0"/>
+                <a:cs typeface="Segoe UI Light" panose="020B0502040204020203" pitchFamily="34" charset="0"/>
+              </a:defRPr>
+            </a:lvl3pPr>
+            <a:lvl4pPr marL="1371600" indent="0" algn="ctr">
+              <a:buNone/>
+              <a:defRPr sz="2800" b="1">
+                <a:latin typeface="Segoe UI Light" panose="020B0502040204020203" pitchFamily="34" charset="0"/>
+                <a:cs typeface="Segoe UI Light" panose="020B0502040204020203" pitchFamily="34" charset="0"/>
+              </a:defRPr>
+            </a:lvl4pPr>
+            <a:lvl5pPr marL="1828800" indent="0" algn="ctr">
+              <a:buNone/>
+              <a:defRPr sz="2800" b="1">
+                <a:latin typeface="Segoe UI Light" panose="020B0502040204020203" pitchFamily="34" charset="0"/>
+                <a:cs typeface="Segoe UI Light" panose="020B0502040204020203" pitchFamily="34" charset="0"/>
+              </a:defRPr>
+            </a:lvl5pPr>
+          </a:lstStyle>
+          <a:p>
+            <a:pPr lvl="0"/>
+            <a:endParaRPr lang="de-DE" dirty="0"/>
+          </a:p>
+        </p:txBody>
+      </p:sp>
+      <p:sp>
+        <p:nvSpPr>
+          <p:cNvPr id="31" name="State_Count_4">
+            <a:extLst>
+              <a:ext uri="{FF2B5EF4-FFF2-40B4-BE49-F238E27FC236}">
+                <a16:creationId xmlns:a16="http://schemas.microsoft.com/office/drawing/2014/main" id="{8CAB406C-5976-7ED1-0BA9-553640287667}"/>
+              </a:ext>
+            </a:extLst>
+          </p:cNvPr>
+          <p:cNvSpPr>
+            <a:spLocks noGrp="1"/>
+          </p:cNvSpPr>
+          <p:nvPr>
+            <p:ph idx="18"/>
+          </p:nvPr>
+        </p:nvSpPr>
+        <p:spPr>
+          <a:xfrm>
+            <a:off x="6873709" y="3566562"/>
+            <a:ext cx="640080" cy="365760"/>
+          </a:xfrm>
+        </p:spPr>
+        <p:txBody>
+          <a:bodyPr anchor="ctr">
+            <a:noAutofit/>
+          </a:bodyPr>
+          <a:lstStyle>
+            <a:lvl1pPr marL="0" indent="0" algn="ctr">
+              <a:spcBef>
+                <a:spcPts val="400"/>
+              </a:spcBef>
+              <a:buNone/>
+              <a:defRPr lang="de-DE" sz="1800" b="1" kern="1200" dirty="0">
+                <a:solidFill>
+                  <a:schemeClr val="bg1"/>
+                </a:solidFill>
+                <a:latin typeface="Segoe UI Light" panose="020B0502040204020203" pitchFamily="34" charset="0"/>
+                <a:ea typeface="+mn-ea"/>
+                <a:cs typeface="Segoe UI Light" panose="020B0502040204020203" pitchFamily="34" charset="0"/>
+              </a:defRPr>
+            </a:lvl1pPr>
+            <a:lvl2pPr marL="457200" indent="0" algn="ctr">
+              <a:buNone/>
+              <a:defRPr sz="2800" b="1">
+                <a:latin typeface="Segoe UI Light" panose="020B0502040204020203" pitchFamily="34" charset="0"/>
+                <a:cs typeface="Segoe UI Light" panose="020B0502040204020203" pitchFamily="34" charset="0"/>
+              </a:defRPr>
+            </a:lvl2pPr>
+            <a:lvl3pPr marL="914400" indent="0" algn="ctr">
+              <a:buNone/>
+              <a:defRPr sz="2800" b="1">
+                <a:latin typeface="Segoe UI Light" panose="020B0502040204020203" pitchFamily="34" charset="0"/>
+                <a:cs typeface="Segoe UI Light" panose="020B0502040204020203" pitchFamily="34" charset="0"/>
+              </a:defRPr>
+            </a:lvl3pPr>
+            <a:lvl4pPr marL="1371600" indent="0" algn="ctr">
+              <a:buNone/>
+              <a:defRPr sz="2800" b="1">
+                <a:latin typeface="Segoe UI Light" panose="020B0502040204020203" pitchFamily="34" charset="0"/>
+                <a:cs typeface="Segoe UI Light" panose="020B0502040204020203" pitchFamily="34" charset="0"/>
+              </a:defRPr>
+            </a:lvl4pPr>
+            <a:lvl5pPr marL="1828800" indent="0" algn="ctr">
+              <a:buNone/>
+              <a:defRPr sz="2800" b="1">
+                <a:latin typeface="Segoe UI Light" panose="020B0502040204020203" pitchFamily="34" charset="0"/>
+                <a:cs typeface="Segoe UI Light" panose="020B0502040204020203" pitchFamily="34" charset="0"/>
+              </a:defRPr>
+            </a:lvl5pPr>
+          </a:lstStyle>
+          <a:p>
+            <a:pPr lvl="0"/>
+            <a:endParaRPr lang="de-DE" dirty="0"/>
+          </a:p>
+        </p:txBody>
+      </p:sp>
+      <p:sp>
+        <p:nvSpPr>
+          <p:cNvPr id="32" name="State_Background_5">
+            <a:extLst>
+              <a:ext uri="{FF2B5EF4-FFF2-40B4-BE49-F238E27FC236}">
+                <a16:creationId xmlns:a16="http://schemas.microsoft.com/office/drawing/2014/main" id="{41AFD714-7DF5-0282-D857-9E7F72BF83A9}"/>
+              </a:ext>
+            </a:extLst>
+          </p:cNvPr>
+          <p:cNvSpPr/>
+          <p:nvPr userDrawn="1"/>
+        </p:nvSpPr>
+        <p:spPr>
+          <a:xfrm>
+            <a:off x="3673309" y="4084677"/>
+            <a:ext cx="3840480" cy="365760"/>
+          </a:xfrm>
+          <a:prstGeom prst="rect">
+            <a:avLst/>
+          </a:prstGeom>
+          <a:gradFill flip="none" rotWithShape="1">
+            <a:gsLst>
+              <a:gs pos="0">
+                <a:srgbClr val="0279D4"/>
+              </a:gs>
+              <a:gs pos="100000">
+                <a:srgbClr val="549BEC"/>
+              </a:gs>
+            </a:gsLst>
+            <a:lin ang="2700000" scaled="1"/>
+            <a:tileRect/>
+          </a:gradFill>
+          <a:ln>
+            <a:noFill/>
+          </a:ln>
+        </p:spPr>
+        <p:style>
+          <a:lnRef idx="2">
+            <a:schemeClr val="accent1">
+              <a:shade val="15000"/>
+            </a:schemeClr>
+          </a:lnRef>
+          <a:fillRef idx="1">
+            <a:schemeClr val="accent1"/>
+          </a:fillRef>
+          <a:effectRef idx="0">
+            <a:schemeClr val="accent1"/>
+          </a:effectRef>
+          <a:fontRef idx="minor">
+            <a:schemeClr val="lt1"/>
+          </a:fontRef>
+        </p:style>
+        <p:txBody>
+          <a:bodyPr rtlCol="0" anchor="ctr"/>
+          <a:lstStyle/>
+          <a:p>
+            <a:pPr algn="ctr"/>
+            <a:endParaRPr lang="de-DE"/>
+          </a:p>
+        </p:txBody>
+      </p:sp>
+      <p:sp>
+        <p:nvSpPr>
+          <p:cNvPr id="33" name="State_Type_5">
+            <a:extLst>
+              <a:ext uri="{FF2B5EF4-FFF2-40B4-BE49-F238E27FC236}">
+                <a16:creationId xmlns:a16="http://schemas.microsoft.com/office/drawing/2014/main" id="{AF178E3B-420E-8940-DCBF-F4C08CF4C696}"/>
+              </a:ext>
+            </a:extLst>
+          </p:cNvPr>
+          <p:cNvSpPr>
+            <a:spLocks noGrp="1"/>
+          </p:cNvSpPr>
+          <p:nvPr>
+            <p:ph idx="19"/>
+          </p:nvPr>
+        </p:nvSpPr>
+        <p:spPr>
+          <a:xfrm>
+            <a:off x="3673309" y="4084678"/>
+            <a:ext cx="3200400" cy="365760"/>
+          </a:xfrm>
+        </p:spPr>
+        <p:txBody>
+          <a:bodyPr anchor="ctr">
+            <a:noAutofit/>
+          </a:bodyPr>
+          <a:lstStyle>
+            <a:lvl1pPr marL="0" indent="0" algn="r">
+              <a:spcBef>
+                <a:spcPts val="400"/>
+              </a:spcBef>
+              <a:buNone/>
+              <a:defRPr lang="de-DE" sz="1800" b="1" kern="1200" dirty="0">
+                <a:solidFill>
+                  <a:schemeClr val="bg1"/>
+                </a:solidFill>
+                <a:latin typeface="Segoe UI Light" panose="020B0502040204020203" pitchFamily="34" charset="0"/>
+                <a:ea typeface="+mn-ea"/>
+                <a:cs typeface="Segoe UI Light" panose="020B0502040204020203" pitchFamily="34" charset="0"/>
+              </a:defRPr>
+            </a:lvl1pPr>
+            <a:lvl2pPr marL="457200" indent="0" algn="ctr">
+              <a:buNone/>
+              <a:defRPr sz="2800" b="1">
+                <a:latin typeface="Segoe UI Light" panose="020B0502040204020203" pitchFamily="34" charset="0"/>
+                <a:cs typeface="Segoe UI Light" panose="020B0502040204020203" pitchFamily="34" charset="0"/>
+              </a:defRPr>
+            </a:lvl2pPr>
+            <a:lvl3pPr marL="914400" indent="0" algn="ctr">
+              <a:buNone/>
+              <a:defRPr sz="2800" b="1">
+                <a:latin typeface="Segoe UI Light" panose="020B0502040204020203" pitchFamily="34" charset="0"/>
+                <a:cs typeface="Segoe UI Light" panose="020B0502040204020203" pitchFamily="34" charset="0"/>
+              </a:defRPr>
+            </a:lvl3pPr>
+            <a:lvl4pPr marL="1371600" indent="0" algn="ctr">
+              <a:buNone/>
+              <a:defRPr sz="2800" b="1">
+                <a:latin typeface="Segoe UI Light" panose="020B0502040204020203" pitchFamily="34" charset="0"/>
+                <a:cs typeface="Segoe UI Light" panose="020B0502040204020203" pitchFamily="34" charset="0"/>
+              </a:defRPr>
+            </a:lvl4pPr>
+            <a:lvl5pPr marL="1828800" indent="0" algn="ctr">
+              <a:buNone/>
+              <a:defRPr sz="2800" b="1">
+                <a:latin typeface="Segoe UI Light" panose="020B0502040204020203" pitchFamily="34" charset="0"/>
+                <a:cs typeface="Segoe UI Light" panose="020B0502040204020203" pitchFamily="34" charset="0"/>
+              </a:defRPr>
+            </a:lvl5pPr>
+          </a:lstStyle>
+          <a:p>
+            <a:pPr lvl="0"/>
+            <a:endParaRPr lang="de-DE" dirty="0"/>
+          </a:p>
+        </p:txBody>
+      </p:sp>
+      <p:sp>
+        <p:nvSpPr>
+          <p:cNvPr id="34" name="State_Count_5">
+            <a:extLst>
+              <a:ext uri="{FF2B5EF4-FFF2-40B4-BE49-F238E27FC236}">
+                <a16:creationId xmlns:a16="http://schemas.microsoft.com/office/drawing/2014/main" id="{65836962-EE4A-A120-B8ED-AB7D12DE9B41}"/>
+              </a:ext>
+            </a:extLst>
+          </p:cNvPr>
+          <p:cNvSpPr>
+            <a:spLocks noGrp="1"/>
+          </p:cNvSpPr>
+          <p:nvPr>
+            <p:ph idx="20"/>
+          </p:nvPr>
+        </p:nvSpPr>
+        <p:spPr>
+          <a:xfrm>
+            <a:off x="6873709" y="4084677"/>
+            <a:ext cx="640080" cy="365760"/>
+          </a:xfrm>
+        </p:spPr>
+        <p:txBody>
+          <a:bodyPr anchor="ctr">
+            <a:noAutofit/>
+          </a:bodyPr>
+          <a:lstStyle>
+            <a:lvl1pPr marL="0" indent="0" algn="ctr">
+              <a:spcBef>
+                <a:spcPts val="400"/>
+              </a:spcBef>
+              <a:buNone/>
+              <a:defRPr lang="de-DE" sz="1800" b="1" kern="1200" dirty="0">
+                <a:solidFill>
+                  <a:schemeClr val="bg1"/>
+                </a:solidFill>
+                <a:latin typeface="Segoe UI Light" panose="020B0502040204020203" pitchFamily="34" charset="0"/>
+                <a:ea typeface="+mn-ea"/>
+                <a:cs typeface="Segoe UI Light" panose="020B0502040204020203" pitchFamily="34" charset="0"/>
+              </a:defRPr>
+            </a:lvl1pPr>
+            <a:lvl2pPr marL="457200" indent="0" algn="ctr">
+              <a:buNone/>
+              <a:defRPr sz="2800" b="1">
+                <a:latin typeface="Segoe UI Light" panose="020B0502040204020203" pitchFamily="34" charset="0"/>
+                <a:cs typeface="Segoe UI Light" panose="020B0502040204020203" pitchFamily="34" charset="0"/>
+              </a:defRPr>
+            </a:lvl2pPr>
+            <a:lvl3pPr marL="914400" indent="0" algn="ctr">
+              <a:buNone/>
+              <a:defRPr sz="2800" b="1">
+                <a:latin typeface="Segoe UI Light" panose="020B0502040204020203" pitchFamily="34" charset="0"/>
+                <a:cs typeface="Segoe UI Light" panose="020B0502040204020203" pitchFamily="34" charset="0"/>
+              </a:defRPr>
+            </a:lvl3pPr>
+            <a:lvl4pPr marL="1371600" indent="0" algn="ctr">
+              <a:buNone/>
+              <a:defRPr sz="2800" b="1">
+                <a:latin typeface="Segoe UI Light" panose="020B0502040204020203" pitchFamily="34" charset="0"/>
+                <a:cs typeface="Segoe UI Light" panose="020B0502040204020203" pitchFamily="34" charset="0"/>
+              </a:defRPr>
+            </a:lvl4pPr>
+            <a:lvl5pPr marL="1828800" indent="0" algn="ctr">
+              <a:buNone/>
+              <a:defRPr sz="2800" b="1">
+                <a:latin typeface="Segoe UI Light" panose="020B0502040204020203" pitchFamily="34" charset="0"/>
+                <a:cs typeface="Segoe UI Light" panose="020B0502040204020203" pitchFamily="34" charset="0"/>
+              </a:defRPr>
+            </a:lvl5pPr>
+          </a:lstStyle>
+          <a:p>
+            <a:pPr lvl="0"/>
+            <a:endParaRPr lang="de-DE" dirty="0"/>
+          </a:p>
+        </p:txBody>
+      </p:sp>
+      <p:sp>
+        <p:nvSpPr>
+          <p:cNvPr id="35" name="State_Background_6">
+            <a:extLst>
+              <a:ext uri="{FF2B5EF4-FFF2-40B4-BE49-F238E27FC236}">
+                <a16:creationId xmlns:a16="http://schemas.microsoft.com/office/drawing/2014/main" id="{13166B22-DD5D-7727-EEB7-B7538A28C522}"/>
+              </a:ext>
+            </a:extLst>
+          </p:cNvPr>
+          <p:cNvSpPr/>
+          <p:nvPr userDrawn="1"/>
+        </p:nvSpPr>
+        <p:spPr>
+          <a:xfrm>
+            <a:off x="3673309" y="4602791"/>
+            <a:ext cx="3840480" cy="365760"/>
+          </a:xfrm>
+          <a:prstGeom prst="rect">
+            <a:avLst/>
+          </a:prstGeom>
+          <a:gradFill flip="none" rotWithShape="1">
+            <a:gsLst>
+              <a:gs pos="0">
+                <a:srgbClr val="0279D4"/>
+              </a:gs>
+              <a:gs pos="100000">
+                <a:srgbClr val="549BEC"/>
+              </a:gs>
+            </a:gsLst>
+            <a:lin ang="2700000" scaled="1"/>
+            <a:tileRect/>
+          </a:gradFill>
+          <a:ln>
+            <a:noFill/>
+          </a:ln>
+        </p:spPr>
+        <p:style>
+          <a:lnRef idx="2">
+            <a:schemeClr val="accent1">
+              <a:shade val="15000"/>
+            </a:schemeClr>
+          </a:lnRef>
+          <a:fillRef idx="1">
+            <a:schemeClr val="accent1"/>
+          </a:fillRef>
+          <a:effectRef idx="0">
+            <a:schemeClr val="accent1"/>
+          </a:effectRef>
+          <a:fontRef idx="minor">
+            <a:schemeClr val="lt1"/>
+          </a:fontRef>
+        </p:style>
+        <p:txBody>
+          <a:bodyPr rtlCol="0" anchor="ctr"/>
+          <a:lstStyle/>
+          <a:p>
+            <a:pPr algn="ctr"/>
+            <a:endParaRPr lang="de-DE"/>
+          </a:p>
+        </p:txBody>
+      </p:sp>
+      <p:sp>
+        <p:nvSpPr>
+          <p:cNvPr id="36" name="State_Type_6">
+            <a:extLst>
+              <a:ext uri="{FF2B5EF4-FFF2-40B4-BE49-F238E27FC236}">
+                <a16:creationId xmlns:a16="http://schemas.microsoft.com/office/drawing/2014/main" id="{32306C48-6A1D-00E1-6FFB-9B1E21BE47A0}"/>
+              </a:ext>
+            </a:extLst>
+          </p:cNvPr>
+          <p:cNvSpPr>
+            <a:spLocks noGrp="1"/>
+          </p:cNvSpPr>
+          <p:nvPr>
+            <p:ph idx="21"/>
+          </p:nvPr>
+        </p:nvSpPr>
+        <p:spPr>
+          <a:xfrm>
+            <a:off x="3673309" y="4602792"/>
+            <a:ext cx="3200400" cy="365760"/>
+          </a:xfrm>
+        </p:spPr>
+        <p:txBody>
+          <a:bodyPr anchor="ctr">
+            <a:noAutofit/>
+          </a:bodyPr>
+          <a:lstStyle>
+            <a:lvl1pPr marL="0" indent="0" algn="r">
+              <a:spcBef>
+                <a:spcPts val="400"/>
+              </a:spcBef>
+              <a:buNone/>
+              <a:defRPr lang="de-DE" sz="1800" b="1" kern="1200" dirty="0">
+                <a:solidFill>
+                  <a:schemeClr val="bg1"/>
+                </a:solidFill>
+                <a:latin typeface="Segoe UI Light" panose="020B0502040204020203" pitchFamily="34" charset="0"/>
+                <a:ea typeface="+mn-ea"/>
+                <a:cs typeface="Segoe UI Light" panose="020B0502040204020203" pitchFamily="34" charset="0"/>
+              </a:defRPr>
+            </a:lvl1pPr>
+            <a:lvl2pPr marL="457200" indent="0" algn="ctr">
+              <a:buNone/>
+              <a:defRPr sz="2800" b="1">
+                <a:latin typeface="Segoe UI Light" panose="020B0502040204020203" pitchFamily="34" charset="0"/>
+                <a:cs typeface="Segoe UI Light" panose="020B0502040204020203" pitchFamily="34" charset="0"/>
+              </a:defRPr>
+            </a:lvl2pPr>
+            <a:lvl3pPr marL="914400" indent="0" algn="ctr">
+              <a:buNone/>
+              <a:defRPr sz="2800" b="1">
+                <a:latin typeface="Segoe UI Light" panose="020B0502040204020203" pitchFamily="34" charset="0"/>
+                <a:cs typeface="Segoe UI Light" panose="020B0502040204020203" pitchFamily="34" charset="0"/>
+              </a:defRPr>
+            </a:lvl3pPr>
+            <a:lvl4pPr marL="1371600" indent="0" algn="ctr">
+              <a:buNone/>
+              <a:defRPr sz="2800" b="1">
+                <a:latin typeface="Segoe UI Light" panose="020B0502040204020203" pitchFamily="34" charset="0"/>
+                <a:cs typeface="Segoe UI Light" panose="020B0502040204020203" pitchFamily="34" charset="0"/>
+              </a:defRPr>
+            </a:lvl4pPr>
+            <a:lvl5pPr marL="1828800" indent="0" algn="ctr">
+              <a:buNone/>
+              <a:defRPr sz="2800" b="1">
+                <a:latin typeface="Segoe UI Light" panose="020B0502040204020203" pitchFamily="34" charset="0"/>
+                <a:cs typeface="Segoe UI Light" panose="020B0502040204020203" pitchFamily="34" charset="0"/>
+              </a:defRPr>
+            </a:lvl5pPr>
+          </a:lstStyle>
+          <a:p>
+            <a:pPr lvl="0"/>
+            <a:endParaRPr lang="de-DE" dirty="0"/>
+          </a:p>
+        </p:txBody>
+      </p:sp>
+      <p:sp>
+        <p:nvSpPr>
+          <p:cNvPr id="37" name="State_Count_6">
+            <a:extLst>
+              <a:ext uri="{FF2B5EF4-FFF2-40B4-BE49-F238E27FC236}">
+                <a16:creationId xmlns:a16="http://schemas.microsoft.com/office/drawing/2014/main" id="{A1DAF6A8-37EA-3B2F-4588-B6136F88E609}"/>
+              </a:ext>
+            </a:extLst>
+          </p:cNvPr>
+          <p:cNvSpPr>
+            <a:spLocks noGrp="1"/>
+          </p:cNvSpPr>
+          <p:nvPr>
+            <p:ph idx="22"/>
+          </p:nvPr>
+        </p:nvSpPr>
+        <p:spPr>
+          <a:xfrm>
+            <a:off x="6873709" y="4602791"/>
+            <a:ext cx="640080" cy="365760"/>
+          </a:xfrm>
+        </p:spPr>
+        <p:txBody>
+          <a:bodyPr anchor="ctr">
+            <a:noAutofit/>
+          </a:bodyPr>
+          <a:lstStyle>
+            <a:lvl1pPr marL="0" indent="0" algn="ctr">
+              <a:spcBef>
+                <a:spcPts val="400"/>
+              </a:spcBef>
+              <a:buNone/>
+              <a:defRPr lang="de-DE" sz="1800" b="1" kern="1200" dirty="0">
+                <a:solidFill>
+                  <a:schemeClr val="bg1"/>
+                </a:solidFill>
+                <a:latin typeface="Segoe UI Light" panose="020B0502040204020203" pitchFamily="34" charset="0"/>
+                <a:ea typeface="+mn-ea"/>
+                <a:cs typeface="Segoe UI Light" panose="020B0502040204020203" pitchFamily="34" charset="0"/>
+              </a:defRPr>
+            </a:lvl1pPr>
+            <a:lvl2pPr marL="457200" indent="0" algn="ctr">
+              <a:buNone/>
+              <a:defRPr sz="2800" b="1">
+                <a:latin typeface="Segoe UI Light" panose="020B0502040204020203" pitchFamily="34" charset="0"/>
+                <a:cs typeface="Segoe UI Light" panose="020B0502040204020203" pitchFamily="34" charset="0"/>
+              </a:defRPr>
+            </a:lvl2pPr>
+            <a:lvl3pPr marL="914400" indent="0" algn="ctr">
+              <a:buNone/>
+              <a:defRPr sz="2800" b="1">
+                <a:latin typeface="Segoe UI Light" panose="020B0502040204020203" pitchFamily="34" charset="0"/>
+                <a:cs typeface="Segoe UI Light" panose="020B0502040204020203" pitchFamily="34" charset="0"/>
+              </a:defRPr>
+            </a:lvl3pPr>
+            <a:lvl4pPr marL="1371600" indent="0" algn="ctr">
+              <a:buNone/>
+              <a:defRPr sz="2800" b="1">
+                <a:latin typeface="Segoe UI Light" panose="020B0502040204020203" pitchFamily="34" charset="0"/>
+                <a:cs typeface="Segoe UI Light" panose="020B0502040204020203" pitchFamily="34" charset="0"/>
+              </a:defRPr>
+            </a:lvl4pPr>
+            <a:lvl5pPr marL="1828800" indent="0" algn="ctr">
+              <a:buNone/>
+              <a:defRPr sz="2800" b="1">
+                <a:latin typeface="Segoe UI Light" panose="020B0502040204020203" pitchFamily="34" charset="0"/>
+                <a:cs typeface="Segoe UI Light" panose="020B0502040204020203" pitchFamily="34" charset="0"/>
+              </a:defRPr>
+            </a:lvl5pPr>
+          </a:lstStyle>
+          <a:p>
+            <a:pPr lvl="0"/>
+            <a:endParaRPr lang="de-DE" dirty="0"/>
+          </a:p>
+        </p:txBody>
+      </p:sp>
+      <p:sp>
+        <p:nvSpPr>
+          <p:cNvPr id="38" name="State_Background_7">
+            <a:extLst>
+              <a:ext uri="{FF2B5EF4-FFF2-40B4-BE49-F238E27FC236}">
+                <a16:creationId xmlns:a16="http://schemas.microsoft.com/office/drawing/2014/main" id="{007703A5-7B69-3645-3FB1-296DF812F710}"/>
+              </a:ext>
+            </a:extLst>
+          </p:cNvPr>
+          <p:cNvSpPr/>
+          <p:nvPr userDrawn="1"/>
+        </p:nvSpPr>
+        <p:spPr>
+          <a:xfrm>
+            <a:off x="7667607" y="2046341"/>
+            <a:ext cx="3840480" cy="365760"/>
+          </a:xfrm>
+          <a:prstGeom prst="rect">
+            <a:avLst/>
+          </a:prstGeom>
+          <a:gradFill flip="none" rotWithShape="1">
+            <a:gsLst>
+              <a:gs pos="0">
+                <a:srgbClr val="0279D4"/>
+              </a:gs>
+              <a:gs pos="100000">
+                <a:srgbClr val="549BEC"/>
+              </a:gs>
+            </a:gsLst>
+            <a:lin ang="2700000" scaled="1"/>
+            <a:tileRect/>
+          </a:gradFill>
+          <a:ln>
+            <a:noFill/>
+          </a:ln>
+        </p:spPr>
+        <p:style>
+          <a:lnRef idx="2">
+            <a:schemeClr val="accent1">
+              <a:shade val="15000"/>
+            </a:schemeClr>
+          </a:lnRef>
+          <a:fillRef idx="1">
+            <a:schemeClr val="accent1"/>
+          </a:fillRef>
+          <a:effectRef idx="0">
+            <a:schemeClr val="accent1"/>
+          </a:effectRef>
+          <a:fontRef idx="minor">
+            <a:schemeClr val="lt1"/>
+          </a:fontRef>
+        </p:style>
+        <p:txBody>
+          <a:bodyPr rtlCol="0" anchor="ctr"/>
+          <a:lstStyle/>
+          <a:p>
+            <a:pPr algn="ctr"/>
+            <a:endParaRPr lang="de-DE"/>
+          </a:p>
+        </p:txBody>
+      </p:sp>
+      <p:sp>
+        <p:nvSpPr>
+          <p:cNvPr id="39" name="State_Type_7">
+            <a:extLst>
+              <a:ext uri="{FF2B5EF4-FFF2-40B4-BE49-F238E27FC236}">
+                <a16:creationId xmlns:a16="http://schemas.microsoft.com/office/drawing/2014/main" id="{F52A4F56-48C5-E4B4-9B43-BEB4AF9F5681}"/>
+              </a:ext>
+            </a:extLst>
+          </p:cNvPr>
+          <p:cNvSpPr>
+            <a:spLocks noGrp="1"/>
+          </p:cNvSpPr>
+          <p:nvPr>
+            <p:ph idx="23"/>
+          </p:nvPr>
+        </p:nvSpPr>
+        <p:spPr>
+          <a:xfrm>
+            <a:off x="7667607" y="2046342"/>
+            <a:ext cx="3200400" cy="365760"/>
+          </a:xfrm>
+        </p:spPr>
+        <p:txBody>
+          <a:bodyPr anchor="ctr">
+            <a:noAutofit/>
+          </a:bodyPr>
+          <a:lstStyle>
+            <a:lvl1pPr marL="0" indent="0" algn="r">
+              <a:spcBef>
+                <a:spcPts val="400"/>
+              </a:spcBef>
+              <a:buNone/>
+              <a:defRPr lang="de-DE" sz="1800" b="1" kern="1200" dirty="0">
+                <a:solidFill>
+                  <a:schemeClr val="bg1"/>
+                </a:solidFill>
+                <a:latin typeface="Segoe UI Light" panose="020B0502040204020203" pitchFamily="34" charset="0"/>
+                <a:ea typeface="+mn-ea"/>
+                <a:cs typeface="Segoe UI Light" panose="020B0502040204020203" pitchFamily="34" charset="0"/>
+              </a:defRPr>
+            </a:lvl1pPr>
+            <a:lvl2pPr marL="457200" indent="0" algn="ctr">
+              <a:buNone/>
+              <a:defRPr sz="2800" b="1">
+                <a:latin typeface="Segoe UI Light" panose="020B0502040204020203" pitchFamily="34" charset="0"/>
+                <a:cs typeface="Segoe UI Light" panose="020B0502040204020203" pitchFamily="34" charset="0"/>
+              </a:defRPr>
+            </a:lvl2pPr>
+            <a:lvl3pPr marL="914400" indent="0" algn="ctr">
+              <a:buNone/>
+              <a:defRPr sz="2800" b="1">
+                <a:latin typeface="Segoe UI Light" panose="020B0502040204020203" pitchFamily="34" charset="0"/>
+                <a:cs typeface="Segoe UI Light" panose="020B0502040204020203" pitchFamily="34" charset="0"/>
+              </a:defRPr>
+            </a:lvl3pPr>
+            <a:lvl4pPr marL="1371600" indent="0" algn="ctr">
+              <a:buNone/>
+              <a:defRPr sz="2800" b="1">
+                <a:latin typeface="Segoe UI Light" panose="020B0502040204020203" pitchFamily="34" charset="0"/>
+                <a:cs typeface="Segoe UI Light" panose="020B0502040204020203" pitchFamily="34" charset="0"/>
+              </a:defRPr>
+            </a:lvl4pPr>
+            <a:lvl5pPr marL="1828800" indent="0" algn="ctr">
+              <a:buNone/>
+              <a:defRPr sz="2800" b="1">
+                <a:latin typeface="Segoe UI Light" panose="020B0502040204020203" pitchFamily="34" charset="0"/>
+                <a:cs typeface="Segoe UI Light" panose="020B0502040204020203" pitchFamily="34" charset="0"/>
+              </a:defRPr>
+            </a:lvl5pPr>
+          </a:lstStyle>
+          <a:p>
+            <a:pPr lvl="0"/>
+            <a:endParaRPr lang="de-DE" dirty="0"/>
+          </a:p>
+        </p:txBody>
+      </p:sp>
+      <p:sp>
+        <p:nvSpPr>
+          <p:cNvPr id="40" name="State_Count_7">
+            <a:extLst>
+              <a:ext uri="{FF2B5EF4-FFF2-40B4-BE49-F238E27FC236}">
+                <a16:creationId xmlns:a16="http://schemas.microsoft.com/office/drawing/2014/main" id="{013393ED-2DEE-1808-58C8-DDA17EF03A31}"/>
+              </a:ext>
+            </a:extLst>
+          </p:cNvPr>
+          <p:cNvSpPr>
+            <a:spLocks noGrp="1"/>
+          </p:cNvSpPr>
+          <p:nvPr>
+            <p:ph idx="24"/>
+          </p:nvPr>
+        </p:nvSpPr>
+        <p:spPr>
+          <a:xfrm>
+            <a:off x="10868007" y="2046341"/>
+            <a:ext cx="640080" cy="365760"/>
+          </a:xfrm>
+        </p:spPr>
+        <p:txBody>
+          <a:bodyPr anchor="ctr">
+            <a:noAutofit/>
+          </a:bodyPr>
+          <a:lstStyle>
+            <a:lvl1pPr marL="0" indent="0" algn="ctr">
+              <a:spcBef>
+                <a:spcPts val="400"/>
+              </a:spcBef>
+              <a:buNone/>
+              <a:defRPr lang="de-DE" sz="1800" b="1" kern="1200" dirty="0">
+                <a:solidFill>
+                  <a:schemeClr val="bg1"/>
+                </a:solidFill>
+                <a:latin typeface="Segoe UI Light" panose="020B0502040204020203" pitchFamily="34" charset="0"/>
+                <a:ea typeface="+mn-ea"/>
+                <a:cs typeface="Segoe UI Light" panose="020B0502040204020203" pitchFamily="34" charset="0"/>
+              </a:defRPr>
+            </a:lvl1pPr>
+            <a:lvl2pPr marL="457200" indent="0" algn="ctr">
+              <a:buNone/>
+              <a:defRPr sz="2800" b="1">
+                <a:latin typeface="Segoe UI Light" panose="020B0502040204020203" pitchFamily="34" charset="0"/>
+                <a:cs typeface="Segoe UI Light" panose="020B0502040204020203" pitchFamily="34" charset="0"/>
+              </a:defRPr>
+            </a:lvl2pPr>
+            <a:lvl3pPr marL="914400" indent="0" algn="ctr">
+              <a:buNone/>
+              <a:defRPr sz="2800" b="1">
+                <a:latin typeface="Segoe UI Light" panose="020B0502040204020203" pitchFamily="34" charset="0"/>
+                <a:cs typeface="Segoe UI Light" panose="020B0502040204020203" pitchFamily="34" charset="0"/>
+              </a:defRPr>
+            </a:lvl3pPr>
+            <a:lvl4pPr marL="1371600" indent="0" algn="ctr">
+              <a:buNone/>
+              <a:defRPr sz="2800" b="1">
+                <a:latin typeface="Segoe UI Light" panose="020B0502040204020203" pitchFamily="34" charset="0"/>
+                <a:cs typeface="Segoe UI Light" panose="020B0502040204020203" pitchFamily="34" charset="0"/>
+              </a:defRPr>
+            </a:lvl4pPr>
+            <a:lvl5pPr marL="1828800" indent="0" algn="ctr">
+              <a:buNone/>
+              <a:defRPr sz="2800" b="1">
+                <a:latin typeface="Segoe UI Light" panose="020B0502040204020203" pitchFamily="34" charset="0"/>
+                <a:cs typeface="Segoe UI Light" panose="020B0502040204020203" pitchFamily="34" charset="0"/>
+              </a:defRPr>
+            </a:lvl5pPr>
+          </a:lstStyle>
+          <a:p>
+            <a:pPr lvl="0"/>
+            <a:endParaRPr lang="de-DE" dirty="0"/>
+          </a:p>
+        </p:txBody>
+      </p:sp>
+      <p:sp>
+        <p:nvSpPr>
+          <p:cNvPr id="41" name="State_Background_8">
+            <a:extLst>
+              <a:ext uri="{FF2B5EF4-FFF2-40B4-BE49-F238E27FC236}">
+                <a16:creationId xmlns:a16="http://schemas.microsoft.com/office/drawing/2014/main" id="{C5973C97-3519-196B-EFE8-DF6794089FEC}"/>
+              </a:ext>
+            </a:extLst>
+          </p:cNvPr>
+          <p:cNvSpPr/>
+          <p:nvPr userDrawn="1"/>
+        </p:nvSpPr>
+        <p:spPr>
+          <a:xfrm>
+            <a:off x="7667607" y="2564456"/>
+            <a:ext cx="3840480" cy="365760"/>
+          </a:xfrm>
+          <a:prstGeom prst="rect">
+            <a:avLst/>
+          </a:prstGeom>
+          <a:gradFill flip="none" rotWithShape="1">
+            <a:gsLst>
+              <a:gs pos="0">
+                <a:srgbClr val="0279D4"/>
+              </a:gs>
+              <a:gs pos="100000">
+                <a:srgbClr val="549BEC"/>
+              </a:gs>
+            </a:gsLst>
+            <a:lin ang="2700000" scaled="1"/>
+            <a:tileRect/>
+          </a:gradFill>
+          <a:ln>
+            <a:noFill/>
+          </a:ln>
+        </p:spPr>
+        <p:style>
+          <a:lnRef idx="2">
+            <a:schemeClr val="accent1">
+              <a:shade val="15000"/>
+            </a:schemeClr>
+          </a:lnRef>
+          <a:fillRef idx="1">
+            <a:schemeClr val="accent1"/>
+          </a:fillRef>
+          <a:effectRef idx="0">
+            <a:schemeClr val="accent1"/>
+          </a:effectRef>
+          <a:fontRef idx="minor">
+            <a:schemeClr val="lt1"/>
+          </a:fontRef>
+        </p:style>
+        <p:txBody>
+          <a:bodyPr rtlCol="0" anchor="ctr"/>
+          <a:lstStyle/>
+          <a:p>
+            <a:pPr algn="ctr"/>
+            <a:endParaRPr lang="de-DE"/>
+          </a:p>
+        </p:txBody>
+      </p:sp>
+      <p:sp>
+        <p:nvSpPr>
+          <p:cNvPr id="42" name="State_Type_8">
+            <a:extLst>
+              <a:ext uri="{FF2B5EF4-FFF2-40B4-BE49-F238E27FC236}">
+                <a16:creationId xmlns:a16="http://schemas.microsoft.com/office/drawing/2014/main" id="{533EC992-87BE-4359-AC7E-8AC3B9DB2026}"/>
+              </a:ext>
+            </a:extLst>
+          </p:cNvPr>
+          <p:cNvSpPr>
+            <a:spLocks noGrp="1"/>
+          </p:cNvSpPr>
+          <p:nvPr>
+            <p:ph idx="25"/>
+          </p:nvPr>
+        </p:nvSpPr>
+        <p:spPr>
+          <a:xfrm>
+            <a:off x="7667607" y="2564457"/>
+            <a:ext cx="3200400" cy="365760"/>
+          </a:xfrm>
+        </p:spPr>
+        <p:txBody>
+          <a:bodyPr anchor="ctr">
+            <a:noAutofit/>
+          </a:bodyPr>
+          <a:lstStyle>
+            <a:lvl1pPr marL="0" indent="0" algn="r">
+              <a:spcBef>
+                <a:spcPts val="400"/>
+              </a:spcBef>
+              <a:buNone/>
+              <a:defRPr lang="de-DE" sz="1800" b="1" kern="1200" dirty="0">
+                <a:solidFill>
+                  <a:schemeClr val="bg1"/>
+                </a:solidFill>
+                <a:latin typeface="Segoe UI Light" panose="020B0502040204020203" pitchFamily="34" charset="0"/>
+                <a:ea typeface="+mn-ea"/>
+                <a:cs typeface="Segoe UI Light" panose="020B0502040204020203" pitchFamily="34" charset="0"/>
+              </a:defRPr>
+            </a:lvl1pPr>
+            <a:lvl2pPr marL="457200" indent="0" algn="ctr">
+              <a:buNone/>
+              <a:defRPr sz="2800" b="1">
+                <a:latin typeface="Segoe UI Light" panose="020B0502040204020203" pitchFamily="34" charset="0"/>
+                <a:cs typeface="Segoe UI Light" panose="020B0502040204020203" pitchFamily="34" charset="0"/>
+              </a:defRPr>
+            </a:lvl2pPr>
+            <a:lvl3pPr marL="914400" indent="0" algn="ctr">
+              <a:buNone/>
+              <a:defRPr sz="2800" b="1">
+                <a:latin typeface="Segoe UI Light" panose="020B0502040204020203" pitchFamily="34" charset="0"/>
+                <a:cs typeface="Segoe UI Light" panose="020B0502040204020203" pitchFamily="34" charset="0"/>
+              </a:defRPr>
+            </a:lvl3pPr>
+            <a:lvl4pPr marL="1371600" indent="0" algn="ctr">
+              <a:buNone/>
+              <a:defRPr sz="2800" b="1">
+                <a:latin typeface="Segoe UI Light" panose="020B0502040204020203" pitchFamily="34" charset="0"/>
+                <a:cs typeface="Segoe UI Light" panose="020B0502040204020203" pitchFamily="34" charset="0"/>
+              </a:defRPr>
+            </a:lvl4pPr>
+            <a:lvl5pPr marL="1828800" indent="0" algn="ctr">
+              <a:buNone/>
+              <a:defRPr sz="2800" b="1">
+                <a:latin typeface="Segoe UI Light" panose="020B0502040204020203" pitchFamily="34" charset="0"/>
+                <a:cs typeface="Segoe UI Light" panose="020B0502040204020203" pitchFamily="34" charset="0"/>
+              </a:defRPr>
+            </a:lvl5pPr>
+          </a:lstStyle>
+          <a:p>
+            <a:pPr lvl="0"/>
+            <a:endParaRPr lang="de-DE" dirty="0"/>
+          </a:p>
+        </p:txBody>
+      </p:sp>
+      <p:sp>
+        <p:nvSpPr>
+          <p:cNvPr id="43" name="State_Count_8">
+            <a:extLst>
+              <a:ext uri="{FF2B5EF4-FFF2-40B4-BE49-F238E27FC236}">
+                <a16:creationId xmlns:a16="http://schemas.microsoft.com/office/drawing/2014/main" id="{A8875E6D-C5E2-91FE-4AA5-13FB62598231}"/>
+              </a:ext>
+            </a:extLst>
+          </p:cNvPr>
+          <p:cNvSpPr>
+            <a:spLocks noGrp="1"/>
+          </p:cNvSpPr>
+          <p:nvPr>
+            <p:ph idx="26"/>
+          </p:nvPr>
+        </p:nvSpPr>
+        <p:spPr>
+          <a:xfrm>
+            <a:off x="10868007" y="2564456"/>
+            <a:ext cx="640080" cy="365760"/>
+          </a:xfrm>
+        </p:spPr>
+        <p:txBody>
+          <a:bodyPr anchor="ctr">
+            <a:noAutofit/>
+          </a:bodyPr>
+          <a:lstStyle>
+            <a:lvl1pPr marL="0" indent="0" algn="ctr">
+              <a:spcBef>
+                <a:spcPts val="400"/>
+              </a:spcBef>
+              <a:buNone/>
+              <a:defRPr lang="de-DE" sz="1800" b="1" kern="1200" dirty="0">
+                <a:solidFill>
+                  <a:schemeClr val="bg1"/>
+                </a:solidFill>
+                <a:latin typeface="Segoe UI Light" panose="020B0502040204020203" pitchFamily="34" charset="0"/>
+                <a:ea typeface="+mn-ea"/>
+                <a:cs typeface="Segoe UI Light" panose="020B0502040204020203" pitchFamily="34" charset="0"/>
+              </a:defRPr>
+            </a:lvl1pPr>
+            <a:lvl2pPr marL="457200" indent="0" algn="ctr">
+              <a:buNone/>
+              <a:defRPr sz="2800" b="1">
+                <a:latin typeface="Segoe UI Light" panose="020B0502040204020203" pitchFamily="34" charset="0"/>
+                <a:cs typeface="Segoe UI Light" panose="020B0502040204020203" pitchFamily="34" charset="0"/>
+              </a:defRPr>
+            </a:lvl2pPr>
+            <a:lvl3pPr marL="914400" indent="0" algn="ctr">
+              <a:buNone/>
+              <a:defRPr sz="2800" b="1">
+                <a:latin typeface="Segoe UI Light" panose="020B0502040204020203" pitchFamily="34" charset="0"/>
+                <a:cs typeface="Segoe UI Light" panose="020B0502040204020203" pitchFamily="34" charset="0"/>
+              </a:defRPr>
+            </a:lvl3pPr>
+            <a:lvl4pPr marL="1371600" indent="0" algn="ctr">
+              <a:buNone/>
+              <a:defRPr sz="2800" b="1">
+                <a:latin typeface="Segoe UI Light" panose="020B0502040204020203" pitchFamily="34" charset="0"/>
+                <a:cs typeface="Segoe UI Light" panose="020B0502040204020203" pitchFamily="34" charset="0"/>
+              </a:defRPr>
+            </a:lvl4pPr>
+            <a:lvl5pPr marL="1828800" indent="0" algn="ctr">
+              <a:buNone/>
+              <a:defRPr sz="2800" b="1">
+                <a:latin typeface="Segoe UI Light" panose="020B0502040204020203" pitchFamily="34" charset="0"/>
+                <a:cs typeface="Segoe UI Light" panose="020B0502040204020203" pitchFamily="34" charset="0"/>
+              </a:defRPr>
+            </a:lvl5pPr>
+          </a:lstStyle>
+          <a:p>
+            <a:pPr lvl="0"/>
+            <a:endParaRPr lang="de-DE" dirty="0"/>
+          </a:p>
+        </p:txBody>
+      </p:sp>
+      <p:sp>
+        <p:nvSpPr>
+          <p:cNvPr id="44" name="State_Background_9">
+            <a:extLst>
+              <a:ext uri="{FF2B5EF4-FFF2-40B4-BE49-F238E27FC236}">
+                <a16:creationId xmlns:a16="http://schemas.microsoft.com/office/drawing/2014/main" id="{293B701B-F0AE-8CFB-3D03-33EB48EE2F61}"/>
+              </a:ext>
+            </a:extLst>
+          </p:cNvPr>
+          <p:cNvSpPr/>
+          <p:nvPr userDrawn="1"/>
+        </p:nvSpPr>
+        <p:spPr>
+          <a:xfrm>
+            <a:off x="7667607" y="3082570"/>
+            <a:ext cx="3840480" cy="365760"/>
+          </a:xfrm>
+          <a:prstGeom prst="rect">
+            <a:avLst/>
+          </a:prstGeom>
+          <a:gradFill flip="none" rotWithShape="1">
+            <a:gsLst>
+              <a:gs pos="0">
+                <a:srgbClr val="0279D4"/>
+              </a:gs>
+              <a:gs pos="100000">
+                <a:srgbClr val="549BEC"/>
+              </a:gs>
+            </a:gsLst>
+            <a:lin ang="2700000" scaled="1"/>
+            <a:tileRect/>
+          </a:gradFill>
+          <a:ln>
+            <a:noFill/>
+          </a:ln>
+        </p:spPr>
+        <p:style>
+          <a:lnRef idx="2">
+            <a:schemeClr val="accent1">
+              <a:shade val="15000"/>
+            </a:schemeClr>
+          </a:lnRef>
+          <a:fillRef idx="1">
+            <a:schemeClr val="accent1"/>
+          </a:fillRef>
+          <a:effectRef idx="0">
+            <a:schemeClr val="accent1"/>
+          </a:effectRef>
+          <a:fontRef idx="minor">
+            <a:schemeClr val="lt1"/>
+          </a:fontRef>
+        </p:style>
+        <p:txBody>
+          <a:bodyPr rtlCol="0" anchor="ctr"/>
+          <a:lstStyle/>
+          <a:p>
+            <a:pPr algn="ctr"/>
+            <a:endParaRPr lang="de-DE"/>
+          </a:p>
+        </p:txBody>
+      </p:sp>
+      <p:sp>
+        <p:nvSpPr>
+          <p:cNvPr id="45" name="State_Type_9">
+            <a:extLst>
+              <a:ext uri="{FF2B5EF4-FFF2-40B4-BE49-F238E27FC236}">
+                <a16:creationId xmlns:a16="http://schemas.microsoft.com/office/drawing/2014/main" id="{B1B246BB-8B2C-1BC6-B6E8-C99927EE1463}"/>
+              </a:ext>
+            </a:extLst>
+          </p:cNvPr>
+          <p:cNvSpPr>
+            <a:spLocks noGrp="1"/>
+          </p:cNvSpPr>
+          <p:nvPr>
+            <p:ph idx="27"/>
+          </p:nvPr>
+        </p:nvSpPr>
+        <p:spPr>
+          <a:xfrm>
+            <a:off x="7667607" y="3082571"/>
+            <a:ext cx="3200400" cy="365760"/>
+          </a:xfrm>
+        </p:spPr>
+        <p:txBody>
+          <a:bodyPr anchor="ctr">
+            <a:noAutofit/>
+          </a:bodyPr>
+          <a:lstStyle>
+            <a:lvl1pPr marL="0" indent="0" algn="r">
+              <a:spcBef>
+                <a:spcPts val="400"/>
+              </a:spcBef>
+              <a:buNone/>
+              <a:defRPr lang="de-DE" sz="1800" b="1" kern="1200" dirty="0">
+                <a:solidFill>
+                  <a:schemeClr val="bg1"/>
+                </a:solidFill>
+                <a:latin typeface="Segoe UI Light" panose="020B0502040204020203" pitchFamily="34" charset="0"/>
+                <a:ea typeface="+mn-ea"/>
+                <a:cs typeface="Segoe UI Light" panose="020B0502040204020203" pitchFamily="34" charset="0"/>
+              </a:defRPr>
+            </a:lvl1pPr>
+            <a:lvl2pPr marL="457200" indent="0" algn="ctr">
+              <a:buNone/>
+              <a:defRPr sz="2800" b="1">
+                <a:latin typeface="Segoe UI Light" panose="020B0502040204020203" pitchFamily="34" charset="0"/>
+                <a:cs typeface="Segoe UI Light" panose="020B0502040204020203" pitchFamily="34" charset="0"/>
+              </a:defRPr>
+            </a:lvl2pPr>
+            <a:lvl3pPr marL="914400" indent="0" algn="ctr">
+              <a:buNone/>
+              <a:defRPr sz="2800" b="1">
+                <a:latin typeface="Segoe UI Light" panose="020B0502040204020203" pitchFamily="34" charset="0"/>
+                <a:cs typeface="Segoe UI Light" panose="020B0502040204020203" pitchFamily="34" charset="0"/>
+              </a:defRPr>
+            </a:lvl3pPr>
+            <a:lvl4pPr marL="1371600" indent="0" algn="ctr">
+              <a:buNone/>
+              <a:defRPr sz="2800" b="1">
+                <a:latin typeface="Segoe UI Light" panose="020B0502040204020203" pitchFamily="34" charset="0"/>
+                <a:cs typeface="Segoe UI Light" panose="020B0502040204020203" pitchFamily="34" charset="0"/>
+              </a:defRPr>
+            </a:lvl4pPr>
+            <a:lvl5pPr marL="1828800" indent="0" algn="ctr">
+              <a:buNone/>
+              <a:defRPr sz="2800" b="1">
+                <a:latin typeface="Segoe UI Light" panose="020B0502040204020203" pitchFamily="34" charset="0"/>
+                <a:cs typeface="Segoe UI Light" panose="020B0502040204020203" pitchFamily="34" charset="0"/>
+              </a:defRPr>
+            </a:lvl5pPr>
+          </a:lstStyle>
+          <a:p>
+            <a:pPr lvl="0"/>
+            <a:endParaRPr lang="de-DE" dirty="0"/>
+          </a:p>
+        </p:txBody>
+      </p:sp>
+      <p:sp>
+        <p:nvSpPr>
+          <p:cNvPr id="46" name="State_Count_9">
+            <a:extLst>
+              <a:ext uri="{FF2B5EF4-FFF2-40B4-BE49-F238E27FC236}">
+                <a16:creationId xmlns:a16="http://schemas.microsoft.com/office/drawing/2014/main" id="{AC854B36-312C-B25E-E8C0-758B2F38D8CD}"/>
+              </a:ext>
+            </a:extLst>
+          </p:cNvPr>
+          <p:cNvSpPr>
+            <a:spLocks noGrp="1"/>
+          </p:cNvSpPr>
+          <p:nvPr>
+            <p:ph idx="28"/>
+          </p:nvPr>
+        </p:nvSpPr>
+        <p:spPr>
+          <a:xfrm>
+            <a:off x="10868007" y="3082570"/>
+            <a:ext cx="640080" cy="365760"/>
+          </a:xfrm>
+        </p:spPr>
+        <p:txBody>
+          <a:bodyPr anchor="ctr">
+            <a:noAutofit/>
+          </a:bodyPr>
+          <a:lstStyle>
+            <a:lvl1pPr marL="0" indent="0" algn="ctr">
+              <a:spcBef>
+                <a:spcPts val="400"/>
+              </a:spcBef>
+              <a:buNone/>
+              <a:defRPr lang="de-DE" sz="1800" b="1" kern="1200" dirty="0">
+                <a:solidFill>
+                  <a:schemeClr val="bg1"/>
+                </a:solidFill>
+                <a:latin typeface="Segoe UI Light" panose="020B0502040204020203" pitchFamily="34" charset="0"/>
+                <a:ea typeface="+mn-ea"/>
+                <a:cs typeface="Segoe UI Light" panose="020B0502040204020203" pitchFamily="34" charset="0"/>
+              </a:defRPr>
+            </a:lvl1pPr>
+            <a:lvl2pPr marL="457200" indent="0" algn="ctr">
+              <a:buNone/>
+              <a:defRPr sz="2800" b="1">
+                <a:latin typeface="Segoe UI Light" panose="020B0502040204020203" pitchFamily="34" charset="0"/>
+                <a:cs typeface="Segoe UI Light" panose="020B0502040204020203" pitchFamily="34" charset="0"/>
+              </a:defRPr>
+            </a:lvl2pPr>
+            <a:lvl3pPr marL="914400" indent="0" algn="ctr">
+              <a:buNone/>
+              <a:defRPr sz="2800" b="1">
+                <a:latin typeface="Segoe UI Light" panose="020B0502040204020203" pitchFamily="34" charset="0"/>
+                <a:cs typeface="Segoe UI Light" panose="020B0502040204020203" pitchFamily="34" charset="0"/>
+              </a:defRPr>
+            </a:lvl3pPr>
+            <a:lvl4pPr marL="1371600" indent="0" algn="ctr">
+              <a:buNone/>
+              <a:defRPr sz="2800" b="1">
+                <a:latin typeface="Segoe UI Light" panose="020B0502040204020203" pitchFamily="34" charset="0"/>
+                <a:cs typeface="Segoe UI Light" panose="020B0502040204020203" pitchFamily="34" charset="0"/>
+              </a:defRPr>
+            </a:lvl4pPr>
+            <a:lvl5pPr marL="1828800" indent="0" algn="ctr">
+              <a:buNone/>
+              <a:defRPr sz="2800" b="1">
+                <a:latin typeface="Segoe UI Light" panose="020B0502040204020203" pitchFamily="34" charset="0"/>
+                <a:cs typeface="Segoe UI Light" panose="020B0502040204020203" pitchFamily="34" charset="0"/>
+              </a:defRPr>
+            </a:lvl5pPr>
+          </a:lstStyle>
+          <a:p>
+            <a:pPr lvl="0"/>
+            <a:endParaRPr lang="de-DE" dirty="0"/>
+          </a:p>
+        </p:txBody>
+      </p:sp>
+      <p:sp>
+        <p:nvSpPr>
+          <p:cNvPr id="47" name="State_Background_10">
+            <a:extLst>
+              <a:ext uri="{FF2B5EF4-FFF2-40B4-BE49-F238E27FC236}">
+                <a16:creationId xmlns:a16="http://schemas.microsoft.com/office/drawing/2014/main" id="{B696F43D-DB69-89AB-E32F-07580A453B93}"/>
+              </a:ext>
+            </a:extLst>
+          </p:cNvPr>
+          <p:cNvSpPr/>
+          <p:nvPr userDrawn="1"/>
+        </p:nvSpPr>
+        <p:spPr>
+          <a:xfrm>
+            <a:off x="7667607" y="3566561"/>
+            <a:ext cx="3840480" cy="365760"/>
+          </a:xfrm>
+          <a:prstGeom prst="rect">
+            <a:avLst/>
+          </a:prstGeom>
+          <a:gradFill flip="none" rotWithShape="1">
+            <a:gsLst>
+              <a:gs pos="0">
+                <a:srgbClr val="0279D4"/>
+              </a:gs>
+              <a:gs pos="100000">
+                <a:srgbClr val="549BEC"/>
+              </a:gs>
+            </a:gsLst>
+            <a:lin ang="2700000" scaled="1"/>
+            <a:tileRect/>
+          </a:gradFill>
+          <a:ln>
+            <a:noFill/>
+          </a:ln>
+        </p:spPr>
+        <p:style>
+          <a:lnRef idx="2">
+            <a:schemeClr val="accent1">
+              <a:shade val="15000"/>
+            </a:schemeClr>
+          </a:lnRef>
+          <a:fillRef idx="1">
+            <a:schemeClr val="accent1"/>
+          </a:fillRef>
+          <a:effectRef idx="0">
+            <a:schemeClr val="accent1"/>
+          </a:effectRef>
+          <a:fontRef idx="minor">
+            <a:schemeClr val="lt1"/>
+          </a:fontRef>
+        </p:style>
+        <p:txBody>
+          <a:bodyPr rtlCol="0" anchor="ctr"/>
+          <a:lstStyle/>
+          <a:p>
+            <a:pPr algn="ctr"/>
+            <a:endParaRPr lang="de-DE"/>
+          </a:p>
+        </p:txBody>
+      </p:sp>
+      <p:sp>
+        <p:nvSpPr>
+          <p:cNvPr id="48" name="State_Type_10">
+            <a:extLst>
+              <a:ext uri="{FF2B5EF4-FFF2-40B4-BE49-F238E27FC236}">
+                <a16:creationId xmlns:a16="http://schemas.microsoft.com/office/drawing/2014/main" id="{384F81B2-FF69-39DE-DC3C-29882198ECE9}"/>
+              </a:ext>
+            </a:extLst>
+          </p:cNvPr>
+          <p:cNvSpPr>
+            <a:spLocks noGrp="1"/>
+          </p:cNvSpPr>
+          <p:nvPr>
+            <p:ph idx="29"/>
+          </p:nvPr>
+        </p:nvSpPr>
+        <p:spPr>
+          <a:xfrm>
+            <a:off x="7667607" y="3566562"/>
+            <a:ext cx="3200400" cy="365760"/>
+          </a:xfrm>
+        </p:spPr>
+        <p:txBody>
+          <a:bodyPr anchor="ctr">
+            <a:noAutofit/>
+          </a:bodyPr>
+          <a:lstStyle>
+            <a:lvl1pPr marL="0" indent="0" algn="r">
+              <a:spcBef>
+                <a:spcPts val="400"/>
+              </a:spcBef>
+              <a:buNone/>
+              <a:defRPr lang="de-DE" sz="1800" b="1" kern="1200" dirty="0">
+                <a:solidFill>
+                  <a:schemeClr val="bg1"/>
+                </a:solidFill>
+                <a:latin typeface="Segoe UI Light" panose="020B0502040204020203" pitchFamily="34" charset="0"/>
+                <a:ea typeface="+mn-ea"/>
+                <a:cs typeface="Segoe UI Light" panose="020B0502040204020203" pitchFamily="34" charset="0"/>
+              </a:defRPr>
+            </a:lvl1pPr>
+            <a:lvl2pPr marL="457200" indent="0" algn="ctr">
+              <a:buNone/>
+              <a:defRPr sz="2800" b="1">
+                <a:latin typeface="Segoe UI Light" panose="020B0502040204020203" pitchFamily="34" charset="0"/>
+                <a:cs typeface="Segoe UI Light" panose="020B0502040204020203" pitchFamily="34" charset="0"/>
+              </a:defRPr>
+            </a:lvl2pPr>
+            <a:lvl3pPr marL="914400" indent="0" algn="ctr">
+              <a:buNone/>
+              <a:defRPr sz="2800" b="1">
+                <a:latin typeface="Segoe UI Light" panose="020B0502040204020203" pitchFamily="34" charset="0"/>
+                <a:cs typeface="Segoe UI Light" panose="020B0502040204020203" pitchFamily="34" charset="0"/>
+              </a:defRPr>
+            </a:lvl3pPr>
+            <a:lvl4pPr marL="1371600" indent="0" algn="ctr">
+              <a:buNone/>
+              <a:defRPr sz="2800" b="1">
+                <a:latin typeface="Segoe UI Light" panose="020B0502040204020203" pitchFamily="34" charset="0"/>
+                <a:cs typeface="Segoe UI Light" panose="020B0502040204020203" pitchFamily="34" charset="0"/>
+              </a:defRPr>
+            </a:lvl4pPr>
+            <a:lvl5pPr marL="1828800" indent="0" algn="ctr">
+              <a:buNone/>
+              <a:defRPr sz="2800" b="1">
+                <a:latin typeface="Segoe UI Light" panose="020B0502040204020203" pitchFamily="34" charset="0"/>
+                <a:cs typeface="Segoe UI Light" panose="020B0502040204020203" pitchFamily="34" charset="0"/>
+              </a:defRPr>
+            </a:lvl5pPr>
+          </a:lstStyle>
+          <a:p>
+            <a:pPr lvl="0"/>
+            <a:endParaRPr lang="de-DE" dirty="0"/>
+          </a:p>
+        </p:txBody>
+      </p:sp>
+      <p:sp>
+        <p:nvSpPr>
+          <p:cNvPr id="49" name="State_Count_10">
+            <a:extLst>
+              <a:ext uri="{FF2B5EF4-FFF2-40B4-BE49-F238E27FC236}">
+                <a16:creationId xmlns:a16="http://schemas.microsoft.com/office/drawing/2014/main" id="{B3B61072-DF2F-8B78-35CD-C288878F80B7}"/>
+              </a:ext>
+            </a:extLst>
+          </p:cNvPr>
+          <p:cNvSpPr>
+            <a:spLocks noGrp="1"/>
+          </p:cNvSpPr>
+          <p:nvPr>
+            <p:ph idx="30"/>
+          </p:nvPr>
+        </p:nvSpPr>
+        <p:spPr>
+          <a:xfrm>
+            <a:off x="10868007" y="3566561"/>
+            <a:ext cx="640080" cy="365760"/>
+          </a:xfrm>
+        </p:spPr>
+        <p:txBody>
+          <a:bodyPr anchor="ctr">
+            <a:noAutofit/>
+          </a:bodyPr>
+          <a:lstStyle>
+            <a:lvl1pPr marL="0" indent="0" algn="ctr">
+              <a:spcBef>
+                <a:spcPts val="400"/>
+              </a:spcBef>
+              <a:buNone/>
+              <a:defRPr lang="de-DE" sz="1800" b="1" kern="1200" dirty="0">
+                <a:solidFill>
+                  <a:schemeClr val="bg1"/>
+                </a:solidFill>
+                <a:latin typeface="Segoe UI Light" panose="020B0502040204020203" pitchFamily="34" charset="0"/>
+                <a:ea typeface="+mn-ea"/>
+                <a:cs typeface="Segoe UI Light" panose="020B0502040204020203" pitchFamily="34" charset="0"/>
+              </a:defRPr>
+            </a:lvl1pPr>
+            <a:lvl2pPr marL="457200" indent="0" algn="ctr">
+              <a:buNone/>
+              <a:defRPr sz="2800" b="1">
+                <a:latin typeface="Segoe UI Light" panose="020B0502040204020203" pitchFamily="34" charset="0"/>
+                <a:cs typeface="Segoe UI Light" panose="020B0502040204020203" pitchFamily="34" charset="0"/>
+              </a:defRPr>
+            </a:lvl2pPr>
+            <a:lvl3pPr marL="914400" indent="0" algn="ctr">
+              <a:buNone/>
+              <a:defRPr sz="2800" b="1">
+                <a:latin typeface="Segoe UI Light" panose="020B0502040204020203" pitchFamily="34" charset="0"/>
+                <a:cs typeface="Segoe UI Light" panose="020B0502040204020203" pitchFamily="34" charset="0"/>
+              </a:defRPr>
+            </a:lvl3pPr>
+            <a:lvl4pPr marL="1371600" indent="0" algn="ctr">
+              <a:buNone/>
+              <a:defRPr sz="2800" b="1">
+                <a:latin typeface="Segoe UI Light" panose="020B0502040204020203" pitchFamily="34" charset="0"/>
+                <a:cs typeface="Segoe UI Light" panose="020B0502040204020203" pitchFamily="34" charset="0"/>
+              </a:defRPr>
+            </a:lvl4pPr>
+            <a:lvl5pPr marL="1828800" indent="0" algn="ctr">
+              <a:buNone/>
+              <a:defRPr sz="2800" b="1">
+                <a:latin typeface="Segoe UI Light" panose="020B0502040204020203" pitchFamily="34" charset="0"/>
+                <a:cs typeface="Segoe UI Light" panose="020B0502040204020203" pitchFamily="34" charset="0"/>
+              </a:defRPr>
+            </a:lvl5pPr>
+          </a:lstStyle>
+          <a:p>
+            <a:pPr lvl="0"/>
+            <a:endParaRPr lang="de-DE" dirty="0"/>
+          </a:p>
+        </p:txBody>
+      </p:sp>
+      <p:sp>
+        <p:nvSpPr>
+          <p:cNvPr id="50" name="State_Background_11">
+            <a:extLst>
+              <a:ext uri="{FF2B5EF4-FFF2-40B4-BE49-F238E27FC236}">
+                <a16:creationId xmlns:a16="http://schemas.microsoft.com/office/drawing/2014/main" id="{F1F54579-E485-8D0F-CC2A-2FCD71AA8D1F}"/>
+              </a:ext>
+            </a:extLst>
+          </p:cNvPr>
+          <p:cNvSpPr/>
+          <p:nvPr userDrawn="1"/>
+        </p:nvSpPr>
+        <p:spPr>
+          <a:xfrm>
+            <a:off x="7667607" y="4084676"/>
+            <a:ext cx="3840480" cy="365760"/>
+          </a:xfrm>
+          <a:prstGeom prst="rect">
+            <a:avLst/>
+          </a:prstGeom>
+          <a:gradFill flip="none" rotWithShape="1">
+            <a:gsLst>
+              <a:gs pos="0">
+                <a:srgbClr val="0279D4"/>
+              </a:gs>
+              <a:gs pos="100000">
+                <a:srgbClr val="549BEC"/>
+              </a:gs>
+            </a:gsLst>
+            <a:lin ang="2700000" scaled="1"/>
+            <a:tileRect/>
+          </a:gradFill>
+          <a:ln>
+            <a:noFill/>
+          </a:ln>
+        </p:spPr>
+        <p:style>
+          <a:lnRef idx="2">
+            <a:schemeClr val="accent1">
+              <a:shade val="15000"/>
+            </a:schemeClr>
+          </a:lnRef>
+          <a:fillRef idx="1">
+            <a:schemeClr val="accent1"/>
+          </a:fillRef>
+          <a:effectRef idx="0">
+            <a:schemeClr val="accent1"/>
+          </a:effectRef>
+          <a:fontRef idx="minor">
+            <a:schemeClr val="lt1"/>
+          </a:fontRef>
+        </p:style>
+        <p:txBody>
+          <a:bodyPr rtlCol="0" anchor="ctr"/>
+          <a:lstStyle/>
+          <a:p>
+            <a:pPr algn="ctr"/>
+            <a:endParaRPr lang="de-DE"/>
+          </a:p>
+        </p:txBody>
+      </p:sp>
+      <p:sp>
+        <p:nvSpPr>
+          <p:cNvPr id="51" name="State_Type_11">
+            <a:extLst>
+              <a:ext uri="{FF2B5EF4-FFF2-40B4-BE49-F238E27FC236}">
+                <a16:creationId xmlns:a16="http://schemas.microsoft.com/office/drawing/2014/main" id="{6BBF5B4E-804D-AA78-2DD3-D37DEFEC4B8D}"/>
+              </a:ext>
+            </a:extLst>
+          </p:cNvPr>
+          <p:cNvSpPr>
+            <a:spLocks noGrp="1"/>
+          </p:cNvSpPr>
+          <p:nvPr>
+            <p:ph idx="31"/>
+          </p:nvPr>
+        </p:nvSpPr>
+        <p:spPr>
+          <a:xfrm>
+            <a:off x="7667607" y="4084677"/>
+            <a:ext cx="3200400" cy="365760"/>
+          </a:xfrm>
+        </p:spPr>
+        <p:txBody>
+          <a:bodyPr anchor="ctr">
+            <a:noAutofit/>
+          </a:bodyPr>
+          <a:lstStyle>
+            <a:lvl1pPr marL="0" indent="0" algn="r">
+              <a:spcBef>
+                <a:spcPts val="400"/>
+              </a:spcBef>
+              <a:buNone/>
+              <a:defRPr lang="de-DE" sz="1800" b="1" kern="1200" dirty="0">
+                <a:solidFill>
+                  <a:schemeClr val="bg1"/>
+                </a:solidFill>
+                <a:latin typeface="Segoe UI Light" panose="020B0502040204020203" pitchFamily="34" charset="0"/>
+                <a:ea typeface="+mn-ea"/>
+                <a:cs typeface="Segoe UI Light" panose="020B0502040204020203" pitchFamily="34" charset="0"/>
+              </a:defRPr>
+            </a:lvl1pPr>
+            <a:lvl2pPr marL="457200" indent="0" algn="ctr">
+              <a:buNone/>
+              <a:defRPr sz="2800" b="1">
+                <a:latin typeface="Segoe UI Light" panose="020B0502040204020203" pitchFamily="34" charset="0"/>
+                <a:cs typeface="Segoe UI Light" panose="020B0502040204020203" pitchFamily="34" charset="0"/>
+              </a:defRPr>
+            </a:lvl2pPr>
+            <a:lvl3pPr marL="914400" indent="0" algn="ctr">
+              <a:buNone/>
+              <a:defRPr sz="2800" b="1">
+                <a:latin typeface="Segoe UI Light" panose="020B0502040204020203" pitchFamily="34" charset="0"/>
+                <a:cs typeface="Segoe UI Light" panose="020B0502040204020203" pitchFamily="34" charset="0"/>
+              </a:defRPr>
+            </a:lvl3pPr>
+            <a:lvl4pPr marL="1371600" indent="0" algn="ctr">
+              <a:buNone/>
+              <a:defRPr sz="2800" b="1">
+                <a:latin typeface="Segoe UI Light" panose="020B0502040204020203" pitchFamily="34" charset="0"/>
+                <a:cs typeface="Segoe UI Light" panose="020B0502040204020203" pitchFamily="34" charset="0"/>
+              </a:defRPr>
+            </a:lvl4pPr>
+            <a:lvl5pPr marL="1828800" indent="0" algn="ctr">
+              <a:buNone/>
+              <a:defRPr sz="2800" b="1">
+                <a:latin typeface="Segoe UI Light" panose="020B0502040204020203" pitchFamily="34" charset="0"/>
+                <a:cs typeface="Segoe UI Light" panose="020B0502040204020203" pitchFamily="34" charset="0"/>
+              </a:defRPr>
+            </a:lvl5pPr>
+          </a:lstStyle>
+          <a:p>
+            <a:pPr lvl="0"/>
+            <a:endParaRPr lang="de-DE" dirty="0"/>
+          </a:p>
+        </p:txBody>
+      </p:sp>
+      <p:sp>
+        <p:nvSpPr>
+          <p:cNvPr id="52" name="State_Count_11">
+            <a:extLst>
+              <a:ext uri="{FF2B5EF4-FFF2-40B4-BE49-F238E27FC236}">
+                <a16:creationId xmlns:a16="http://schemas.microsoft.com/office/drawing/2014/main" id="{79560872-1E20-2014-F4E2-E8415233EB6B}"/>
+              </a:ext>
+            </a:extLst>
+          </p:cNvPr>
+          <p:cNvSpPr>
+            <a:spLocks noGrp="1"/>
+          </p:cNvSpPr>
+          <p:nvPr>
+            <p:ph idx="32"/>
+          </p:nvPr>
+        </p:nvSpPr>
+        <p:spPr>
+          <a:xfrm>
+            <a:off x="10868007" y="4084676"/>
+            <a:ext cx="640080" cy="365760"/>
+          </a:xfrm>
+        </p:spPr>
+        <p:txBody>
+          <a:bodyPr anchor="ctr">
+            <a:noAutofit/>
+          </a:bodyPr>
+          <a:lstStyle>
+            <a:lvl1pPr marL="0" indent="0" algn="ctr">
+              <a:spcBef>
+                <a:spcPts val="400"/>
+              </a:spcBef>
+              <a:buNone/>
+              <a:defRPr lang="de-DE" sz="1800" b="1" kern="1200" dirty="0">
+                <a:solidFill>
+                  <a:schemeClr val="bg1"/>
+                </a:solidFill>
+                <a:latin typeface="Segoe UI Light" panose="020B0502040204020203" pitchFamily="34" charset="0"/>
+                <a:ea typeface="+mn-ea"/>
+                <a:cs typeface="Segoe UI Light" panose="020B0502040204020203" pitchFamily="34" charset="0"/>
+              </a:defRPr>
+            </a:lvl1pPr>
+            <a:lvl2pPr marL="457200" indent="0" algn="ctr">
+              <a:buNone/>
+              <a:defRPr sz="2800" b="1">
+                <a:latin typeface="Segoe UI Light" panose="020B0502040204020203" pitchFamily="34" charset="0"/>
+                <a:cs typeface="Segoe UI Light" panose="020B0502040204020203" pitchFamily="34" charset="0"/>
+              </a:defRPr>
+            </a:lvl2pPr>
+            <a:lvl3pPr marL="914400" indent="0" algn="ctr">
+              <a:buNone/>
+              <a:defRPr sz="2800" b="1">
+                <a:latin typeface="Segoe UI Light" panose="020B0502040204020203" pitchFamily="34" charset="0"/>
+                <a:cs typeface="Segoe UI Light" panose="020B0502040204020203" pitchFamily="34" charset="0"/>
+              </a:defRPr>
+            </a:lvl3pPr>
+            <a:lvl4pPr marL="1371600" indent="0" algn="ctr">
+              <a:buNone/>
+              <a:defRPr sz="2800" b="1">
+                <a:latin typeface="Segoe UI Light" panose="020B0502040204020203" pitchFamily="34" charset="0"/>
+                <a:cs typeface="Segoe UI Light" panose="020B0502040204020203" pitchFamily="34" charset="0"/>
+              </a:defRPr>
+            </a:lvl4pPr>
+            <a:lvl5pPr marL="1828800" indent="0" algn="ctr">
+              <a:buNone/>
+              <a:defRPr sz="2800" b="1">
+                <a:latin typeface="Segoe UI Light" panose="020B0502040204020203" pitchFamily="34" charset="0"/>
+                <a:cs typeface="Segoe UI Light" panose="020B0502040204020203" pitchFamily="34" charset="0"/>
+              </a:defRPr>
+            </a:lvl5pPr>
+          </a:lstStyle>
+          <a:p>
+            <a:pPr lvl="0"/>
+            <a:endParaRPr lang="de-DE" dirty="0"/>
+          </a:p>
+        </p:txBody>
+      </p:sp>
+      <p:sp>
+        <p:nvSpPr>
+          <p:cNvPr id="53" name="State_Background_12">
+            <a:extLst>
+              <a:ext uri="{FF2B5EF4-FFF2-40B4-BE49-F238E27FC236}">
+                <a16:creationId xmlns:a16="http://schemas.microsoft.com/office/drawing/2014/main" id="{1EF2344D-2ED4-E407-F32F-8AEA2509CE65}"/>
+              </a:ext>
+            </a:extLst>
+          </p:cNvPr>
+          <p:cNvSpPr/>
+          <p:nvPr userDrawn="1"/>
+        </p:nvSpPr>
+        <p:spPr>
+          <a:xfrm>
+            <a:off x="7667607" y="4602790"/>
+            <a:ext cx="3840480" cy="365760"/>
+          </a:xfrm>
+          <a:prstGeom prst="rect">
+            <a:avLst/>
+          </a:prstGeom>
+          <a:gradFill flip="none" rotWithShape="1">
+            <a:gsLst>
+              <a:gs pos="0">
+                <a:srgbClr val="0279D4"/>
+              </a:gs>
+              <a:gs pos="100000">
+                <a:srgbClr val="549BEC"/>
+              </a:gs>
+            </a:gsLst>
+            <a:lin ang="2700000" scaled="1"/>
+            <a:tileRect/>
+          </a:gradFill>
+          <a:ln>
+            <a:noFill/>
+          </a:ln>
+        </p:spPr>
+        <p:style>
+          <a:lnRef idx="2">
+            <a:schemeClr val="accent1">
+              <a:shade val="15000"/>
+            </a:schemeClr>
+          </a:lnRef>
+          <a:fillRef idx="1">
+            <a:schemeClr val="accent1"/>
+          </a:fillRef>
+          <a:effectRef idx="0">
+            <a:schemeClr val="accent1"/>
+          </a:effectRef>
+          <a:fontRef idx="minor">
+            <a:schemeClr val="lt1"/>
+          </a:fontRef>
+        </p:style>
+        <p:txBody>
+          <a:bodyPr rtlCol="0" anchor="ctr"/>
+          <a:lstStyle/>
+          <a:p>
+            <a:pPr algn="ctr"/>
+            <a:endParaRPr lang="de-DE"/>
+          </a:p>
+        </p:txBody>
+      </p:sp>
+      <p:sp>
+        <p:nvSpPr>
+          <p:cNvPr id="54" name="State_Type_12">
+            <a:extLst>
+              <a:ext uri="{FF2B5EF4-FFF2-40B4-BE49-F238E27FC236}">
+                <a16:creationId xmlns:a16="http://schemas.microsoft.com/office/drawing/2014/main" id="{29D85A0C-F099-0E1E-8ADD-4109AD7135FE}"/>
+              </a:ext>
+            </a:extLst>
+          </p:cNvPr>
+          <p:cNvSpPr>
+            <a:spLocks noGrp="1"/>
+          </p:cNvSpPr>
+          <p:nvPr>
+            <p:ph idx="33"/>
+          </p:nvPr>
+        </p:nvSpPr>
+        <p:spPr>
+          <a:xfrm>
+            <a:off x="7667607" y="4602791"/>
+            <a:ext cx="3200400" cy="365760"/>
+          </a:xfrm>
+        </p:spPr>
+        <p:txBody>
+          <a:bodyPr anchor="ctr">
+            <a:noAutofit/>
+          </a:bodyPr>
+          <a:lstStyle>
+            <a:lvl1pPr marL="0" indent="0" algn="r">
+              <a:spcBef>
+                <a:spcPts val="400"/>
+              </a:spcBef>
+              <a:buNone/>
+              <a:defRPr lang="de-DE" sz="1800" b="1" kern="1200" dirty="0">
+                <a:solidFill>
+                  <a:schemeClr val="bg1"/>
+                </a:solidFill>
+                <a:latin typeface="Segoe UI Light" panose="020B0502040204020203" pitchFamily="34" charset="0"/>
+                <a:ea typeface="+mn-ea"/>
+                <a:cs typeface="Segoe UI Light" panose="020B0502040204020203" pitchFamily="34" charset="0"/>
+              </a:defRPr>
+            </a:lvl1pPr>
+            <a:lvl2pPr marL="457200" indent="0" algn="ctr">
+              <a:buNone/>
+              <a:defRPr sz="2800" b="1">
+                <a:latin typeface="Segoe UI Light" panose="020B0502040204020203" pitchFamily="34" charset="0"/>
+                <a:cs typeface="Segoe UI Light" panose="020B0502040204020203" pitchFamily="34" charset="0"/>
+              </a:defRPr>
+            </a:lvl2pPr>
+            <a:lvl3pPr marL="914400" indent="0" algn="ctr">
+              <a:buNone/>
+              <a:defRPr sz="2800" b="1">
+                <a:latin typeface="Segoe UI Light" panose="020B0502040204020203" pitchFamily="34" charset="0"/>
+                <a:cs typeface="Segoe UI Light" panose="020B0502040204020203" pitchFamily="34" charset="0"/>
+              </a:defRPr>
+            </a:lvl3pPr>
+            <a:lvl4pPr marL="1371600" indent="0" algn="ctr">
+              <a:buNone/>
+              <a:defRPr sz="2800" b="1">
+                <a:latin typeface="Segoe UI Light" panose="020B0502040204020203" pitchFamily="34" charset="0"/>
+                <a:cs typeface="Segoe UI Light" panose="020B0502040204020203" pitchFamily="34" charset="0"/>
+              </a:defRPr>
+            </a:lvl4pPr>
+            <a:lvl5pPr marL="1828800" indent="0" algn="ctr">
+              <a:buNone/>
+              <a:defRPr sz="2800" b="1">
+                <a:latin typeface="Segoe UI Light" panose="020B0502040204020203" pitchFamily="34" charset="0"/>
+                <a:cs typeface="Segoe UI Light" panose="020B0502040204020203" pitchFamily="34" charset="0"/>
+              </a:defRPr>
+            </a:lvl5pPr>
+          </a:lstStyle>
+          <a:p>
+            <a:pPr lvl="0"/>
+            <a:endParaRPr lang="de-DE" dirty="0"/>
+          </a:p>
+        </p:txBody>
+      </p:sp>
+      <p:sp>
+        <p:nvSpPr>
+          <p:cNvPr id="55" name="State_Count_12">
+            <a:extLst>
+              <a:ext uri="{FF2B5EF4-FFF2-40B4-BE49-F238E27FC236}">
+                <a16:creationId xmlns:a16="http://schemas.microsoft.com/office/drawing/2014/main" id="{A03D232E-FF76-8B83-3D2A-97E99924D5B4}"/>
+              </a:ext>
+            </a:extLst>
+          </p:cNvPr>
+          <p:cNvSpPr>
+            <a:spLocks noGrp="1"/>
+          </p:cNvSpPr>
+          <p:nvPr>
+            <p:ph idx="34"/>
+          </p:nvPr>
+        </p:nvSpPr>
+        <p:spPr>
+          <a:xfrm>
+            <a:off x="10868007" y="4602790"/>
+            <a:ext cx="640080" cy="365760"/>
+          </a:xfrm>
+        </p:spPr>
+        <p:txBody>
+          <a:bodyPr anchor="ctr">
+            <a:noAutofit/>
+          </a:bodyPr>
+          <a:lstStyle>
+            <a:lvl1pPr marL="0" indent="0" algn="ctr">
+              <a:spcBef>
+                <a:spcPts val="400"/>
+              </a:spcBef>
+              <a:buNone/>
+              <a:defRPr lang="de-DE" sz="1800" b="1" kern="1200" dirty="0">
+                <a:solidFill>
+                  <a:schemeClr val="bg1"/>
+                </a:solidFill>
+                <a:latin typeface="Segoe UI Light" panose="020B0502040204020203" pitchFamily="34" charset="0"/>
+                <a:ea typeface="+mn-ea"/>
+                <a:cs typeface="Segoe UI Light" panose="020B0502040204020203" pitchFamily="34" charset="0"/>
+              </a:defRPr>
+            </a:lvl1pPr>
+            <a:lvl2pPr marL="457200" indent="0" algn="ctr">
+              <a:buNone/>
+              <a:defRPr sz="2800" b="1">
+                <a:latin typeface="Segoe UI Light" panose="020B0502040204020203" pitchFamily="34" charset="0"/>
+                <a:cs typeface="Segoe UI Light" panose="020B0502040204020203" pitchFamily="34" charset="0"/>
+              </a:defRPr>
+            </a:lvl2pPr>
+            <a:lvl3pPr marL="914400" indent="0" algn="ctr">
+              <a:buNone/>
+              <a:defRPr sz="2800" b="1">
+                <a:latin typeface="Segoe UI Light" panose="020B0502040204020203" pitchFamily="34" charset="0"/>
+                <a:cs typeface="Segoe UI Light" panose="020B0502040204020203" pitchFamily="34" charset="0"/>
+              </a:defRPr>
+            </a:lvl3pPr>
+            <a:lvl4pPr marL="1371600" indent="0" algn="ctr">
+              <a:buNone/>
+              <a:defRPr sz="2800" b="1">
+                <a:latin typeface="Segoe UI Light" panose="020B0502040204020203" pitchFamily="34" charset="0"/>
+                <a:cs typeface="Segoe UI Light" panose="020B0502040204020203" pitchFamily="34" charset="0"/>
+              </a:defRPr>
+            </a:lvl4pPr>
+            <a:lvl5pPr marL="1828800" indent="0" algn="ctr">
+              <a:buNone/>
+              <a:defRPr sz="2800" b="1">
+                <a:latin typeface="Segoe UI Light" panose="020B0502040204020203" pitchFamily="34" charset="0"/>
+                <a:cs typeface="Segoe UI Light" panose="020B0502040204020203" pitchFamily="34" charset="0"/>
+              </a:defRPr>
+            </a:lvl5pPr>
+          </a:lstStyle>
+          <a:p>
+            <a:pPr lvl="0"/>
+            <a:endParaRPr lang="de-DE" dirty="0"/>
           </a:p>
         </p:txBody>
       </p:sp>
@@ -1795,7 +4463,7 @@
           <a:p>
             <a:fld id="{506867F6-8C78-486A-93BF-FCE4C882B7D7}" type="datetimeFigureOut">
               <a:rPr lang="de-DE" smtClean="0"/>
-              <a:t>10.01.2024</a:t>
+              <a:t>01.02.2024</a:t>
             </a:fld>
             <a:endParaRPr lang="de-DE"/>
           </a:p>

</xml_diff>

<commit_message>
Added file name from env file functionality @Pla5ma
</commit_message>
<xml_diff>
--- a/PPTXExportPlugin/PPTXExportPlugin_Template.pptx
+++ b/PPTXExportPlugin/PPTXExportPlugin_Template.pptx
@@ -1007,7 +1007,7 @@
       </p:sp>
       <p:sp>
         <p:nvSpPr>
-          <p:cNvPr id="5" name="Changes background">
+          <p:cNvPr id="5" name="Items_Background">
             <a:extLst>
               <a:ext uri="{FF2B5EF4-FFF2-40B4-BE49-F238E27FC236}">
                 <a16:creationId xmlns:a16="http://schemas.microsoft.com/office/drawing/2014/main" id="{256EE8F2-DE04-5DAC-1E60-581E8C72208C}"/>
@@ -1019,8 +1019,8 @@
         </p:nvSpPr>
         <p:spPr>
           <a:xfrm>
-            <a:off x="993913" y="1993126"/>
-            <a:ext cx="1371600" cy="1371600"/>
+            <a:off x="157655" y="1516080"/>
+            <a:ext cx="1371600" cy="1401986"/>
           </a:xfrm>
           <a:prstGeom prst="rect">
             <a:avLst/>
@@ -1068,7 +1068,7 @@
       </p:sp>
       <p:sp>
         <p:nvSpPr>
-          <p:cNvPr id="3" name="Content1">
+          <p:cNvPr id="3" name="Items_Content">
             <a:extLst>
               <a:ext uri="{FF2B5EF4-FFF2-40B4-BE49-F238E27FC236}">
                 <a16:creationId xmlns:a16="http://schemas.microsoft.com/office/drawing/2014/main" id="{75533CEB-DBFF-06E5-8302-EBE4F9E15F08}"/>
@@ -1084,8 +1084,8 @@
         </p:nvSpPr>
         <p:spPr>
           <a:xfrm>
-            <a:off x="993913" y="2362458"/>
-            <a:ext cx="1371600" cy="1002268"/>
+            <a:off x="157655" y="1885412"/>
+            <a:ext cx="1371600" cy="1032654"/>
           </a:xfrm>
         </p:spPr>
         <p:txBody>
@@ -1143,7 +1143,7 @@
       </p:sp>
       <p:sp>
         <p:nvSpPr>
-          <p:cNvPr id="4" name="Changes background">
+          <p:cNvPr id="4" name="Changes_Background">
             <a:extLst>
               <a:ext uri="{FF2B5EF4-FFF2-40B4-BE49-F238E27FC236}">
                 <a16:creationId xmlns:a16="http://schemas.microsoft.com/office/drawing/2014/main" id="{EA28A555-4BD1-09D1-9794-5337C5B74973}"/>
@@ -1155,8 +1155,8 @@
         </p:nvSpPr>
         <p:spPr>
           <a:xfrm>
-            <a:off x="2562989" y="1993126"/>
-            <a:ext cx="1371600" cy="1371600"/>
+            <a:off x="1702968" y="1516079"/>
+            <a:ext cx="1371600" cy="1401987"/>
           </a:xfrm>
           <a:prstGeom prst="rect">
             <a:avLst/>
@@ -1204,52 +1204,7 @@
       </p:sp>
       <p:sp>
         <p:nvSpPr>
-          <p:cNvPr id="8" name="Header2">
-            <a:extLst>
-              <a:ext uri="{FF2B5EF4-FFF2-40B4-BE49-F238E27FC236}">
-                <a16:creationId xmlns:a16="http://schemas.microsoft.com/office/drawing/2014/main" id="{C0A962BF-A7D6-A297-3540-02133A8A35CC}"/>
-              </a:ext>
-            </a:extLst>
-          </p:cNvPr>
-          <p:cNvSpPr txBox="1"/>
-          <p:nvPr userDrawn="1"/>
-        </p:nvSpPr>
-        <p:spPr>
-          <a:xfrm>
-            <a:off x="2562989" y="1993126"/>
-            <a:ext cx="1371600" cy="369332"/>
-          </a:xfrm>
-          <a:prstGeom prst="rect">
-            <a:avLst/>
-          </a:prstGeom>
-          <a:noFill/>
-        </p:spPr>
-        <p:txBody>
-          <a:bodyPr wrap="square" rtlCol="0">
-            <a:spAutoFit/>
-          </a:bodyPr>
-          <a:lstStyle/>
-          <a:p>
-            <a:pPr algn="ctr"/>
-            <a:r>
-              <a:rPr lang="en-US" dirty="0">
-                <a:solidFill>
-                  <a:schemeClr val="bg1"/>
-                </a:solidFill>
-              </a:rPr>
-              <a:t>Changes</a:t>
-            </a:r>
-            <a:endParaRPr lang="de-DE" dirty="0">
-              <a:solidFill>
-                <a:schemeClr val="bg1"/>
-              </a:solidFill>
-            </a:endParaRPr>
-          </a:p>
-        </p:txBody>
-      </p:sp>
-      <p:sp>
-        <p:nvSpPr>
-          <p:cNvPr id="9" name="Content2">
+          <p:cNvPr id="9" name="Changes_Content">
             <a:extLst>
               <a:ext uri="{FF2B5EF4-FFF2-40B4-BE49-F238E27FC236}">
                 <a16:creationId xmlns:a16="http://schemas.microsoft.com/office/drawing/2014/main" id="{A2B0BED6-651E-6877-AB8C-6D8C8271825A}"/>
@@ -1265,8 +1220,8 @@
         </p:nvSpPr>
         <p:spPr>
           <a:xfrm>
-            <a:off x="2562989" y="2362458"/>
-            <a:ext cx="1371600" cy="1002268"/>
+            <a:off x="1702968" y="1885412"/>
+            <a:ext cx="1371600" cy="1032654"/>
           </a:xfrm>
         </p:spPr>
         <p:txBody>
@@ -1324,10 +1279,281 @@
       </p:sp>
       <p:sp>
         <p:nvSpPr>
-          <p:cNvPr id="10" name="Header1">
-            <a:extLst>
-              <a:ext uri="{FF2B5EF4-FFF2-40B4-BE49-F238E27FC236}">
-                <a16:creationId xmlns:a16="http://schemas.microsoft.com/office/drawing/2014/main" id="{DE4AE299-49F6-B334-2BE3-233B20A7B0FF}"/>
+          <p:cNvPr id="6" name="States_Title">
+            <a:extLst>
+              <a:ext uri="{FF2B5EF4-FFF2-40B4-BE49-F238E27FC236}">
+                <a16:creationId xmlns:a16="http://schemas.microsoft.com/office/drawing/2014/main" id="{74F79346-9735-A75F-B1CC-77193E5CB7A1}"/>
+              </a:ext>
+            </a:extLst>
+          </p:cNvPr>
+          <p:cNvSpPr/>
+          <p:nvPr userDrawn="1"/>
+        </p:nvSpPr>
+        <p:spPr>
+          <a:xfrm>
+            <a:off x="3673309" y="1519652"/>
+            <a:ext cx="7834778" cy="365760"/>
+          </a:xfrm>
+          <a:prstGeom prst="rect">
+            <a:avLst/>
+          </a:prstGeom>
+          <a:gradFill flip="none" rotWithShape="1">
+            <a:gsLst>
+              <a:gs pos="0">
+                <a:srgbClr val="0279D4"/>
+              </a:gs>
+              <a:gs pos="100000">
+                <a:srgbClr val="549BEC"/>
+              </a:gs>
+            </a:gsLst>
+            <a:lin ang="2700000" scaled="1"/>
+            <a:tileRect/>
+          </a:gradFill>
+          <a:ln>
+            <a:noFill/>
+          </a:ln>
+        </p:spPr>
+        <p:style>
+          <a:lnRef idx="2">
+            <a:schemeClr val="accent1">
+              <a:shade val="15000"/>
+            </a:schemeClr>
+          </a:lnRef>
+          <a:fillRef idx="1">
+            <a:schemeClr val="accent1"/>
+          </a:fillRef>
+          <a:effectRef idx="0">
+            <a:schemeClr val="accent1"/>
+          </a:effectRef>
+          <a:fontRef idx="minor">
+            <a:schemeClr val="lt1"/>
+          </a:fontRef>
+        </p:style>
+        <p:txBody>
+          <a:bodyPr rtlCol="0" anchor="ctr"/>
+          <a:lstStyle/>
+          <a:p>
+            <a:pPr algn="ctr"/>
+            <a:endParaRPr lang="de-DE"/>
+          </a:p>
+        </p:txBody>
+      </p:sp>
+      <p:sp>
+        <p:nvSpPr>
+          <p:cNvPr id="8" name="States_Background">
+            <a:extLst>
+              <a:ext uri="{FF2B5EF4-FFF2-40B4-BE49-F238E27FC236}">
+                <a16:creationId xmlns:a16="http://schemas.microsoft.com/office/drawing/2014/main" id="{94348EE3-D5F7-A767-6FFA-CDDE8F96AB0C}"/>
+              </a:ext>
+            </a:extLst>
+          </p:cNvPr>
+          <p:cNvSpPr txBox="1"/>
+          <p:nvPr userDrawn="1"/>
+        </p:nvSpPr>
+        <p:spPr>
+          <a:xfrm>
+            <a:off x="3673308" y="1511074"/>
+            <a:ext cx="7834778" cy="369332"/>
+          </a:xfrm>
+          <a:prstGeom prst="rect">
+            <a:avLst/>
+          </a:prstGeom>
+          <a:noFill/>
+        </p:spPr>
+        <p:txBody>
+          <a:bodyPr wrap="square" rtlCol="0" anchor="ctr">
+            <a:spAutoFit/>
+          </a:bodyPr>
+          <a:lstStyle/>
+          <a:p>
+            <a:pPr algn="ctr"/>
+            <a:r>
+              <a:rPr lang="en-US" b="1" dirty="0">
+                <a:solidFill>
+                  <a:schemeClr val="bg1"/>
+                </a:solidFill>
+                <a:latin typeface="Segoe UI" panose="020B0502040204020203" pitchFamily="34" charset="0"/>
+                <a:cs typeface="Segoe UI" panose="020B0502040204020203" pitchFamily="34" charset="0"/>
+              </a:rPr>
+              <a:t>States of changed items</a:t>
+            </a:r>
+            <a:endParaRPr lang="de-DE" b="1" dirty="0">
+              <a:solidFill>
+                <a:schemeClr val="bg1"/>
+              </a:solidFill>
+              <a:latin typeface="Segoe UI" panose="020B0502040204020203" pitchFamily="34" charset="0"/>
+              <a:cs typeface="Segoe UI" panose="020B0502040204020203" pitchFamily="34" charset="0"/>
+            </a:endParaRPr>
+          </a:p>
+        </p:txBody>
+      </p:sp>
+      <p:sp>
+        <p:nvSpPr>
+          <p:cNvPr id="13" name="Changes_Title">
+            <a:extLst>
+              <a:ext uri="{FF2B5EF4-FFF2-40B4-BE49-F238E27FC236}">
+                <a16:creationId xmlns:a16="http://schemas.microsoft.com/office/drawing/2014/main" id="{82C29D6F-0E48-9214-0B35-AE90C780EFFF}"/>
+              </a:ext>
+            </a:extLst>
+          </p:cNvPr>
+          <p:cNvSpPr txBox="1"/>
+          <p:nvPr userDrawn="1"/>
+        </p:nvSpPr>
+        <p:spPr>
+          <a:xfrm>
+            <a:off x="1702968" y="1516080"/>
+            <a:ext cx="1371600" cy="369332"/>
+          </a:xfrm>
+          <a:prstGeom prst="rect">
+            <a:avLst/>
+          </a:prstGeom>
+          <a:noFill/>
+        </p:spPr>
+        <p:txBody>
+          <a:bodyPr wrap="square" rtlCol="0" anchor="ctr">
+            <a:spAutoFit/>
+          </a:bodyPr>
+          <a:lstStyle/>
+          <a:p>
+            <a:pPr algn="ctr"/>
+            <a:r>
+              <a:rPr lang="en-US" b="1" dirty="0">
+                <a:solidFill>
+                  <a:schemeClr val="bg1"/>
+                </a:solidFill>
+                <a:latin typeface="Segoe UI" panose="020B0502040204020203" pitchFamily="34" charset="0"/>
+                <a:ea typeface="Segoe UI Black" panose="020B0A02040204020203" pitchFamily="34" charset="0"/>
+                <a:cs typeface="Segoe UI" panose="020B0502040204020203" pitchFamily="34" charset="0"/>
+              </a:rPr>
+              <a:t>Changes</a:t>
+            </a:r>
+            <a:endParaRPr lang="de-DE" b="1" dirty="0">
+              <a:solidFill>
+                <a:schemeClr val="bg1"/>
+              </a:solidFill>
+              <a:latin typeface="Segoe UI" panose="020B0502040204020203" pitchFamily="34" charset="0"/>
+              <a:ea typeface="Segoe UI Black" panose="020B0A02040204020203" pitchFamily="34" charset="0"/>
+              <a:cs typeface="Segoe UI" panose="020B0502040204020203" pitchFamily="34" charset="0"/>
+            </a:endParaRPr>
+          </a:p>
+        </p:txBody>
+      </p:sp>
+      <p:sp>
+        <p:nvSpPr>
+          <p:cNvPr id="12" name="Items_Title">
+            <a:extLst>
+              <a:ext uri="{FF2B5EF4-FFF2-40B4-BE49-F238E27FC236}">
+                <a16:creationId xmlns:a16="http://schemas.microsoft.com/office/drawing/2014/main" id="{720ECD43-E781-4D3F-B159-772FC18FE7F2}"/>
+              </a:ext>
+            </a:extLst>
+          </p:cNvPr>
+          <p:cNvSpPr txBox="1"/>
+          <p:nvPr userDrawn="1"/>
+        </p:nvSpPr>
+        <p:spPr>
+          <a:xfrm>
+            <a:off x="157655" y="1516080"/>
+            <a:ext cx="1371600" cy="369332"/>
+          </a:xfrm>
+          <a:prstGeom prst="rect">
+            <a:avLst/>
+          </a:prstGeom>
+          <a:noFill/>
+        </p:spPr>
+        <p:txBody>
+          <a:bodyPr wrap="square" rtlCol="0" anchor="ctr">
+            <a:spAutoFit/>
+          </a:bodyPr>
+          <a:lstStyle/>
+          <a:p>
+            <a:pPr algn="ctr"/>
+            <a:r>
+              <a:rPr lang="en-US" b="1" dirty="0">
+                <a:solidFill>
+                  <a:schemeClr val="bg1"/>
+                </a:solidFill>
+                <a:latin typeface="Segoe UI" panose="020B0502040204020203" pitchFamily="34" charset="0"/>
+                <a:cs typeface="Segoe UI" panose="020B0502040204020203" pitchFamily="34" charset="0"/>
+              </a:rPr>
+              <a:t>Items</a:t>
+            </a:r>
+            <a:endParaRPr lang="de-DE" b="1" dirty="0">
+              <a:solidFill>
+                <a:schemeClr val="bg1"/>
+              </a:solidFill>
+              <a:latin typeface="Segoe UI" panose="020B0502040204020203" pitchFamily="34" charset="0"/>
+              <a:cs typeface="Segoe UI" panose="020B0502040204020203" pitchFamily="34" charset="0"/>
+            </a:endParaRPr>
+          </a:p>
+        </p:txBody>
+      </p:sp>
+      <p:sp>
+        <p:nvSpPr>
+          <p:cNvPr id="15" name="State_Background_1">
+            <a:extLst>
+              <a:ext uri="{FF2B5EF4-FFF2-40B4-BE49-F238E27FC236}">
+                <a16:creationId xmlns:a16="http://schemas.microsoft.com/office/drawing/2014/main" id="{2E849DD4-D7C5-E7E7-AB20-6B7C437D9CD7}"/>
+              </a:ext>
+            </a:extLst>
+          </p:cNvPr>
+          <p:cNvSpPr/>
+          <p:nvPr userDrawn="1"/>
+        </p:nvSpPr>
+        <p:spPr>
+          <a:xfrm>
+            <a:off x="3673309" y="2046342"/>
+            <a:ext cx="3840480" cy="365760"/>
+          </a:xfrm>
+          <a:prstGeom prst="rect">
+            <a:avLst/>
+          </a:prstGeom>
+          <a:gradFill flip="none" rotWithShape="1">
+            <a:gsLst>
+              <a:gs pos="0">
+                <a:srgbClr val="0279D4"/>
+              </a:gs>
+              <a:gs pos="100000">
+                <a:srgbClr val="549BEC"/>
+              </a:gs>
+            </a:gsLst>
+            <a:lin ang="2700000" scaled="1"/>
+            <a:tileRect/>
+          </a:gradFill>
+          <a:ln>
+            <a:noFill/>
+          </a:ln>
+        </p:spPr>
+        <p:style>
+          <a:lnRef idx="2">
+            <a:schemeClr val="accent1">
+              <a:shade val="15000"/>
+            </a:schemeClr>
+          </a:lnRef>
+          <a:fillRef idx="1">
+            <a:schemeClr val="accent1"/>
+          </a:fillRef>
+          <a:effectRef idx="0">
+            <a:schemeClr val="accent1"/>
+          </a:effectRef>
+          <a:fontRef idx="minor">
+            <a:schemeClr val="lt1"/>
+          </a:fontRef>
+        </p:style>
+        <p:txBody>
+          <a:bodyPr rtlCol="0" anchor="ctr"/>
+          <a:lstStyle/>
+          <a:p>
+            <a:pPr algn="ctr"/>
+            <a:endParaRPr lang="de-DE"/>
+          </a:p>
+        </p:txBody>
+      </p:sp>
+      <p:sp>
+        <p:nvSpPr>
+          <p:cNvPr id="16" name="State_Type_1">
+            <a:extLst>
+              <a:ext uri="{FF2B5EF4-FFF2-40B4-BE49-F238E27FC236}">
+                <a16:creationId xmlns:a16="http://schemas.microsoft.com/office/drawing/2014/main" id="{4F4EE6C1-5218-19E9-ACD1-DD0E1CE5CE5F}"/>
               </a:ext>
             </a:extLst>
           </p:cNvPr>
@@ -1340,8 +1566,84 @@
         </p:nvSpPr>
         <p:spPr>
           <a:xfrm>
-            <a:off x="993913" y="1993126"/>
-            <a:ext cx="1371600" cy="369332"/>
+            <a:off x="3673309" y="2046343"/>
+            <a:ext cx="3200400" cy="365760"/>
+          </a:xfrm>
+        </p:spPr>
+        <p:txBody>
+          <a:bodyPr anchor="ctr">
+            <a:noAutofit/>
+          </a:bodyPr>
+          <a:lstStyle>
+            <a:lvl1pPr marL="0" indent="0" algn="r">
+              <a:spcBef>
+                <a:spcPts val="400"/>
+              </a:spcBef>
+              <a:buNone/>
+              <a:defRPr lang="de-DE" sz="1800" b="1" kern="1200" dirty="0">
+                <a:solidFill>
+                  <a:schemeClr val="bg1"/>
+                </a:solidFill>
+                <a:latin typeface="Segoe UI Light" panose="020B0502040204020203" pitchFamily="34" charset="0"/>
+                <a:ea typeface="+mn-ea"/>
+                <a:cs typeface="Segoe UI Light" panose="020B0502040204020203" pitchFamily="34" charset="0"/>
+              </a:defRPr>
+            </a:lvl1pPr>
+            <a:lvl2pPr marL="457200" indent="0" algn="ctr">
+              <a:buNone/>
+              <a:defRPr sz="2800" b="1">
+                <a:latin typeface="Segoe UI Light" panose="020B0502040204020203" pitchFamily="34" charset="0"/>
+                <a:cs typeface="Segoe UI Light" panose="020B0502040204020203" pitchFamily="34" charset="0"/>
+              </a:defRPr>
+            </a:lvl2pPr>
+            <a:lvl3pPr marL="914400" indent="0" algn="ctr">
+              <a:buNone/>
+              <a:defRPr sz="2800" b="1">
+                <a:latin typeface="Segoe UI Light" panose="020B0502040204020203" pitchFamily="34" charset="0"/>
+                <a:cs typeface="Segoe UI Light" panose="020B0502040204020203" pitchFamily="34" charset="0"/>
+              </a:defRPr>
+            </a:lvl3pPr>
+            <a:lvl4pPr marL="1371600" indent="0" algn="ctr">
+              <a:buNone/>
+              <a:defRPr sz="2800" b="1">
+                <a:latin typeface="Segoe UI Light" panose="020B0502040204020203" pitchFamily="34" charset="0"/>
+                <a:cs typeface="Segoe UI Light" panose="020B0502040204020203" pitchFamily="34" charset="0"/>
+              </a:defRPr>
+            </a:lvl4pPr>
+            <a:lvl5pPr marL="1828800" indent="0" algn="ctr">
+              <a:buNone/>
+              <a:defRPr sz="2800" b="1">
+                <a:latin typeface="Segoe UI Light" panose="020B0502040204020203" pitchFamily="34" charset="0"/>
+                <a:cs typeface="Segoe UI Light" panose="020B0502040204020203" pitchFamily="34" charset="0"/>
+              </a:defRPr>
+            </a:lvl5pPr>
+          </a:lstStyle>
+          <a:p>
+            <a:pPr lvl="0"/>
+            <a:endParaRPr lang="de-DE" dirty="0"/>
+          </a:p>
+        </p:txBody>
+      </p:sp>
+      <p:sp>
+        <p:nvSpPr>
+          <p:cNvPr id="21" name="State_Count_1">
+            <a:extLst>
+              <a:ext uri="{FF2B5EF4-FFF2-40B4-BE49-F238E27FC236}">
+                <a16:creationId xmlns:a16="http://schemas.microsoft.com/office/drawing/2014/main" id="{5C31202A-2E35-8388-C8F4-62CC09A57645}"/>
+              </a:ext>
+            </a:extLst>
+          </p:cNvPr>
+          <p:cNvSpPr>
+            <a:spLocks noGrp="1"/>
+          </p:cNvSpPr>
+          <p:nvPr>
+            <p:ph idx="12"/>
+          </p:nvPr>
+        </p:nvSpPr>
+        <p:spPr>
+          <a:xfrm>
+            <a:off x="6873709" y="2046342"/>
+            <a:ext cx="640080" cy="365760"/>
           </a:xfrm>
         </p:spPr>
         <p:txBody>
@@ -1354,11 +1656,2355 @@
                 <a:spcPts val="400"/>
               </a:spcBef>
               <a:buNone/>
-              <a:defRPr sz="2800" b="1">
+              <a:defRPr lang="de-DE" sz="1800" b="1" kern="1200" dirty="0">
                 <a:solidFill>
                   <a:schemeClr val="bg1"/>
                 </a:solidFill>
                 <a:latin typeface="Segoe UI Light" panose="020B0502040204020203" pitchFamily="34" charset="0"/>
+                <a:ea typeface="+mn-ea"/>
+                <a:cs typeface="Segoe UI Light" panose="020B0502040204020203" pitchFamily="34" charset="0"/>
+              </a:defRPr>
+            </a:lvl1pPr>
+            <a:lvl2pPr marL="457200" indent="0" algn="ctr">
+              <a:buNone/>
+              <a:defRPr sz="2800" b="1">
+                <a:latin typeface="Segoe UI Light" panose="020B0502040204020203" pitchFamily="34" charset="0"/>
+                <a:cs typeface="Segoe UI Light" panose="020B0502040204020203" pitchFamily="34" charset="0"/>
+              </a:defRPr>
+            </a:lvl2pPr>
+            <a:lvl3pPr marL="914400" indent="0" algn="ctr">
+              <a:buNone/>
+              <a:defRPr sz="2800" b="1">
+                <a:latin typeface="Segoe UI Light" panose="020B0502040204020203" pitchFamily="34" charset="0"/>
+                <a:cs typeface="Segoe UI Light" panose="020B0502040204020203" pitchFamily="34" charset="0"/>
+              </a:defRPr>
+            </a:lvl3pPr>
+            <a:lvl4pPr marL="1371600" indent="0" algn="ctr">
+              <a:buNone/>
+              <a:defRPr sz="2800" b="1">
+                <a:latin typeface="Segoe UI Light" panose="020B0502040204020203" pitchFamily="34" charset="0"/>
+                <a:cs typeface="Segoe UI Light" panose="020B0502040204020203" pitchFamily="34" charset="0"/>
+              </a:defRPr>
+            </a:lvl4pPr>
+            <a:lvl5pPr marL="1828800" indent="0" algn="ctr">
+              <a:buNone/>
+              <a:defRPr sz="2800" b="1">
+                <a:latin typeface="Segoe UI Light" panose="020B0502040204020203" pitchFamily="34" charset="0"/>
+                <a:cs typeface="Segoe UI Light" panose="020B0502040204020203" pitchFamily="34" charset="0"/>
+              </a:defRPr>
+            </a:lvl5pPr>
+          </a:lstStyle>
+          <a:p>
+            <a:pPr lvl="0"/>
+            <a:endParaRPr lang="de-DE" dirty="0"/>
+          </a:p>
+        </p:txBody>
+      </p:sp>
+      <p:sp>
+        <p:nvSpPr>
+          <p:cNvPr id="23" name="State_Background_2">
+            <a:extLst>
+              <a:ext uri="{FF2B5EF4-FFF2-40B4-BE49-F238E27FC236}">
+                <a16:creationId xmlns:a16="http://schemas.microsoft.com/office/drawing/2014/main" id="{98B1560E-16B6-203E-3029-0191EEDAFC7B}"/>
+              </a:ext>
+            </a:extLst>
+          </p:cNvPr>
+          <p:cNvSpPr/>
+          <p:nvPr userDrawn="1"/>
+        </p:nvSpPr>
+        <p:spPr>
+          <a:xfrm>
+            <a:off x="3673309" y="2564457"/>
+            <a:ext cx="3840480" cy="365760"/>
+          </a:xfrm>
+          <a:prstGeom prst="rect">
+            <a:avLst/>
+          </a:prstGeom>
+          <a:gradFill flip="none" rotWithShape="1">
+            <a:gsLst>
+              <a:gs pos="0">
+                <a:srgbClr val="0279D4"/>
+              </a:gs>
+              <a:gs pos="100000">
+                <a:srgbClr val="549BEC"/>
+              </a:gs>
+            </a:gsLst>
+            <a:lin ang="2700000" scaled="1"/>
+            <a:tileRect/>
+          </a:gradFill>
+          <a:ln>
+            <a:noFill/>
+          </a:ln>
+        </p:spPr>
+        <p:style>
+          <a:lnRef idx="2">
+            <a:schemeClr val="accent1">
+              <a:shade val="15000"/>
+            </a:schemeClr>
+          </a:lnRef>
+          <a:fillRef idx="1">
+            <a:schemeClr val="accent1"/>
+          </a:fillRef>
+          <a:effectRef idx="0">
+            <a:schemeClr val="accent1"/>
+          </a:effectRef>
+          <a:fontRef idx="minor">
+            <a:schemeClr val="lt1"/>
+          </a:fontRef>
+        </p:style>
+        <p:txBody>
+          <a:bodyPr rtlCol="0" anchor="ctr"/>
+          <a:lstStyle/>
+          <a:p>
+            <a:pPr algn="ctr"/>
+            <a:endParaRPr lang="de-DE"/>
+          </a:p>
+        </p:txBody>
+      </p:sp>
+      <p:sp>
+        <p:nvSpPr>
+          <p:cNvPr id="24" name="State_Type_2">
+            <a:extLst>
+              <a:ext uri="{FF2B5EF4-FFF2-40B4-BE49-F238E27FC236}">
+                <a16:creationId xmlns:a16="http://schemas.microsoft.com/office/drawing/2014/main" id="{613CAF29-A1DA-AF3A-4D4E-174AFDEC3F06}"/>
+              </a:ext>
+            </a:extLst>
+          </p:cNvPr>
+          <p:cNvSpPr>
+            <a:spLocks noGrp="1"/>
+          </p:cNvSpPr>
+          <p:nvPr>
+            <p:ph idx="13"/>
+          </p:nvPr>
+        </p:nvSpPr>
+        <p:spPr>
+          <a:xfrm>
+            <a:off x="3673309" y="2564458"/>
+            <a:ext cx="3200400" cy="365760"/>
+          </a:xfrm>
+        </p:spPr>
+        <p:txBody>
+          <a:bodyPr anchor="ctr">
+            <a:noAutofit/>
+          </a:bodyPr>
+          <a:lstStyle>
+            <a:lvl1pPr marL="0" indent="0" algn="r">
+              <a:spcBef>
+                <a:spcPts val="400"/>
+              </a:spcBef>
+              <a:buNone/>
+              <a:defRPr lang="de-DE" sz="1800" b="1" kern="1200" dirty="0">
+                <a:solidFill>
+                  <a:schemeClr val="bg1"/>
+                </a:solidFill>
+                <a:latin typeface="Segoe UI Light" panose="020B0502040204020203" pitchFamily="34" charset="0"/>
+                <a:ea typeface="+mn-ea"/>
+                <a:cs typeface="Segoe UI Light" panose="020B0502040204020203" pitchFamily="34" charset="0"/>
+              </a:defRPr>
+            </a:lvl1pPr>
+            <a:lvl2pPr marL="457200" indent="0" algn="ctr">
+              <a:buNone/>
+              <a:defRPr sz="2800" b="1">
+                <a:latin typeface="Segoe UI Light" panose="020B0502040204020203" pitchFamily="34" charset="0"/>
+                <a:cs typeface="Segoe UI Light" panose="020B0502040204020203" pitchFamily="34" charset="0"/>
+              </a:defRPr>
+            </a:lvl2pPr>
+            <a:lvl3pPr marL="914400" indent="0" algn="ctr">
+              <a:buNone/>
+              <a:defRPr sz="2800" b="1">
+                <a:latin typeface="Segoe UI Light" panose="020B0502040204020203" pitchFamily="34" charset="0"/>
+                <a:cs typeface="Segoe UI Light" panose="020B0502040204020203" pitchFamily="34" charset="0"/>
+              </a:defRPr>
+            </a:lvl3pPr>
+            <a:lvl4pPr marL="1371600" indent="0" algn="ctr">
+              <a:buNone/>
+              <a:defRPr sz="2800" b="1">
+                <a:latin typeface="Segoe UI Light" panose="020B0502040204020203" pitchFamily="34" charset="0"/>
+                <a:cs typeface="Segoe UI Light" panose="020B0502040204020203" pitchFamily="34" charset="0"/>
+              </a:defRPr>
+            </a:lvl4pPr>
+            <a:lvl5pPr marL="1828800" indent="0" algn="ctr">
+              <a:buNone/>
+              <a:defRPr sz="2800" b="1">
+                <a:latin typeface="Segoe UI Light" panose="020B0502040204020203" pitchFamily="34" charset="0"/>
+                <a:cs typeface="Segoe UI Light" panose="020B0502040204020203" pitchFamily="34" charset="0"/>
+              </a:defRPr>
+            </a:lvl5pPr>
+          </a:lstStyle>
+          <a:p>
+            <a:pPr lvl="0"/>
+            <a:endParaRPr lang="de-DE" dirty="0"/>
+          </a:p>
+        </p:txBody>
+      </p:sp>
+      <p:sp>
+        <p:nvSpPr>
+          <p:cNvPr id="25" name="State_Count_2">
+            <a:extLst>
+              <a:ext uri="{FF2B5EF4-FFF2-40B4-BE49-F238E27FC236}">
+                <a16:creationId xmlns:a16="http://schemas.microsoft.com/office/drawing/2014/main" id="{909591DE-D52B-0654-5C47-0197BBA89A51}"/>
+              </a:ext>
+            </a:extLst>
+          </p:cNvPr>
+          <p:cNvSpPr>
+            <a:spLocks noGrp="1"/>
+          </p:cNvSpPr>
+          <p:nvPr>
+            <p:ph idx="14"/>
+          </p:nvPr>
+        </p:nvSpPr>
+        <p:spPr>
+          <a:xfrm>
+            <a:off x="6873709" y="2564457"/>
+            <a:ext cx="640080" cy="365760"/>
+          </a:xfrm>
+        </p:spPr>
+        <p:txBody>
+          <a:bodyPr anchor="ctr">
+            <a:noAutofit/>
+          </a:bodyPr>
+          <a:lstStyle>
+            <a:lvl1pPr marL="0" indent="0" algn="ctr">
+              <a:spcBef>
+                <a:spcPts val="400"/>
+              </a:spcBef>
+              <a:buNone/>
+              <a:defRPr lang="de-DE" sz="1800" b="1" kern="1200" dirty="0">
+                <a:solidFill>
+                  <a:schemeClr val="bg1"/>
+                </a:solidFill>
+                <a:latin typeface="Segoe UI Light" panose="020B0502040204020203" pitchFamily="34" charset="0"/>
+                <a:ea typeface="+mn-ea"/>
+                <a:cs typeface="Segoe UI Light" panose="020B0502040204020203" pitchFamily="34" charset="0"/>
+              </a:defRPr>
+            </a:lvl1pPr>
+            <a:lvl2pPr marL="457200" indent="0" algn="ctr">
+              <a:buNone/>
+              <a:defRPr sz="2800" b="1">
+                <a:latin typeface="Segoe UI Light" panose="020B0502040204020203" pitchFamily="34" charset="0"/>
+                <a:cs typeface="Segoe UI Light" panose="020B0502040204020203" pitchFamily="34" charset="0"/>
+              </a:defRPr>
+            </a:lvl2pPr>
+            <a:lvl3pPr marL="914400" indent="0" algn="ctr">
+              <a:buNone/>
+              <a:defRPr sz="2800" b="1">
+                <a:latin typeface="Segoe UI Light" panose="020B0502040204020203" pitchFamily="34" charset="0"/>
+                <a:cs typeface="Segoe UI Light" panose="020B0502040204020203" pitchFamily="34" charset="0"/>
+              </a:defRPr>
+            </a:lvl3pPr>
+            <a:lvl4pPr marL="1371600" indent="0" algn="ctr">
+              <a:buNone/>
+              <a:defRPr sz="2800" b="1">
+                <a:latin typeface="Segoe UI Light" panose="020B0502040204020203" pitchFamily="34" charset="0"/>
+                <a:cs typeface="Segoe UI Light" panose="020B0502040204020203" pitchFamily="34" charset="0"/>
+              </a:defRPr>
+            </a:lvl4pPr>
+            <a:lvl5pPr marL="1828800" indent="0" algn="ctr">
+              <a:buNone/>
+              <a:defRPr sz="2800" b="1">
+                <a:latin typeface="Segoe UI Light" panose="020B0502040204020203" pitchFamily="34" charset="0"/>
+                <a:cs typeface="Segoe UI Light" panose="020B0502040204020203" pitchFamily="34" charset="0"/>
+              </a:defRPr>
+            </a:lvl5pPr>
+          </a:lstStyle>
+          <a:p>
+            <a:pPr lvl="0"/>
+            <a:endParaRPr lang="de-DE" dirty="0"/>
+          </a:p>
+        </p:txBody>
+      </p:sp>
+      <p:sp>
+        <p:nvSpPr>
+          <p:cNvPr id="26" name="State_Background_3">
+            <a:extLst>
+              <a:ext uri="{FF2B5EF4-FFF2-40B4-BE49-F238E27FC236}">
+                <a16:creationId xmlns:a16="http://schemas.microsoft.com/office/drawing/2014/main" id="{42BE5FC6-EB9D-9A0F-2C57-117C121AB96F}"/>
+              </a:ext>
+            </a:extLst>
+          </p:cNvPr>
+          <p:cNvSpPr/>
+          <p:nvPr userDrawn="1"/>
+        </p:nvSpPr>
+        <p:spPr>
+          <a:xfrm>
+            <a:off x="3673309" y="3082571"/>
+            <a:ext cx="3840480" cy="365760"/>
+          </a:xfrm>
+          <a:prstGeom prst="rect">
+            <a:avLst/>
+          </a:prstGeom>
+          <a:gradFill flip="none" rotWithShape="1">
+            <a:gsLst>
+              <a:gs pos="0">
+                <a:srgbClr val="0279D4"/>
+              </a:gs>
+              <a:gs pos="100000">
+                <a:srgbClr val="549BEC"/>
+              </a:gs>
+            </a:gsLst>
+            <a:lin ang="2700000" scaled="1"/>
+            <a:tileRect/>
+          </a:gradFill>
+          <a:ln>
+            <a:noFill/>
+          </a:ln>
+        </p:spPr>
+        <p:style>
+          <a:lnRef idx="2">
+            <a:schemeClr val="accent1">
+              <a:shade val="15000"/>
+            </a:schemeClr>
+          </a:lnRef>
+          <a:fillRef idx="1">
+            <a:schemeClr val="accent1"/>
+          </a:fillRef>
+          <a:effectRef idx="0">
+            <a:schemeClr val="accent1"/>
+          </a:effectRef>
+          <a:fontRef idx="minor">
+            <a:schemeClr val="lt1"/>
+          </a:fontRef>
+        </p:style>
+        <p:txBody>
+          <a:bodyPr rtlCol="0" anchor="ctr"/>
+          <a:lstStyle/>
+          <a:p>
+            <a:pPr algn="ctr"/>
+            <a:endParaRPr lang="de-DE"/>
+          </a:p>
+        </p:txBody>
+      </p:sp>
+      <p:sp>
+        <p:nvSpPr>
+          <p:cNvPr id="27" name="State_Type_3">
+            <a:extLst>
+              <a:ext uri="{FF2B5EF4-FFF2-40B4-BE49-F238E27FC236}">
+                <a16:creationId xmlns:a16="http://schemas.microsoft.com/office/drawing/2014/main" id="{3AE457DF-1850-5783-11EC-A98DACB03381}"/>
+              </a:ext>
+            </a:extLst>
+          </p:cNvPr>
+          <p:cNvSpPr>
+            <a:spLocks noGrp="1"/>
+          </p:cNvSpPr>
+          <p:nvPr>
+            <p:ph idx="15"/>
+          </p:nvPr>
+        </p:nvSpPr>
+        <p:spPr>
+          <a:xfrm>
+            <a:off x="3673309" y="3082572"/>
+            <a:ext cx="3200400" cy="365760"/>
+          </a:xfrm>
+        </p:spPr>
+        <p:txBody>
+          <a:bodyPr anchor="ctr">
+            <a:noAutofit/>
+          </a:bodyPr>
+          <a:lstStyle>
+            <a:lvl1pPr marL="0" indent="0" algn="r">
+              <a:spcBef>
+                <a:spcPts val="400"/>
+              </a:spcBef>
+              <a:buNone/>
+              <a:defRPr lang="de-DE" sz="1800" b="1" kern="1200" dirty="0">
+                <a:solidFill>
+                  <a:schemeClr val="bg1"/>
+                </a:solidFill>
+                <a:latin typeface="Segoe UI Light" panose="020B0502040204020203" pitchFamily="34" charset="0"/>
+                <a:ea typeface="+mn-ea"/>
+                <a:cs typeface="Segoe UI Light" panose="020B0502040204020203" pitchFamily="34" charset="0"/>
+              </a:defRPr>
+            </a:lvl1pPr>
+            <a:lvl2pPr marL="457200" indent="0" algn="ctr">
+              <a:buNone/>
+              <a:defRPr sz="2800" b="1">
+                <a:latin typeface="Segoe UI Light" panose="020B0502040204020203" pitchFamily="34" charset="0"/>
+                <a:cs typeface="Segoe UI Light" panose="020B0502040204020203" pitchFamily="34" charset="0"/>
+              </a:defRPr>
+            </a:lvl2pPr>
+            <a:lvl3pPr marL="914400" indent="0" algn="ctr">
+              <a:buNone/>
+              <a:defRPr sz="2800" b="1">
+                <a:latin typeface="Segoe UI Light" panose="020B0502040204020203" pitchFamily="34" charset="0"/>
+                <a:cs typeface="Segoe UI Light" panose="020B0502040204020203" pitchFamily="34" charset="0"/>
+              </a:defRPr>
+            </a:lvl3pPr>
+            <a:lvl4pPr marL="1371600" indent="0" algn="ctr">
+              <a:buNone/>
+              <a:defRPr sz="2800" b="1">
+                <a:latin typeface="Segoe UI Light" panose="020B0502040204020203" pitchFamily="34" charset="0"/>
+                <a:cs typeface="Segoe UI Light" panose="020B0502040204020203" pitchFamily="34" charset="0"/>
+              </a:defRPr>
+            </a:lvl4pPr>
+            <a:lvl5pPr marL="1828800" indent="0" algn="ctr">
+              <a:buNone/>
+              <a:defRPr sz="2800" b="1">
+                <a:latin typeface="Segoe UI Light" panose="020B0502040204020203" pitchFamily="34" charset="0"/>
+                <a:cs typeface="Segoe UI Light" panose="020B0502040204020203" pitchFamily="34" charset="0"/>
+              </a:defRPr>
+            </a:lvl5pPr>
+          </a:lstStyle>
+          <a:p>
+            <a:pPr lvl="0"/>
+            <a:endParaRPr lang="de-DE" dirty="0"/>
+          </a:p>
+        </p:txBody>
+      </p:sp>
+      <p:sp>
+        <p:nvSpPr>
+          <p:cNvPr id="28" name="State_Count_3">
+            <a:extLst>
+              <a:ext uri="{FF2B5EF4-FFF2-40B4-BE49-F238E27FC236}">
+                <a16:creationId xmlns:a16="http://schemas.microsoft.com/office/drawing/2014/main" id="{D7E9B3C3-C9BA-157C-E65C-3B1687CFA546}"/>
+              </a:ext>
+            </a:extLst>
+          </p:cNvPr>
+          <p:cNvSpPr>
+            <a:spLocks noGrp="1"/>
+          </p:cNvSpPr>
+          <p:nvPr>
+            <p:ph idx="16"/>
+          </p:nvPr>
+        </p:nvSpPr>
+        <p:spPr>
+          <a:xfrm>
+            <a:off x="6873709" y="3082571"/>
+            <a:ext cx="640080" cy="365760"/>
+          </a:xfrm>
+        </p:spPr>
+        <p:txBody>
+          <a:bodyPr anchor="ctr">
+            <a:noAutofit/>
+          </a:bodyPr>
+          <a:lstStyle>
+            <a:lvl1pPr marL="0" indent="0" algn="ctr">
+              <a:spcBef>
+                <a:spcPts val="400"/>
+              </a:spcBef>
+              <a:buNone/>
+              <a:defRPr lang="de-DE" sz="1800" b="1" kern="1200" dirty="0">
+                <a:solidFill>
+                  <a:schemeClr val="bg1"/>
+                </a:solidFill>
+                <a:latin typeface="Segoe UI Light" panose="020B0502040204020203" pitchFamily="34" charset="0"/>
+                <a:ea typeface="+mn-ea"/>
+                <a:cs typeface="Segoe UI Light" panose="020B0502040204020203" pitchFamily="34" charset="0"/>
+              </a:defRPr>
+            </a:lvl1pPr>
+            <a:lvl2pPr marL="457200" indent="0" algn="ctr">
+              <a:buNone/>
+              <a:defRPr sz="2800" b="1">
+                <a:latin typeface="Segoe UI Light" panose="020B0502040204020203" pitchFamily="34" charset="0"/>
+                <a:cs typeface="Segoe UI Light" panose="020B0502040204020203" pitchFamily="34" charset="0"/>
+              </a:defRPr>
+            </a:lvl2pPr>
+            <a:lvl3pPr marL="914400" indent="0" algn="ctr">
+              <a:buNone/>
+              <a:defRPr sz="2800" b="1">
+                <a:latin typeface="Segoe UI Light" panose="020B0502040204020203" pitchFamily="34" charset="0"/>
+                <a:cs typeface="Segoe UI Light" panose="020B0502040204020203" pitchFamily="34" charset="0"/>
+              </a:defRPr>
+            </a:lvl3pPr>
+            <a:lvl4pPr marL="1371600" indent="0" algn="ctr">
+              <a:buNone/>
+              <a:defRPr sz="2800" b="1">
+                <a:latin typeface="Segoe UI Light" panose="020B0502040204020203" pitchFamily="34" charset="0"/>
+                <a:cs typeface="Segoe UI Light" panose="020B0502040204020203" pitchFamily="34" charset="0"/>
+              </a:defRPr>
+            </a:lvl4pPr>
+            <a:lvl5pPr marL="1828800" indent="0" algn="ctr">
+              <a:buNone/>
+              <a:defRPr sz="2800" b="1">
+                <a:latin typeface="Segoe UI Light" panose="020B0502040204020203" pitchFamily="34" charset="0"/>
+                <a:cs typeface="Segoe UI Light" panose="020B0502040204020203" pitchFamily="34" charset="0"/>
+              </a:defRPr>
+            </a:lvl5pPr>
+          </a:lstStyle>
+          <a:p>
+            <a:pPr lvl="0"/>
+            <a:endParaRPr lang="de-DE" dirty="0"/>
+          </a:p>
+        </p:txBody>
+      </p:sp>
+      <p:sp>
+        <p:nvSpPr>
+          <p:cNvPr id="29" name="State_Background_4">
+            <a:extLst>
+              <a:ext uri="{FF2B5EF4-FFF2-40B4-BE49-F238E27FC236}">
+                <a16:creationId xmlns:a16="http://schemas.microsoft.com/office/drawing/2014/main" id="{E0102368-EBD0-B7BF-C047-2C7E91CA95E7}"/>
+              </a:ext>
+            </a:extLst>
+          </p:cNvPr>
+          <p:cNvSpPr/>
+          <p:nvPr userDrawn="1"/>
+        </p:nvSpPr>
+        <p:spPr>
+          <a:xfrm>
+            <a:off x="3673309" y="3566562"/>
+            <a:ext cx="3840480" cy="365760"/>
+          </a:xfrm>
+          <a:prstGeom prst="rect">
+            <a:avLst/>
+          </a:prstGeom>
+          <a:gradFill flip="none" rotWithShape="1">
+            <a:gsLst>
+              <a:gs pos="0">
+                <a:srgbClr val="0279D4"/>
+              </a:gs>
+              <a:gs pos="100000">
+                <a:srgbClr val="549BEC"/>
+              </a:gs>
+            </a:gsLst>
+            <a:lin ang="2700000" scaled="1"/>
+            <a:tileRect/>
+          </a:gradFill>
+          <a:ln>
+            <a:noFill/>
+          </a:ln>
+        </p:spPr>
+        <p:style>
+          <a:lnRef idx="2">
+            <a:schemeClr val="accent1">
+              <a:shade val="15000"/>
+            </a:schemeClr>
+          </a:lnRef>
+          <a:fillRef idx="1">
+            <a:schemeClr val="accent1"/>
+          </a:fillRef>
+          <a:effectRef idx="0">
+            <a:schemeClr val="accent1"/>
+          </a:effectRef>
+          <a:fontRef idx="minor">
+            <a:schemeClr val="lt1"/>
+          </a:fontRef>
+        </p:style>
+        <p:txBody>
+          <a:bodyPr rtlCol="0" anchor="ctr"/>
+          <a:lstStyle/>
+          <a:p>
+            <a:pPr algn="ctr"/>
+            <a:endParaRPr lang="de-DE"/>
+          </a:p>
+        </p:txBody>
+      </p:sp>
+      <p:sp>
+        <p:nvSpPr>
+          <p:cNvPr id="30" name="State_Type_4">
+            <a:extLst>
+              <a:ext uri="{FF2B5EF4-FFF2-40B4-BE49-F238E27FC236}">
+                <a16:creationId xmlns:a16="http://schemas.microsoft.com/office/drawing/2014/main" id="{F65097D0-69EC-E1DE-C427-D07299B6B5F0}"/>
+              </a:ext>
+            </a:extLst>
+          </p:cNvPr>
+          <p:cNvSpPr>
+            <a:spLocks noGrp="1"/>
+          </p:cNvSpPr>
+          <p:nvPr>
+            <p:ph idx="17"/>
+          </p:nvPr>
+        </p:nvSpPr>
+        <p:spPr>
+          <a:xfrm>
+            <a:off x="3673309" y="3566563"/>
+            <a:ext cx="3200400" cy="365760"/>
+          </a:xfrm>
+        </p:spPr>
+        <p:txBody>
+          <a:bodyPr anchor="ctr">
+            <a:noAutofit/>
+          </a:bodyPr>
+          <a:lstStyle>
+            <a:lvl1pPr marL="0" indent="0" algn="r">
+              <a:spcBef>
+                <a:spcPts val="400"/>
+              </a:spcBef>
+              <a:buNone/>
+              <a:defRPr lang="de-DE" sz="1800" b="1" kern="1200" dirty="0">
+                <a:solidFill>
+                  <a:schemeClr val="bg1"/>
+                </a:solidFill>
+                <a:latin typeface="Segoe UI Light" panose="020B0502040204020203" pitchFamily="34" charset="0"/>
+                <a:ea typeface="+mn-ea"/>
+                <a:cs typeface="Segoe UI Light" panose="020B0502040204020203" pitchFamily="34" charset="0"/>
+              </a:defRPr>
+            </a:lvl1pPr>
+            <a:lvl2pPr marL="457200" indent="0" algn="ctr">
+              <a:buNone/>
+              <a:defRPr sz="2800" b="1">
+                <a:latin typeface="Segoe UI Light" panose="020B0502040204020203" pitchFamily="34" charset="0"/>
+                <a:cs typeface="Segoe UI Light" panose="020B0502040204020203" pitchFamily="34" charset="0"/>
+              </a:defRPr>
+            </a:lvl2pPr>
+            <a:lvl3pPr marL="914400" indent="0" algn="ctr">
+              <a:buNone/>
+              <a:defRPr sz="2800" b="1">
+                <a:latin typeface="Segoe UI Light" panose="020B0502040204020203" pitchFamily="34" charset="0"/>
+                <a:cs typeface="Segoe UI Light" panose="020B0502040204020203" pitchFamily="34" charset="0"/>
+              </a:defRPr>
+            </a:lvl3pPr>
+            <a:lvl4pPr marL="1371600" indent="0" algn="ctr">
+              <a:buNone/>
+              <a:defRPr sz="2800" b="1">
+                <a:latin typeface="Segoe UI Light" panose="020B0502040204020203" pitchFamily="34" charset="0"/>
+                <a:cs typeface="Segoe UI Light" panose="020B0502040204020203" pitchFamily="34" charset="0"/>
+              </a:defRPr>
+            </a:lvl4pPr>
+            <a:lvl5pPr marL="1828800" indent="0" algn="ctr">
+              <a:buNone/>
+              <a:defRPr sz="2800" b="1">
+                <a:latin typeface="Segoe UI Light" panose="020B0502040204020203" pitchFamily="34" charset="0"/>
+                <a:cs typeface="Segoe UI Light" panose="020B0502040204020203" pitchFamily="34" charset="0"/>
+              </a:defRPr>
+            </a:lvl5pPr>
+          </a:lstStyle>
+          <a:p>
+            <a:pPr lvl="0"/>
+            <a:endParaRPr lang="de-DE" dirty="0"/>
+          </a:p>
+        </p:txBody>
+      </p:sp>
+      <p:sp>
+        <p:nvSpPr>
+          <p:cNvPr id="31" name="State_Count_4">
+            <a:extLst>
+              <a:ext uri="{FF2B5EF4-FFF2-40B4-BE49-F238E27FC236}">
+                <a16:creationId xmlns:a16="http://schemas.microsoft.com/office/drawing/2014/main" id="{8CAB406C-5976-7ED1-0BA9-553640287667}"/>
+              </a:ext>
+            </a:extLst>
+          </p:cNvPr>
+          <p:cNvSpPr>
+            <a:spLocks noGrp="1"/>
+          </p:cNvSpPr>
+          <p:nvPr>
+            <p:ph idx="18"/>
+          </p:nvPr>
+        </p:nvSpPr>
+        <p:spPr>
+          <a:xfrm>
+            <a:off x="6873709" y="3566562"/>
+            <a:ext cx="640080" cy="365760"/>
+          </a:xfrm>
+        </p:spPr>
+        <p:txBody>
+          <a:bodyPr anchor="ctr">
+            <a:noAutofit/>
+          </a:bodyPr>
+          <a:lstStyle>
+            <a:lvl1pPr marL="0" indent="0" algn="ctr">
+              <a:spcBef>
+                <a:spcPts val="400"/>
+              </a:spcBef>
+              <a:buNone/>
+              <a:defRPr lang="de-DE" sz="1800" b="1" kern="1200" dirty="0">
+                <a:solidFill>
+                  <a:schemeClr val="bg1"/>
+                </a:solidFill>
+                <a:latin typeface="Segoe UI Light" panose="020B0502040204020203" pitchFamily="34" charset="0"/>
+                <a:ea typeface="+mn-ea"/>
+                <a:cs typeface="Segoe UI Light" panose="020B0502040204020203" pitchFamily="34" charset="0"/>
+              </a:defRPr>
+            </a:lvl1pPr>
+            <a:lvl2pPr marL="457200" indent="0" algn="ctr">
+              <a:buNone/>
+              <a:defRPr sz="2800" b="1">
+                <a:latin typeface="Segoe UI Light" panose="020B0502040204020203" pitchFamily="34" charset="0"/>
+                <a:cs typeface="Segoe UI Light" panose="020B0502040204020203" pitchFamily="34" charset="0"/>
+              </a:defRPr>
+            </a:lvl2pPr>
+            <a:lvl3pPr marL="914400" indent="0" algn="ctr">
+              <a:buNone/>
+              <a:defRPr sz="2800" b="1">
+                <a:latin typeface="Segoe UI Light" panose="020B0502040204020203" pitchFamily="34" charset="0"/>
+                <a:cs typeface="Segoe UI Light" panose="020B0502040204020203" pitchFamily="34" charset="0"/>
+              </a:defRPr>
+            </a:lvl3pPr>
+            <a:lvl4pPr marL="1371600" indent="0" algn="ctr">
+              <a:buNone/>
+              <a:defRPr sz="2800" b="1">
+                <a:latin typeface="Segoe UI Light" panose="020B0502040204020203" pitchFamily="34" charset="0"/>
+                <a:cs typeface="Segoe UI Light" panose="020B0502040204020203" pitchFamily="34" charset="0"/>
+              </a:defRPr>
+            </a:lvl4pPr>
+            <a:lvl5pPr marL="1828800" indent="0" algn="ctr">
+              <a:buNone/>
+              <a:defRPr sz="2800" b="1">
+                <a:latin typeface="Segoe UI Light" panose="020B0502040204020203" pitchFamily="34" charset="0"/>
+                <a:cs typeface="Segoe UI Light" panose="020B0502040204020203" pitchFamily="34" charset="0"/>
+              </a:defRPr>
+            </a:lvl5pPr>
+          </a:lstStyle>
+          <a:p>
+            <a:pPr lvl="0"/>
+            <a:endParaRPr lang="de-DE" dirty="0"/>
+          </a:p>
+        </p:txBody>
+      </p:sp>
+      <p:sp>
+        <p:nvSpPr>
+          <p:cNvPr id="32" name="State_Background_5">
+            <a:extLst>
+              <a:ext uri="{FF2B5EF4-FFF2-40B4-BE49-F238E27FC236}">
+                <a16:creationId xmlns:a16="http://schemas.microsoft.com/office/drawing/2014/main" id="{41AFD714-7DF5-0282-D857-9E7F72BF83A9}"/>
+              </a:ext>
+            </a:extLst>
+          </p:cNvPr>
+          <p:cNvSpPr/>
+          <p:nvPr userDrawn="1"/>
+        </p:nvSpPr>
+        <p:spPr>
+          <a:xfrm>
+            <a:off x="3673309" y="4084677"/>
+            <a:ext cx="3840480" cy="365760"/>
+          </a:xfrm>
+          <a:prstGeom prst="rect">
+            <a:avLst/>
+          </a:prstGeom>
+          <a:gradFill flip="none" rotWithShape="1">
+            <a:gsLst>
+              <a:gs pos="0">
+                <a:srgbClr val="0279D4"/>
+              </a:gs>
+              <a:gs pos="100000">
+                <a:srgbClr val="549BEC"/>
+              </a:gs>
+            </a:gsLst>
+            <a:lin ang="2700000" scaled="1"/>
+            <a:tileRect/>
+          </a:gradFill>
+          <a:ln>
+            <a:noFill/>
+          </a:ln>
+        </p:spPr>
+        <p:style>
+          <a:lnRef idx="2">
+            <a:schemeClr val="accent1">
+              <a:shade val="15000"/>
+            </a:schemeClr>
+          </a:lnRef>
+          <a:fillRef idx="1">
+            <a:schemeClr val="accent1"/>
+          </a:fillRef>
+          <a:effectRef idx="0">
+            <a:schemeClr val="accent1"/>
+          </a:effectRef>
+          <a:fontRef idx="minor">
+            <a:schemeClr val="lt1"/>
+          </a:fontRef>
+        </p:style>
+        <p:txBody>
+          <a:bodyPr rtlCol="0" anchor="ctr"/>
+          <a:lstStyle/>
+          <a:p>
+            <a:pPr algn="ctr"/>
+            <a:endParaRPr lang="de-DE"/>
+          </a:p>
+        </p:txBody>
+      </p:sp>
+      <p:sp>
+        <p:nvSpPr>
+          <p:cNvPr id="33" name="State_Type_5">
+            <a:extLst>
+              <a:ext uri="{FF2B5EF4-FFF2-40B4-BE49-F238E27FC236}">
+                <a16:creationId xmlns:a16="http://schemas.microsoft.com/office/drawing/2014/main" id="{AF178E3B-420E-8940-DCBF-F4C08CF4C696}"/>
+              </a:ext>
+            </a:extLst>
+          </p:cNvPr>
+          <p:cNvSpPr>
+            <a:spLocks noGrp="1"/>
+          </p:cNvSpPr>
+          <p:nvPr>
+            <p:ph idx="19"/>
+          </p:nvPr>
+        </p:nvSpPr>
+        <p:spPr>
+          <a:xfrm>
+            <a:off x="3673309" y="4084678"/>
+            <a:ext cx="3200400" cy="365760"/>
+          </a:xfrm>
+        </p:spPr>
+        <p:txBody>
+          <a:bodyPr anchor="ctr">
+            <a:noAutofit/>
+          </a:bodyPr>
+          <a:lstStyle>
+            <a:lvl1pPr marL="0" indent="0" algn="r">
+              <a:spcBef>
+                <a:spcPts val="400"/>
+              </a:spcBef>
+              <a:buNone/>
+              <a:defRPr lang="de-DE" sz="1800" b="1" kern="1200" dirty="0">
+                <a:solidFill>
+                  <a:schemeClr val="bg1"/>
+                </a:solidFill>
+                <a:latin typeface="Segoe UI Light" panose="020B0502040204020203" pitchFamily="34" charset="0"/>
+                <a:ea typeface="+mn-ea"/>
+                <a:cs typeface="Segoe UI Light" panose="020B0502040204020203" pitchFamily="34" charset="0"/>
+              </a:defRPr>
+            </a:lvl1pPr>
+            <a:lvl2pPr marL="457200" indent="0" algn="ctr">
+              <a:buNone/>
+              <a:defRPr sz="2800" b="1">
+                <a:latin typeface="Segoe UI Light" panose="020B0502040204020203" pitchFamily="34" charset="0"/>
+                <a:cs typeface="Segoe UI Light" panose="020B0502040204020203" pitchFamily="34" charset="0"/>
+              </a:defRPr>
+            </a:lvl2pPr>
+            <a:lvl3pPr marL="914400" indent="0" algn="ctr">
+              <a:buNone/>
+              <a:defRPr sz="2800" b="1">
+                <a:latin typeface="Segoe UI Light" panose="020B0502040204020203" pitchFamily="34" charset="0"/>
+                <a:cs typeface="Segoe UI Light" panose="020B0502040204020203" pitchFamily="34" charset="0"/>
+              </a:defRPr>
+            </a:lvl3pPr>
+            <a:lvl4pPr marL="1371600" indent="0" algn="ctr">
+              <a:buNone/>
+              <a:defRPr sz="2800" b="1">
+                <a:latin typeface="Segoe UI Light" panose="020B0502040204020203" pitchFamily="34" charset="0"/>
+                <a:cs typeface="Segoe UI Light" panose="020B0502040204020203" pitchFamily="34" charset="0"/>
+              </a:defRPr>
+            </a:lvl4pPr>
+            <a:lvl5pPr marL="1828800" indent="0" algn="ctr">
+              <a:buNone/>
+              <a:defRPr sz="2800" b="1">
+                <a:latin typeface="Segoe UI Light" panose="020B0502040204020203" pitchFamily="34" charset="0"/>
+                <a:cs typeface="Segoe UI Light" panose="020B0502040204020203" pitchFamily="34" charset="0"/>
+              </a:defRPr>
+            </a:lvl5pPr>
+          </a:lstStyle>
+          <a:p>
+            <a:pPr lvl="0"/>
+            <a:endParaRPr lang="de-DE" dirty="0"/>
+          </a:p>
+        </p:txBody>
+      </p:sp>
+      <p:sp>
+        <p:nvSpPr>
+          <p:cNvPr id="34" name="State_Count_5">
+            <a:extLst>
+              <a:ext uri="{FF2B5EF4-FFF2-40B4-BE49-F238E27FC236}">
+                <a16:creationId xmlns:a16="http://schemas.microsoft.com/office/drawing/2014/main" id="{65836962-EE4A-A120-B8ED-AB7D12DE9B41}"/>
+              </a:ext>
+            </a:extLst>
+          </p:cNvPr>
+          <p:cNvSpPr>
+            <a:spLocks noGrp="1"/>
+          </p:cNvSpPr>
+          <p:nvPr>
+            <p:ph idx="20"/>
+          </p:nvPr>
+        </p:nvSpPr>
+        <p:spPr>
+          <a:xfrm>
+            <a:off x="6873709" y="4084677"/>
+            <a:ext cx="640080" cy="365760"/>
+          </a:xfrm>
+        </p:spPr>
+        <p:txBody>
+          <a:bodyPr anchor="ctr">
+            <a:noAutofit/>
+          </a:bodyPr>
+          <a:lstStyle>
+            <a:lvl1pPr marL="0" indent="0" algn="ctr">
+              <a:spcBef>
+                <a:spcPts val="400"/>
+              </a:spcBef>
+              <a:buNone/>
+              <a:defRPr lang="de-DE" sz="1800" b="1" kern="1200" dirty="0">
+                <a:solidFill>
+                  <a:schemeClr val="bg1"/>
+                </a:solidFill>
+                <a:latin typeface="Segoe UI Light" panose="020B0502040204020203" pitchFamily="34" charset="0"/>
+                <a:ea typeface="+mn-ea"/>
+                <a:cs typeface="Segoe UI Light" panose="020B0502040204020203" pitchFamily="34" charset="0"/>
+              </a:defRPr>
+            </a:lvl1pPr>
+            <a:lvl2pPr marL="457200" indent="0" algn="ctr">
+              <a:buNone/>
+              <a:defRPr sz="2800" b="1">
+                <a:latin typeface="Segoe UI Light" panose="020B0502040204020203" pitchFamily="34" charset="0"/>
+                <a:cs typeface="Segoe UI Light" panose="020B0502040204020203" pitchFamily="34" charset="0"/>
+              </a:defRPr>
+            </a:lvl2pPr>
+            <a:lvl3pPr marL="914400" indent="0" algn="ctr">
+              <a:buNone/>
+              <a:defRPr sz="2800" b="1">
+                <a:latin typeface="Segoe UI Light" panose="020B0502040204020203" pitchFamily="34" charset="0"/>
+                <a:cs typeface="Segoe UI Light" panose="020B0502040204020203" pitchFamily="34" charset="0"/>
+              </a:defRPr>
+            </a:lvl3pPr>
+            <a:lvl4pPr marL="1371600" indent="0" algn="ctr">
+              <a:buNone/>
+              <a:defRPr sz="2800" b="1">
+                <a:latin typeface="Segoe UI Light" panose="020B0502040204020203" pitchFamily="34" charset="0"/>
+                <a:cs typeface="Segoe UI Light" panose="020B0502040204020203" pitchFamily="34" charset="0"/>
+              </a:defRPr>
+            </a:lvl4pPr>
+            <a:lvl5pPr marL="1828800" indent="0" algn="ctr">
+              <a:buNone/>
+              <a:defRPr sz="2800" b="1">
+                <a:latin typeface="Segoe UI Light" panose="020B0502040204020203" pitchFamily="34" charset="0"/>
+                <a:cs typeface="Segoe UI Light" panose="020B0502040204020203" pitchFamily="34" charset="0"/>
+              </a:defRPr>
+            </a:lvl5pPr>
+          </a:lstStyle>
+          <a:p>
+            <a:pPr lvl="0"/>
+            <a:endParaRPr lang="de-DE" dirty="0"/>
+          </a:p>
+        </p:txBody>
+      </p:sp>
+      <p:sp>
+        <p:nvSpPr>
+          <p:cNvPr id="35" name="State_Background_6">
+            <a:extLst>
+              <a:ext uri="{FF2B5EF4-FFF2-40B4-BE49-F238E27FC236}">
+                <a16:creationId xmlns:a16="http://schemas.microsoft.com/office/drawing/2014/main" id="{13166B22-DD5D-7727-EEB7-B7538A28C522}"/>
+              </a:ext>
+            </a:extLst>
+          </p:cNvPr>
+          <p:cNvSpPr/>
+          <p:nvPr userDrawn="1"/>
+        </p:nvSpPr>
+        <p:spPr>
+          <a:xfrm>
+            <a:off x="3673309" y="4602791"/>
+            <a:ext cx="3840480" cy="365760"/>
+          </a:xfrm>
+          <a:prstGeom prst="rect">
+            <a:avLst/>
+          </a:prstGeom>
+          <a:gradFill flip="none" rotWithShape="1">
+            <a:gsLst>
+              <a:gs pos="0">
+                <a:srgbClr val="0279D4"/>
+              </a:gs>
+              <a:gs pos="100000">
+                <a:srgbClr val="549BEC"/>
+              </a:gs>
+            </a:gsLst>
+            <a:lin ang="2700000" scaled="1"/>
+            <a:tileRect/>
+          </a:gradFill>
+          <a:ln>
+            <a:noFill/>
+          </a:ln>
+        </p:spPr>
+        <p:style>
+          <a:lnRef idx="2">
+            <a:schemeClr val="accent1">
+              <a:shade val="15000"/>
+            </a:schemeClr>
+          </a:lnRef>
+          <a:fillRef idx="1">
+            <a:schemeClr val="accent1"/>
+          </a:fillRef>
+          <a:effectRef idx="0">
+            <a:schemeClr val="accent1"/>
+          </a:effectRef>
+          <a:fontRef idx="minor">
+            <a:schemeClr val="lt1"/>
+          </a:fontRef>
+        </p:style>
+        <p:txBody>
+          <a:bodyPr rtlCol="0" anchor="ctr"/>
+          <a:lstStyle/>
+          <a:p>
+            <a:pPr algn="ctr"/>
+            <a:endParaRPr lang="de-DE"/>
+          </a:p>
+        </p:txBody>
+      </p:sp>
+      <p:sp>
+        <p:nvSpPr>
+          <p:cNvPr id="36" name="State_Type_6">
+            <a:extLst>
+              <a:ext uri="{FF2B5EF4-FFF2-40B4-BE49-F238E27FC236}">
+                <a16:creationId xmlns:a16="http://schemas.microsoft.com/office/drawing/2014/main" id="{32306C48-6A1D-00E1-6FFB-9B1E21BE47A0}"/>
+              </a:ext>
+            </a:extLst>
+          </p:cNvPr>
+          <p:cNvSpPr>
+            <a:spLocks noGrp="1"/>
+          </p:cNvSpPr>
+          <p:nvPr>
+            <p:ph idx="21"/>
+          </p:nvPr>
+        </p:nvSpPr>
+        <p:spPr>
+          <a:xfrm>
+            <a:off x="3673309" y="4602792"/>
+            <a:ext cx="3200400" cy="365760"/>
+          </a:xfrm>
+        </p:spPr>
+        <p:txBody>
+          <a:bodyPr anchor="ctr">
+            <a:noAutofit/>
+          </a:bodyPr>
+          <a:lstStyle>
+            <a:lvl1pPr marL="0" indent="0" algn="r">
+              <a:spcBef>
+                <a:spcPts val="400"/>
+              </a:spcBef>
+              <a:buNone/>
+              <a:defRPr lang="de-DE" sz="1800" b="1" kern="1200" dirty="0">
+                <a:solidFill>
+                  <a:schemeClr val="bg1"/>
+                </a:solidFill>
+                <a:latin typeface="Segoe UI Light" panose="020B0502040204020203" pitchFamily="34" charset="0"/>
+                <a:ea typeface="+mn-ea"/>
+                <a:cs typeface="Segoe UI Light" panose="020B0502040204020203" pitchFamily="34" charset="0"/>
+              </a:defRPr>
+            </a:lvl1pPr>
+            <a:lvl2pPr marL="457200" indent="0" algn="ctr">
+              <a:buNone/>
+              <a:defRPr sz="2800" b="1">
+                <a:latin typeface="Segoe UI Light" panose="020B0502040204020203" pitchFamily="34" charset="0"/>
+                <a:cs typeface="Segoe UI Light" panose="020B0502040204020203" pitchFamily="34" charset="0"/>
+              </a:defRPr>
+            </a:lvl2pPr>
+            <a:lvl3pPr marL="914400" indent="0" algn="ctr">
+              <a:buNone/>
+              <a:defRPr sz="2800" b="1">
+                <a:latin typeface="Segoe UI Light" panose="020B0502040204020203" pitchFamily="34" charset="0"/>
+                <a:cs typeface="Segoe UI Light" panose="020B0502040204020203" pitchFamily="34" charset="0"/>
+              </a:defRPr>
+            </a:lvl3pPr>
+            <a:lvl4pPr marL="1371600" indent="0" algn="ctr">
+              <a:buNone/>
+              <a:defRPr sz="2800" b="1">
+                <a:latin typeface="Segoe UI Light" panose="020B0502040204020203" pitchFamily="34" charset="0"/>
+                <a:cs typeface="Segoe UI Light" panose="020B0502040204020203" pitchFamily="34" charset="0"/>
+              </a:defRPr>
+            </a:lvl4pPr>
+            <a:lvl5pPr marL="1828800" indent="0" algn="ctr">
+              <a:buNone/>
+              <a:defRPr sz="2800" b="1">
+                <a:latin typeface="Segoe UI Light" panose="020B0502040204020203" pitchFamily="34" charset="0"/>
+                <a:cs typeface="Segoe UI Light" panose="020B0502040204020203" pitchFamily="34" charset="0"/>
+              </a:defRPr>
+            </a:lvl5pPr>
+          </a:lstStyle>
+          <a:p>
+            <a:pPr lvl="0"/>
+            <a:endParaRPr lang="de-DE" dirty="0"/>
+          </a:p>
+        </p:txBody>
+      </p:sp>
+      <p:sp>
+        <p:nvSpPr>
+          <p:cNvPr id="37" name="State_Count_6">
+            <a:extLst>
+              <a:ext uri="{FF2B5EF4-FFF2-40B4-BE49-F238E27FC236}">
+                <a16:creationId xmlns:a16="http://schemas.microsoft.com/office/drawing/2014/main" id="{A1DAF6A8-37EA-3B2F-4588-B6136F88E609}"/>
+              </a:ext>
+            </a:extLst>
+          </p:cNvPr>
+          <p:cNvSpPr>
+            <a:spLocks noGrp="1"/>
+          </p:cNvSpPr>
+          <p:nvPr>
+            <p:ph idx="22"/>
+          </p:nvPr>
+        </p:nvSpPr>
+        <p:spPr>
+          <a:xfrm>
+            <a:off x="6873709" y="4602791"/>
+            <a:ext cx="640080" cy="365760"/>
+          </a:xfrm>
+        </p:spPr>
+        <p:txBody>
+          <a:bodyPr anchor="ctr">
+            <a:noAutofit/>
+          </a:bodyPr>
+          <a:lstStyle>
+            <a:lvl1pPr marL="0" indent="0" algn="ctr">
+              <a:spcBef>
+                <a:spcPts val="400"/>
+              </a:spcBef>
+              <a:buNone/>
+              <a:defRPr lang="de-DE" sz="1800" b="1" kern="1200" dirty="0">
+                <a:solidFill>
+                  <a:schemeClr val="bg1"/>
+                </a:solidFill>
+                <a:latin typeface="Segoe UI Light" panose="020B0502040204020203" pitchFamily="34" charset="0"/>
+                <a:ea typeface="+mn-ea"/>
+                <a:cs typeface="Segoe UI Light" panose="020B0502040204020203" pitchFamily="34" charset="0"/>
+              </a:defRPr>
+            </a:lvl1pPr>
+            <a:lvl2pPr marL="457200" indent="0" algn="ctr">
+              <a:buNone/>
+              <a:defRPr sz="2800" b="1">
+                <a:latin typeface="Segoe UI Light" panose="020B0502040204020203" pitchFamily="34" charset="0"/>
+                <a:cs typeface="Segoe UI Light" panose="020B0502040204020203" pitchFamily="34" charset="0"/>
+              </a:defRPr>
+            </a:lvl2pPr>
+            <a:lvl3pPr marL="914400" indent="0" algn="ctr">
+              <a:buNone/>
+              <a:defRPr sz="2800" b="1">
+                <a:latin typeface="Segoe UI Light" panose="020B0502040204020203" pitchFamily="34" charset="0"/>
+                <a:cs typeface="Segoe UI Light" panose="020B0502040204020203" pitchFamily="34" charset="0"/>
+              </a:defRPr>
+            </a:lvl3pPr>
+            <a:lvl4pPr marL="1371600" indent="0" algn="ctr">
+              <a:buNone/>
+              <a:defRPr sz="2800" b="1">
+                <a:latin typeface="Segoe UI Light" panose="020B0502040204020203" pitchFamily="34" charset="0"/>
+                <a:cs typeface="Segoe UI Light" panose="020B0502040204020203" pitchFamily="34" charset="0"/>
+              </a:defRPr>
+            </a:lvl4pPr>
+            <a:lvl5pPr marL="1828800" indent="0" algn="ctr">
+              <a:buNone/>
+              <a:defRPr sz="2800" b="1">
+                <a:latin typeface="Segoe UI Light" panose="020B0502040204020203" pitchFamily="34" charset="0"/>
+                <a:cs typeface="Segoe UI Light" panose="020B0502040204020203" pitchFamily="34" charset="0"/>
+              </a:defRPr>
+            </a:lvl5pPr>
+          </a:lstStyle>
+          <a:p>
+            <a:pPr lvl="0"/>
+            <a:endParaRPr lang="de-DE" dirty="0"/>
+          </a:p>
+        </p:txBody>
+      </p:sp>
+      <p:sp>
+        <p:nvSpPr>
+          <p:cNvPr id="38" name="State_Background_7">
+            <a:extLst>
+              <a:ext uri="{FF2B5EF4-FFF2-40B4-BE49-F238E27FC236}">
+                <a16:creationId xmlns:a16="http://schemas.microsoft.com/office/drawing/2014/main" id="{007703A5-7B69-3645-3FB1-296DF812F710}"/>
+              </a:ext>
+            </a:extLst>
+          </p:cNvPr>
+          <p:cNvSpPr/>
+          <p:nvPr userDrawn="1"/>
+        </p:nvSpPr>
+        <p:spPr>
+          <a:xfrm>
+            <a:off x="7667607" y="2046341"/>
+            <a:ext cx="3840480" cy="365760"/>
+          </a:xfrm>
+          <a:prstGeom prst="rect">
+            <a:avLst/>
+          </a:prstGeom>
+          <a:gradFill flip="none" rotWithShape="1">
+            <a:gsLst>
+              <a:gs pos="0">
+                <a:srgbClr val="0279D4"/>
+              </a:gs>
+              <a:gs pos="100000">
+                <a:srgbClr val="549BEC"/>
+              </a:gs>
+            </a:gsLst>
+            <a:lin ang="2700000" scaled="1"/>
+            <a:tileRect/>
+          </a:gradFill>
+          <a:ln>
+            <a:noFill/>
+          </a:ln>
+        </p:spPr>
+        <p:style>
+          <a:lnRef idx="2">
+            <a:schemeClr val="accent1">
+              <a:shade val="15000"/>
+            </a:schemeClr>
+          </a:lnRef>
+          <a:fillRef idx="1">
+            <a:schemeClr val="accent1"/>
+          </a:fillRef>
+          <a:effectRef idx="0">
+            <a:schemeClr val="accent1"/>
+          </a:effectRef>
+          <a:fontRef idx="minor">
+            <a:schemeClr val="lt1"/>
+          </a:fontRef>
+        </p:style>
+        <p:txBody>
+          <a:bodyPr rtlCol="0" anchor="ctr"/>
+          <a:lstStyle/>
+          <a:p>
+            <a:pPr algn="ctr"/>
+            <a:endParaRPr lang="de-DE"/>
+          </a:p>
+        </p:txBody>
+      </p:sp>
+      <p:sp>
+        <p:nvSpPr>
+          <p:cNvPr id="39" name="State_Type_7">
+            <a:extLst>
+              <a:ext uri="{FF2B5EF4-FFF2-40B4-BE49-F238E27FC236}">
+                <a16:creationId xmlns:a16="http://schemas.microsoft.com/office/drawing/2014/main" id="{F52A4F56-48C5-E4B4-9B43-BEB4AF9F5681}"/>
+              </a:ext>
+            </a:extLst>
+          </p:cNvPr>
+          <p:cNvSpPr>
+            <a:spLocks noGrp="1"/>
+          </p:cNvSpPr>
+          <p:nvPr>
+            <p:ph idx="23"/>
+          </p:nvPr>
+        </p:nvSpPr>
+        <p:spPr>
+          <a:xfrm>
+            <a:off x="7667607" y="2046342"/>
+            <a:ext cx="3200400" cy="365760"/>
+          </a:xfrm>
+        </p:spPr>
+        <p:txBody>
+          <a:bodyPr anchor="ctr">
+            <a:noAutofit/>
+          </a:bodyPr>
+          <a:lstStyle>
+            <a:lvl1pPr marL="0" indent="0" algn="r">
+              <a:spcBef>
+                <a:spcPts val="400"/>
+              </a:spcBef>
+              <a:buNone/>
+              <a:defRPr lang="de-DE" sz="1800" b="1" kern="1200" dirty="0">
+                <a:solidFill>
+                  <a:schemeClr val="bg1"/>
+                </a:solidFill>
+                <a:latin typeface="Segoe UI Light" panose="020B0502040204020203" pitchFamily="34" charset="0"/>
+                <a:ea typeface="+mn-ea"/>
+                <a:cs typeface="Segoe UI Light" panose="020B0502040204020203" pitchFamily="34" charset="0"/>
+              </a:defRPr>
+            </a:lvl1pPr>
+            <a:lvl2pPr marL="457200" indent="0" algn="ctr">
+              <a:buNone/>
+              <a:defRPr sz="2800" b="1">
+                <a:latin typeface="Segoe UI Light" panose="020B0502040204020203" pitchFamily="34" charset="0"/>
+                <a:cs typeface="Segoe UI Light" panose="020B0502040204020203" pitchFamily="34" charset="0"/>
+              </a:defRPr>
+            </a:lvl2pPr>
+            <a:lvl3pPr marL="914400" indent="0" algn="ctr">
+              <a:buNone/>
+              <a:defRPr sz="2800" b="1">
+                <a:latin typeface="Segoe UI Light" panose="020B0502040204020203" pitchFamily="34" charset="0"/>
+                <a:cs typeface="Segoe UI Light" panose="020B0502040204020203" pitchFamily="34" charset="0"/>
+              </a:defRPr>
+            </a:lvl3pPr>
+            <a:lvl4pPr marL="1371600" indent="0" algn="ctr">
+              <a:buNone/>
+              <a:defRPr sz="2800" b="1">
+                <a:latin typeface="Segoe UI Light" panose="020B0502040204020203" pitchFamily="34" charset="0"/>
+                <a:cs typeface="Segoe UI Light" panose="020B0502040204020203" pitchFamily="34" charset="0"/>
+              </a:defRPr>
+            </a:lvl4pPr>
+            <a:lvl5pPr marL="1828800" indent="0" algn="ctr">
+              <a:buNone/>
+              <a:defRPr sz="2800" b="1">
+                <a:latin typeface="Segoe UI Light" panose="020B0502040204020203" pitchFamily="34" charset="0"/>
+                <a:cs typeface="Segoe UI Light" panose="020B0502040204020203" pitchFamily="34" charset="0"/>
+              </a:defRPr>
+            </a:lvl5pPr>
+          </a:lstStyle>
+          <a:p>
+            <a:pPr lvl="0"/>
+            <a:endParaRPr lang="de-DE" dirty="0"/>
+          </a:p>
+        </p:txBody>
+      </p:sp>
+      <p:sp>
+        <p:nvSpPr>
+          <p:cNvPr id="40" name="State_Count_7">
+            <a:extLst>
+              <a:ext uri="{FF2B5EF4-FFF2-40B4-BE49-F238E27FC236}">
+                <a16:creationId xmlns:a16="http://schemas.microsoft.com/office/drawing/2014/main" id="{013393ED-2DEE-1808-58C8-DDA17EF03A31}"/>
+              </a:ext>
+            </a:extLst>
+          </p:cNvPr>
+          <p:cNvSpPr>
+            <a:spLocks noGrp="1"/>
+          </p:cNvSpPr>
+          <p:nvPr>
+            <p:ph idx="24"/>
+          </p:nvPr>
+        </p:nvSpPr>
+        <p:spPr>
+          <a:xfrm>
+            <a:off x="10868007" y="2046341"/>
+            <a:ext cx="640080" cy="365760"/>
+          </a:xfrm>
+        </p:spPr>
+        <p:txBody>
+          <a:bodyPr anchor="ctr">
+            <a:noAutofit/>
+          </a:bodyPr>
+          <a:lstStyle>
+            <a:lvl1pPr marL="0" indent="0" algn="ctr">
+              <a:spcBef>
+                <a:spcPts val="400"/>
+              </a:spcBef>
+              <a:buNone/>
+              <a:defRPr lang="de-DE" sz="1800" b="1" kern="1200" dirty="0">
+                <a:solidFill>
+                  <a:schemeClr val="bg1"/>
+                </a:solidFill>
+                <a:latin typeface="Segoe UI Light" panose="020B0502040204020203" pitchFamily="34" charset="0"/>
+                <a:ea typeface="+mn-ea"/>
+                <a:cs typeface="Segoe UI Light" panose="020B0502040204020203" pitchFamily="34" charset="0"/>
+              </a:defRPr>
+            </a:lvl1pPr>
+            <a:lvl2pPr marL="457200" indent="0" algn="ctr">
+              <a:buNone/>
+              <a:defRPr sz="2800" b="1">
+                <a:latin typeface="Segoe UI Light" panose="020B0502040204020203" pitchFamily="34" charset="0"/>
+                <a:cs typeface="Segoe UI Light" panose="020B0502040204020203" pitchFamily="34" charset="0"/>
+              </a:defRPr>
+            </a:lvl2pPr>
+            <a:lvl3pPr marL="914400" indent="0" algn="ctr">
+              <a:buNone/>
+              <a:defRPr sz="2800" b="1">
+                <a:latin typeface="Segoe UI Light" panose="020B0502040204020203" pitchFamily="34" charset="0"/>
+                <a:cs typeface="Segoe UI Light" panose="020B0502040204020203" pitchFamily="34" charset="0"/>
+              </a:defRPr>
+            </a:lvl3pPr>
+            <a:lvl4pPr marL="1371600" indent="0" algn="ctr">
+              <a:buNone/>
+              <a:defRPr sz="2800" b="1">
+                <a:latin typeface="Segoe UI Light" panose="020B0502040204020203" pitchFamily="34" charset="0"/>
+                <a:cs typeface="Segoe UI Light" panose="020B0502040204020203" pitchFamily="34" charset="0"/>
+              </a:defRPr>
+            </a:lvl4pPr>
+            <a:lvl5pPr marL="1828800" indent="0" algn="ctr">
+              <a:buNone/>
+              <a:defRPr sz="2800" b="1">
+                <a:latin typeface="Segoe UI Light" panose="020B0502040204020203" pitchFamily="34" charset="0"/>
+                <a:cs typeface="Segoe UI Light" panose="020B0502040204020203" pitchFamily="34" charset="0"/>
+              </a:defRPr>
+            </a:lvl5pPr>
+          </a:lstStyle>
+          <a:p>
+            <a:pPr lvl="0"/>
+            <a:endParaRPr lang="de-DE" dirty="0"/>
+          </a:p>
+        </p:txBody>
+      </p:sp>
+      <p:sp>
+        <p:nvSpPr>
+          <p:cNvPr id="41" name="State_Background_8">
+            <a:extLst>
+              <a:ext uri="{FF2B5EF4-FFF2-40B4-BE49-F238E27FC236}">
+                <a16:creationId xmlns:a16="http://schemas.microsoft.com/office/drawing/2014/main" id="{C5973C97-3519-196B-EFE8-DF6794089FEC}"/>
+              </a:ext>
+            </a:extLst>
+          </p:cNvPr>
+          <p:cNvSpPr/>
+          <p:nvPr userDrawn="1"/>
+        </p:nvSpPr>
+        <p:spPr>
+          <a:xfrm>
+            <a:off x="7667607" y="2564456"/>
+            <a:ext cx="3840480" cy="365760"/>
+          </a:xfrm>
+          <a:prstGeom prst="rect">
+            <a:avLst/>
+          </a:prstGeom>
+          <a:gradFill flip="none" rotWithShape="1">
+            <a:gsLst>
+              <a:gs pos="0">
+                <a:srgbClr val="0279D4"/>
+              </a:gs>
+              <a:gs pos="100000">
+                <a:srgbClr val="549BEC"/>
+              </a:gs>
+            </a:gsLst>
+            <a:lin ang="2700000" scaled="1"/>
+            <a:tileRect/>
+          </a:gradFill>
+          <a:ln>
+            <a:noFill/>
+          </a:ln>
+        </p:spPr>
+        <p:style>
+          <a:lnRef idx="2">
+            <a:schemeClr val="accent1">
+              <a:shade val="15000"/>
+            </a:schemeClr>
+          </a:lnRef>
+          <a:fillRef idx="1">
+            <a:schemeClr val="accent1"/>
+          </a:fillRef>
+          <a:effectRef idx="0">
+            <a:schemeClr val="accent1"/>
+          </a:effectRef>
+          <a:fontRef idx="minor">
+            <a:schemeClr val="lt1"/>
+          </a:fontRef>
+        </p:style>
+        <p:txBody>
+          <a:bodyPr rtlCol="0" anchor="ctr"/>
+          <a:lstStyle/>
+          <a:p>
+            <a:pPr algn="ctr"/>
+            <a:endParaRPr lang="de-DE"/>
+          </a:p>
+        </p:txBody>
+      </p:sp>
+      <p:sp>
+        <p:nvSpPr>
+          <p:cNvPr id="42" name="State_Type_8">
+            <a:extLst>
+              <a:ext uri="{FF2B5EF4-FFF2-40B4-BE49-F238E27FC236}">
+                <a16:creationId xmlns:a16="http://schemas.microsoft.com/office/drawing/2014/main" id="{533EC992-87BE-4359-AC7E-8AC3B9DB2026}"/>
+              </a:ext>
+            </a:extLst>
+          </p:cNvPr>
+          <p:cNvSpPr>
+            <a:spLocks noGrp="1"/>
+          </p:cNvSpPr>
+          <p:nvPr>
+            <p:ph idx="25"/>
+          </p:nvPr>
+        </p:nvSpPr>
+        <p:spPr>
+          <a:xfrm>
+            <a:off x="7667607" y="2564457"/>
+            <a:ext cx="3200400" cy="365760"/>
+          </a:xfrm>
+        </p:spPr>
+        <p:txBody>
+          <a:bodyPr anchor="ctr">
+            <a:noAutofit/>
+          </a:bodyPr>
+          <a:lstStyle>
+            <a:lvl1pPr marL="0" indent="0" algn="r">
+              <a:spcBef>
+                <a:spcPts val="400"/>
+              </a:spcBef>
+              <a:buNone/>
+              <a:defRPr lang="de-DE" sz="1800" b="1" kern="1200" dirty="0">
+                <a:solidFill>
+                  <a:schemeClr val="bg1"/>
+                </a:solidFill>
+                <a:latin typeface="Segoe UI Light" panose="020B0502040204020203" pitchFamily="34" charset="0"/>
+                <a:ea typeface="+mn-ea"/>
+                <a:cs typeface="Segoe UI Light" panose="020B0502040204020203" pitchFamily="34" charset="0"/>
+              </a:defRPr>
+            </a:lvl1pPr>
+            <a:lvl2pPr marL="457200" indent="0" algn="ctr">
+              <a:buNone/>
+              <a:defRPr sz="2800" b="1">
+                <a:latin typeface="Segoe UI Light" panose="020B0502040204020203" pitchFamily="34" charset="0"/>
+                <a:cs typeface="Segoe UI Light" panose="020B0502040204020203" pitchFamily="34" charset="0"/>
+              </a:defRPr>
+            </a:lvl2pPr>
+            <a:lvl3pPr marL="914400" indent="0" algn="ctr">
+              <a:buNone/>
+              <a:defRPr sz="2800" b="1">
+                <a:latin typeface="Segoe UI Light" panose="020B0502040204020203" pitchFamily="34" charset="0"/>
+                <a:cs typeface="Segoe UI Light" panose="020B0502040204020203" pitchFamily="34" charset="0"/>
+              </a:defRPr>
+            </a:lvl3pPr>
+            <a:lvl4pPr marL="1371600" indent="0" algn="ctr">
+              <a:buNone/>
+              <a:defRPr sz="2800" b="1">
+                <a:latin typeface="Segoe UI Light" panose="020B0502040204020203" pitchFamily="34" charset="0"/>
+                <a:cs typeface="Segoe UI Light" panose="020B0502040204020203" pitchFamily="34" charset="0"/>
+              </a:defRPr>
+            </a:lvl4pPr>
+            <a:lvl5pPr marL="1828800" indent="0" algn="ctr">
+              <a:buNone/>
+              <a:defRPr sz="2800" b="1">
+                <a:latin typeface="Segoe UI Light" panose="020B0502040204020203" pitchFamily="34" charset="0"/>
+                <a:cs typeface="Segoe UI Light" panose="020B0502040204020203" pitchFamily="34" charset="0"/>
+              </a:defRPr>
+            </a:lvl5pPr>
+          </a:lstStyle>
+          <a:p>
+            <a:pPr lvl="0"/>
+            <a:endParaRPr lang="de-DE" dirty="0"/>
+          </a:p>
+        </p:txBody>
+      </p:sp>
+      <p:sp>
+        <p:nvSpPr>
+          <p:cNvPr id="43" name="State_Count_8">
+            <a:extLst>
+              <a:ext uri="{FF2B5EF4-FFF2-40B4-BE49-F238E27FC236}">
+                <a16:creationId xmlns:a16="http://schemas.microsoft.com/office/drawing/2014/main" id="{A8875E6D-C5E2-91FE-4AA5-13FB62598231}"/>
+              </a:ext>
+            </a:extLst>
+          </p:cNvPr>
+          <p:cNvSpPr>
+            <a:spLocks noGrp="1"/>
+          </p:cNvSpPr>
+          <p:nvPr>
+            <p:ph idx="26"/>
+          </p:nvPr>
+        </p:nvSpPr>
+        <p:spPr>
+          <a:xfrm>
+            <a:off x="10868007" y="2564456"/>
+            <a:ext cx="640080" cy="365760"/>
+          </a:xfrm>
+        </p:spPr>
+        <p:txBody>
+          <a:bodyPr anchor="ctr">
+            <a:noAutofit/>
+          </a:bodyPr>
+          <a:lstStyle>
+            <a:lvl1pPr marL="0" indent="0" algn="ctr">
+              <a:spcBef>
+                <a:spcPts val="400"/>
+              </a:spcBef>
+              <a:buNone/>
+              <a:defRPr lang="de-DE" sz="1800" b="1" kern="1200" dirty="0">
+                <a:solidFill>
+                  <a:schemeClr val="bg1"/>
+                </a:solidFill>
+                <a:latin typeface="Segoe UI Light" panose="020B0502040204020203" pitchFamily="34" charset="0"/>
+                <a:ea typeface="+mn-ea"/>
+                <a:cs typeface="Segoe UI Light" panose="020B0502040204020203" pitchFamily="34" charset="0"/>
+              </a:defRPr>
+            </a:lvl1pPr>
+            <a:lvl2pPr marL="457200" indent="0" algn="ctr">
+              <a:buNone/>
+              <a:defRPr sz="2800" b="1">
+                <a:latin typeface="Segoe UI Light" panose="020B0502040204020203" pitchFamily="34" charset="0"/>
+                <a:cs typeface="Segoe UI Light" panose="020B0502040204020203" pitchFamily="34" charset="0"/>
+              </a:defRPr>
+            </a:lvl2pPr>
+            <a:lvl3pPr marL="914400" indent="0" algn="ctr">
+              <a:buNone/>
+              <a:defRPr sz="2800" b="1">
+                <a:latin typeface="Segoe UI Light" panose="020B0502040204020203" pitchFamily="34" charset="0"/>
+                <a:cs typeface="Segoe UI Light" panose="020B0502040204020203" pitchFamily="34" charset="0"/>
+              </a:defRPr>
+            </a:lvl3pPr>
+            <a:lvl4pPr marL="1371600" indent="0" algn="ctr">
+              <a:buNone/>
+              <a:defRPr sz="2800" b="1">
+                <a:latin typeface="Segoe UI Light" panose="020B0502040204020203" pitchFamily="34" charset="0"/>
+                <a:cs typeface="Segoe UI Light" panose="020B0502040204020203" pitchFamily="34" charset="0"/>
+              </a:defRPr>
+            </a:lvl4pPr>
+            <a:lvl5pPr marL="1828800" indent="0" algn="ctr">
+              <a:buNone/>
+              <a:defRPr sz="2800" b="1">
+                <a:latin typeface="Segoe UI Light" panose="020B0502040204020203" pitchFamily="34" charset="0"/>
+                <a:cs typeface="Segoe UI Light" panose="020B0502040204020203" pitchFamily="34" charset="0"/>
+              </a:defRPr>
+            </a:lvl5pPr>
+          </a:lstStyle>
+          <a:p>
+            <a:pPr lvl="0"/>
+            <a:endParaRPr lang="de-DE" dirty="0"/>
+          </a:p>
+        </p:txBody>
+      </p:sp>
+      <p:sp>
+        <p:nvSpPr>
+          <p:cNvPr id="44" name="State_Background_9">
+            <a:extLst>
+              <a:ext uri="{FF2B5EF4-FFF2-40B4-BE49-F238E27FC236}">
+                <a16:creationId xmlns:a16="http://schemas.microsoft.com/office/drawing/2014/main" id="{293B701B-F0AE-8CFB-3D03-33EB48EE2F61}"/>
+              </a:ext>
+            </a:extLst>
+          </p:cNvPr>
+          <p:cNvSpPr/>
+          <p:nvPr userDrawn="1"/>
+        </p:nvSpPr>
+        <p:spPr>
+          <a:xfrm>
+            <a:off x="7667607" y="3082570"/>
+            <a:ext cx="3840480" cy="365760"/>
+          </a:xfrm>
+          <a:prstGeom prst="rect">
+            <a:avLst/>
+          </a:prstGeom>
+          <a:gradFill flip="none" rotWithShape="1">
+            <a:gsLst>
+              <a:gs pos="0">
+                <a:srgbClr val="0279D4"/>
+              </a:gs>
+              <a:gs pos="100000">
+                <a:srgbClr val="549BEC"/>
+              </a:gs>
+            </a:gsLst>
+            <a:lin ang="2700000" scaled="1"/>
+            <a:tileRect/>
+          </a:gradFill>
+          <a:ln>
+            <a:noFill/>
+          </a:ln>
+        </p:spPr>
+        <p:style>
+          <a:lnRef idx="2">
+            <a:schemeClr val="accent1">
+              <a:shade val="15000"/>
+            </a:schemeClr>
+          </a:lnRef>
+          <a:fillRef idx="1">
+            <a:schemeClr val="accent1"/>
+          </a:fillRef>
+          <a:effectRef idx="0">
+            <a:schemeClr val="accent1"/>
+          </a:effectRef>
+          <a:fontRef idx="minor">
+            <a:schemeClr val="lt1"/>
+          </a:fontRef>
+        </p:style>
+        <p:txBody>
+          <a:bodyPr rtlCol="0" anchor="ctr"/>
+          <a:lstStyle/>
+          <a:p>
+            <a:pPr algn="ctr"/>
+            <a:endParaRPr lang="de-DE"/>
+          </a:p>
+        </p:txBody>
+      </p:sp>
+      <p:sp>
+        <p:nvSpPr>
+          <p:cNvPr id="45" name="State_Type_9">
+            <a:extLst>
+              <a:ext uri="{FF2B5EF4-FFF2-40B4-BE49-F238E27FC236}">
+                <a16:creationId xmlns:a16="http://schemas.microsoft.com/office/drawing/2014/main" id="{B1B246BB-8B2C-1BC6-B6E8-C99927EE1463}"/>
+              </a:ext>
+            </a:extLst>
+          </p:cNvPr>
+          <p:cNvSpPr>
+            <a:spLocks noGrp="1"/>
+          </p:cNvSpPr>
+          <p:nvPr>
+            <p:ph idx="27"/>
+          </p:nvPr>
+        </p:nvSpPr>
+        <p:spPr>
+          <a:xfrm>
+            <a:off x="7667607" y="3082571"/>
+            <a:ext cx="3200400" cy="365760"/>
+          </a:xfrm>
+        </p:spPr>
+        <p:txBody>
+          <a:bodyPr anchor="ctr">
+            <a:noAutofit/>
+          </a:bodyPr>
+          <a:lstStyle>
+            <a:lvl1pPr marL="0" indent="0" algn="r">
+              <a:spcBef>
+                <a:spcPts val="400"/>
+              </a:spcBef>
+              <a:buNone/>
+              <a:defRPr lang="de-DE" sz="1800" b="1" kern="1200" dirty="0">
+                <a:solidFill>
+                  <a:schemeClr val="bg1"/>
+                </a:solidFill>
+                <a:latin typeface="Segoe UI Light" panose="020B0502040204020203" pitchFamily="34" charset="0"/>
+                <a:ea typeface="+mn-ea"/>
+                <a:cs typeface="Segoe UI Light" panose="020B0502040204020203" pitchFamily="34" charset="0"/>
+              </a:defRPr>
+            </a:lvl1pPr>
+            <a:lvl2pPr marL="457200" indent="0" algn="ctr">
+              <a:buNone/>
+              <a:defRPr sz="2800" b="1">
+                <a:latin typeface="Segoe UI Light" panose="020B0502040204020203" pitchFamily="34" charset="0"/>
+                <a:cs typeface="Segoe UI Light" panose="020B0502040204020203" pitchFamily="34" charset="0"/>
+              </a:defRPr>
+            </a:lvl2pPr>
+            <a:lvl3pPr marL="914400" indent="0" algn="ctr">
+              <a:buNone/>
+              <a:defRPr sz="2800" b="1">
+                <a:latin typeface="Segoe UI Light" panose="020B0502040204020203" pitchFamily="34" charset="0"/>
+                <a:cs typeface="Segoe UI Light" panose="020B0502040204020203" pitchFamily="34" charset="0"/>
+              </a:defRPr>
+            </a:lvl3pPr>
+            <a:lvl4pPr marL="1371600" indent="0" algn="ctr">
+              <a:buNone/>
+              <a:defRPr sz="2800" b="1">
+                <a:latin typeface="Segoe UI Light" panose="020B0502040204020203" pitchFamily="34" charset="0"/>
+                <a:cs typeface="Segoe UI Light" panose="020B0502040204020203" pitchFamily="34" charset="0"/>
+              </a:defRPr>
+            </a:lvl4pPr>
+            <a:lvl5pPr marL="1828800" indent="0" algn="ctr">
+              <a:buNone/>
+              <a:defRPr sz="2800" b="1">
+                <a:latin typeface="Segoe UI Light" panose="020B0502040204020203" pitchFamily="34" charset="0"/>
+                <a:cs typeface="Segoe UI Light" panose="020B0502040204020203" pitchFamily="34" charset="0"/>
+              </a:defRPr>
+            </a:lvl5pPr>
+          </a:lstStyle>
+          <a:p>
+            <a:pPr lvl="0"/>
+            <a:endParaRPr lang="de-DE" dirty="0"/>
+          </a:p>
+        </p:txBody>
+      </p:sp>
+      <p:sp>
+        <p:nvSpPr>
+          <p:cNvPr id="46" name="State_Count_9">
+            <a:extLst>
+              <a:ext uri="{FF2B5EF4-FFF2-40B4-BE49-F238E27FC236}">
+                <a16:creationId xmlns:a16="http://schemas.microsoft.com/office/drawing/2014/main" id="{AC854B36-312C-B25E-E8C0-758B2F38D8CD}"/>
+              </a:ext>
+            </a:extLst>
+          </p:cNvPr>
+          <p:cNvSpPr>
+            <a:spLocks noGrp="1"/>
+          </p:cNvSpPr>
+          <p:nvPr>
+            <p:ph idx="28"/>
+          </p:nvPr>
+        </p:nvSpPr>
+        <p:spPr>
+          <a:xfrm>
+            <a:off x="10868007" y="3082570"/>
+            <a:ext cx="640080" cy="365760"/>
+          </a:xfrm>
+        </p:spPr>
+        <p:txBody>
+          <a:bodyPr anchor="ctr">
+            <a:noAutofit/>
+          </a:bodyPr>
+          <a:lstStyle>
+            <a:lvl1pPr marL="0" indent="0" algn="ctr">
+              <a:spcBef>
+                <a:spcPts val="400"/>
+              </a:spcBef>
+              <a:buNone/>
+              <a:defRPr lang="de-DE" sz="1800" b="1" kern="1200" dirty="0">
+                <a:solidFill>
+                  <a:schemeClr val="bg1"/>
+                </a:solidFill>
+                <a:latin typeface="Segoe UI Light" panose="020B0502040204020203" pitchFamily="34" charset="0"/>
+                <a:ea typeface="+mn-ea"/>
+                <a:cs typeface="Segoe UI Light" panose="020B0502040204020203" pitchFamily="34" charset="0"/>
+              </a:defRPr>
+            </a:lvl1pPr>
+            <a:lvl2pPr marL="457200" indent="0" algn="ctr">
+              <a:buNone/>
+              <a:defRPr sz="2800" b="1">
+                <a:latin typeface="Segoe UI Light" panose="020B0502040204020203" pitchFamily="34" charset="0"/>
+                <a:cs typeface="Segoe UI Light" panose="020B0502040204020203" pitchFamily="34" charset="0"/>
+              </a:defRPr>
+            </a:lvl2pPr>
+            <a:lvl3pPr marL="914400" indent="0" algn="ctr">
+              <a:buNone/>
+              <a:defRPr sz="2800" b="1">
+                <a:latin typeface="Segoe UI Light" panose="020B0502040204020203" pitchFamily="34" charset="0"/>
+                <a:cs typeface="Segoe UI Light" panose="020B0502040204020203" pitchFamily="34" charset="0"/>
+              </a:defRPr>
+            </a:lvl3pPr>
+            <a:lvl4pPr marL="1371600" indent="0" algn="ctr">
+              <a:buNone/>
+              <a:defRPr sz="2800" b="1">
+                <a:latin typeface="Segoe UI Light" panose="020B0502040204020203" pitchFamily="34" charset="0"/>
+                <a:cs typeface="Segoe UI Light" panose="020B0502040204020203" pitchFamily="34" charset="0"/>
+              </a:defRPr>
+            </a:lvl4pPr>
+            <a:lvl5pPr marL="1828800" indent="0" algn="ctr">
+              <a:buNone/>
+              <a:defRPr sz="2800" b="1">
+                <a:latin typeface="Segoe UI Light" panose="020B0502040204020203" pitchFamily="34" charset="0"/>
+                <a:cs typeface="Segoe UI Light" panose="020B0502040204020203" pitchFamily="34" charset="0"/>
+              </a:defRPr>
+            </a:lvl5pPr>
+          </a:lstStyle>
+          <a:p>
+            <a:pPr lvl="0"/>
+            <a:endParaRPr lang="de-DE" dirty="0"/>
+          </a:p>
+        </p:txBody>
+      </p:sp>
+      <p:sp>
+        <p:nvSpPr>
+          <p:cNvPr id="47" name="State_Background_10">
+            <a:extLst>
+              <a:ext uri="{FF2B5EF4-FFF2-40B4-BE49-F238E27FC236}">
+                <a16:creationId xmlns:a16="http://schemas.microsoft.com/office/drawing/2014/main" id="{B696F43D-DB69-89AB-E32F-07580A453B93}"/>
+              </a:ext>
+            </a:extLst>
+          </p:cNvPr>
+          <p:cNvSpPr/>
+          <p:nvPr userDrawn="1"/>
+        </p:nvSpPr>
+        <p:spPr>
+          <a:xfrm>
+            <a:off x="7667607" y="3566561"/>
+            <a:ext cx="3840480" cy="365760"/>
+          </a:xfrm>
+          <a:prstGeom prst="rect">
+            <a:avLst/>
+          </a:prstGeom>
+          <a:gradFill flip="none" rotWithShape="1">
+            <a:gsLst>
+              <a:gs pos="0">
+                <a:srgbClr val="0279D4"/>
+              </a:gs>
+              <a:gs pos="100000">
+                <a:srgbClr val="549BEC"/>
+              </a:gs>
+            </a:gsLst>
+            <a:lin ang="2700000" scaled="1"/>
+            <a:tileRect/>
+          </a:gradFill>
+          <a:ln>
+            <a:noFill/>
+          </a:ln>
+        </p:spPr>
+        <p:style>
+          <a:lnRef idx="2">
+            <a:schemeClr val="accent1">
+              <a:shade val="15000"/>
+            </a:schemeClr>
+          </a:lnRef>
+          <a:fillRef idx="1">
+            <a:schemeClr val="accent1"/>
+          </a:fillRef>
+          <a:effectRef idx="0">
+            <a:schemeClr val="accent1"/>
+          </a:effectRef>
+          <a:fontRef idx="minor">
+            <a:schemeClr val="lt1"/>
+          </a:fontRef>
+        </p:style>
+        <p:txBody>
+          <a:bodyPr rtlCol="0" anchor="ctr"/>
+          <a:lstStyle/>
+          <a:p>
+            <a:pPr algn="ctr"/>
+            <a:endParaRPr lang="de-DE"/>
+          </a:p>
+        </p:txBody>
+      </p:sp>
+      <p:sp>
+        <p:nvSpPr>
+          <p:cNvPr id="48" name="State_Type_10">
+            <a:extLst>
+              <a:ext uri="{FF2B5EF4-FFF2-40B4-BE49-F238E27FC236}">
+                <a16:creationId xmlns:a16="http://schemas.microsoft.com/office/drawing/2014/main" id="{384F81B2-FF69-39DE-DC3C-29882198ECE9}"/>
+              </a:ext>
+            </a:extLst>
+          </p:cNvPr>
+          <p:cNvSpPr>
+            <a:spLocks noGrp="1"/>
+          </p:cNvSpPr>
+          <p:nvPr>
+            <p:ph idx="29"/>
+          </p:nvPr>
+        </p:nvSpPr>
+        <p:spPr>
+          <a:xfrm>
+            <a:off x="7667607" y="3566562"/>
+            <a:ext cx="3200400" cy="365760"/>
+          </a:xfrm>
+        </p:spPr>
+        <p:txBody>
+          <a:bodyPr anchor="ctr">
+            <a:noAutofit/>
+          </a:bodyPr>
+          <a:lstStyle>
+            <a:lvl1pPr marL="0" indent="0" algn="r">
+              <a:spcBef>
+                <a:spcPts val="400"/>
+              </a:spcBef>
+              <a:buNone/>
+              <a:defRPr lang="de-DE" sz="1800" b="1" kern="1200" dirty="0">
+                <a:solidFill>
+                  <a:schemeClr val="bg1"/>
+                </a:solidFill>
+                <a:latin typeface="Segoe UI Light" panose="020B0502040204020203" pitchFamily="34" charset="0"/>
+                <a:ea typeface="+mn-ea"/>
+                <a:cs typeface="Segoe UI Light" panose="020B0502040204020203" pitchFamily="34" charset="0"/>
+              </a:defRPr>
+            </a:lvl1pPr>
+            <a:lvl2pPr marL="457200" indent="0" algn="ctr">
+              <a:buNone/>
+              <a:defRPr sz="2800" b="1">
+                <a:latin typeface="Segoe UI Light" panose="020B0502040204020203" pitchFamily="34" charset="0"/>
+                <a:cs typeface="Segoe UI Light" panose="020B0502040204020203" pitchFamily="34" charset="0"/>
+              </a:defRPr>
+            </a:lvl2pPr>
+            <a:lvl3pPr marL="914400" indent="0" algn="ctr">
+              <a:buNone/>
+              <a:defRPr sz="2800" b="1">
+                <a:latin typeface="Segoe UI Light" panose="020B0502040204020203" pitchFamily="34" charset="0"/>
+                <a:cs typeface="Segoe UI Light" panose="020B0502040204020203" pitchFamily="34" charset="0"/>
+              </a:defRPr>
+            </a:lvl3pPr>
+            <a:lvl4pPr marL="1371600" indent="0" algn="ctr">
+              <a:buNone/>
+              <a:defRPr sz="2800" b="1">
+                <a:latin typeface="Segoe UI Light" panose="020B0502040204020203" pitchFamily="34" charset="0"/>
+                <a:cs typeface="Segoe UI Light" panose="020B0502040204020203" pitchFamily="34" charset="0"/>
+              </a:defRPr>
+            </a:lvl4pPr>
+            <a:lvl5pPr marL="1828800" indent="0" algn="ctr">
+              <a:buNone/>
+              <a:defRPr sz="2800" b="1">
+                <a:latin typeface="Segoe UI Light" panose="020B0502040204020203" pitchFamily="34" charset="0"/>
+                <a:cs typeface="Segoe UI Light" panose="020B0502040204020203" pitchFamily="34" charset="0"/>
+              </a:defRPr>
+            </a:lvl5pPr>
+          </a:lstStyle>
+          <a:p>
+            <a:pPr lvl="0"/>
+            <a:endParaRPr lang="de-DE" dirty="0"/>
+          </a:p>
+        </p:txBody>
+      </p:sp>
+      <p:sp>
+        <p:nvSpPr>
+          <p:cNvPr id="49" name="State_Count_10">
+            <a:extLst>
+              <a:ext uri="{FF2B5EF4-FFF2-40B4-BE49-F238E27FC236}">
+                <a16:creationId xmlns:a16="http://schemas.microsoft.com/office/drawing/2014/main" id="{B3B61072-DF2F-8B78-35CD-C288878F80B7}"/>
+              </a:ext>
+            </a:extLst>
+          </p:cNvPr>
+          <p:cNvSpPr>
+            <a:spLocks noGrp="1"/>
+          </p:cNvSpPr>
+          <p:nvPr>
+            <p:ph idx="30"/>
+          </p:nvPr>
+        </p:nvSpPr>
+        <p:spPr>
+          <a:xfrm>
+            <a:off x="10868007" y="3566561"/>
+            <a:ext cx="640080" cy="365760"/>
+          </a:xfrm>
+        </p:spPr>
+        <p:txBody>
+          <a:bodyPr anchor="ctr">
+            <a:noAutofit/>
+          </a:bodyPr>
+          <a:lstStyle>
+            <a:lvl1pPr marL="0" indent="0" algn="ctr">
+              <a:spcBef>
+                <a:spcPts val="400"/>
+              </a:spcBef>
+              <a:buNone/>
+              <a:defRPr lang="de-DE" sz="1800" b="1" kern="1200" dirty="0">
+                <a:solidFill>
+                  <a:schemeClr val="bg1"/>
+                </a:solidFill>
+                <a:latin typeface="Segoe UI Light" panose="020B0502040204020203" pitchFamily="34" charset="0"/>
+                <a:ea typeface="+mn-ea"/>
+                <a:cs typeface="Segoe UI Light" panose="020B0502040204020203" pitchFamily="34" charset="0"/>
+              </a:defRPr>
+            </a:lvl1pPr>
+            <a:lvl2pPr marL="457200" indent="0" algn="ctr">
+              <a:buNone/>
+              <a:defRPr sz="2800" b="1">
+                <a:latin typeface="Segoe UI Light" panose="020B0502040204020203" pitchFamily="34" charset="0"/>
+                <a:cs typeface="Segoe UI Light" panose="020B0502040204020203" pitchFamily="34" charset="0"/>
+              </a:defRPr>
+            </a:lvl2pPr>
+            <a:lvl3pPr marL="914400" indent="0" algn="ctr">
+              <a:buNone/>
+              <a:defRPr sz="2800" b="1">
+                <a:latin typeface="Segoe UI Light" panose="020B0502040204020203" pitchFamily="34" charset="0"/>
+                <a:cs typeface="Segoe UI Light" panose="020B0502040204020203" pitchFamily="34" charset="0"/>
+              </a:defRPr>
+            </a:lvl3pPr>
+            <a:lvl4pPr marL="1371600" indent="0" algn="ctr">
+              <a:buNone/>
+              <a:defRPr sz="2800" b="1">
+                <a:latin typeface="Segoe UI Light" panose="020B0502040204020203" pitchFamily="34" charset="0"/>
+                <a:cs typeface="Segoe UI Light" panose="020B0502040204020203" pitchFamily="34" charset="0"/>
+              </a:defRPr>
+            </a:lvl4pPr>
+            <a:lvl5pPr marL="1828800" indent="0" algn="ctr">
+              <a:buNone/>
+              <a:defRPr sz="2800" b="1">
+                <a:latin typeface="Segoe UI Light" panose="020B0502040204020203" pitchFamily="34" charset="0"/>
+                <a:cs typeface="Segoe UI Light" panose="020B0502040204020203" pitchFamily="34" charset="0"/>
+              </a:defRPr>
+            </a:lvl5pPr>
+          </a:lstStyle>
+          <a:p>
+            <a:pPr lvl="0"/>
+            <a:endParaRPr lang="de-DE" dirty="0"/>
+          </a:p>
+        </p:txBody>
+      </p:sp>
+      <p:sp>
+        <p:nvSpPr>
+          <p:cNvPr id="50" name="State_Background_11">
+            <a:extLst>
+              <a:ext uri="{FF2B5EF4-FFF2-40B4-BE49-F238E27FC236}">
+                <a16:creationId xmlns:a16="http://schemas.microsoft.com/office/drawing/2014/main" id="{F1F54579-E485-8D0F-CC2A-2FCD71AA8D1F}"/>
+              </a:ext>
+            </a:extLst>
+          </p:cNvPr>
+          <p:cNvSpPr/>
+          <p:nvPr userDrawn="1"/>
+        </p:nvSpPr>
+        <p:spPr>
+          <a:xfrm>
+            <a:off x="7667607" y="4084676"/>
+            <a:ext cx="3840480" cy="365760"/>
+          </a:xfrm>
+          <a:prstGeom prst="rect">
+            <a:avLst/>
+          </a:prstGeom>
+          <a:gradFill flip="none" rotWithShape="1">
+            <a:gsLst>
+              <a:gs pos="0">
+                <a:srgbClr val="0279D4"/>
+              </a:gs>
+              <a:gs pos="100000">
+                <a:srgbClr val="549BEC"/>
+              </a:gs>
+            </a:gsLst>
+            <a:lin ang="2700000" scaled="1"/>
+            <a:tileRect/>
+          </a:gradFill>
+          <a:ln>
+            <a:noFill/>
+          </a:ln>
+        </p:spPr>
+        <p:style>
+          <a:lnRef idx="2">
+            <a:schemeClr val="accent1">
+              <a:shade val="15000"/>
+            </a:schemeClr>
+          </a:lnRef>
+          <a:fillRef idx="1">
+            <a:schemeClr val="accent1"/>
+          </a:fillRef>
+          <a:effectRef idx="0">
+            <a:schemeClr val="accent1"/>
+          </a:effectRef>
+          <a:fontRef idx="minor">
+            <a:schemeClr val="lt1"/>
+          </a:fontRef>
+        </p:style>
+        <p:txBody>
+          <a:bodyPr rtlCol="0" anchor="ctr"/>
+          <a:lstStyle/>
+          <a:p>
+            <a:pPr algn="ctr"/>
+            <a:endParaRPr lang="de-DE"/>
+          </a:p>
+        </p:txBody>
+      </p:sp>
+      <p:sp>
+        <p:nvSpPr>
+          <p:cNvPr id="51" name="State_Type_11">
+            <a:extLst>
+              <a:ext uri="{FF2B5EF4-FFF2-40B4-BE49-F238E27FC236}">
+                <a16:creationId xmlns:a16="http://schemas.microsoft.com/office/drawing/2014/main" id="{6BBF5B4E-804D-AA78-2DD3-D37DEFEC4B8D}"/>
+              </a:ext>
+            </a:extLst>
+          </p:cNvPr>
+          <p:cNvSpPr>
+            <a:spLocks noGrp="1"/>
+          </p:cNvSpPr>
+          <p:nvPr>
+            <p:ph idx="31"/>
+          </p:nvPr>
+        </p:nvSpPr>
+        <p:spPr>
+          <a:xfrm>
+            <a:off x="7667607" y="4084677"/>
+            <a:ext cx="3200400" cy="365760"/>
+          </a:xfrm>
+        </p:spPr>
+        <p:txBody>
+          <a:bodyPr anchor="ctr">
+            <a:noAutofit/>
+          </a:bodyPr>
+          <a:lstStyle>
+            <a:lvl1pPr marL="0" indent="0" algn="r">
+              <a:spcBef>
+                <a:spcPts val="400"/>
+              </a:spcBef>
+              <a:buNone/>
+              <a:defRPr lang="de-DE" sz="1800" b="1" kern="1200" dirty="0">
+                <a:solidFill>
+                  <a:schemeClr val="bg1"/>
+                </a:solidFill>
+                <a:latin typeface="Segoe UI Light" panose="020B0502040204020203" pitchFamily="34" charset="0"/>
+                <a:ea typeface="+mn-ea"/>
+                <a:cs typeface="Segoe UI Light" panose="020B0502040204020203" pitchFamily="34" charset="0"/>
+              </a:defRPr>
+            </a:lvl1pPr>
+            <a:lvl2pPr marL="457200" indent="0" algn="ctr">
+              <a:buNone/>
+              <a:defRPr sz="2800" b="1">
+                <a:latin typeface="Segoe UI Light" panose="020B0502040204020203" pitchFamily="34" charset="0"/>
+                <a:cs typeface="Segoe UI Light" panose="020B0502040204020203" pitchFamily="34" charset="0"/>
+              </a:defRPr>
+            </a:lvl2pPr>
+            <a:lvl3pPr marL="914400" indent="0" algn="ctr">
+              <a:buNone/>
+              <a:defRPr sz="2800" b="1">
+                <a:latin typeface="Segoe UI Light" panose="020B0502040204020203" pitchFamily="34" charset="0"/>
+                <a:cs typeface="Segoe UI Light" panose="020B0502040204020203" pitchFamily="34" charset="0"/>
+              </a:defRPr>
+            </a:lvl3pPr>
+            <a:lvl4pPr marL="1371600" indent="0" algn="ctr">
+              <a:buNone/>
+              <a:defRPr sz="2800" b="1">
+                <a:latin typeface="Segoe UI Light" panose="020B0502040204020203" pitchFamily="34" charset="0"/>
+                <a:cs typeface="Segoe UI Light" panose="020B0502040204020203" pitchFamily="34" charset="0"/>
+              </a:defRPr>
+            </a:lvl4pPr>
+            <a:lvl5pPr marL="1828800" indent="0" algn="ctr">
+              <a:buNone/>
+              <a:defRPr sz="2800" b="1">
+                <a:latin typeface="Segoe UI Light" panose="020B0502040204020203" pitchFamily="34" charset="0"/>
+                <a:cs typeface="Segoe UI Light" panose="020B0502040204020203" pitchFamily="34" charset="0"/>
+              </a:defRPr>
+            </a:lvl5pPr>
+          </a:lstStyle>
+          <a:p>
+            <a:pPr lvl="0"/>
+            <a:endParaRPr lang="de-DE" dirty="0"/>
+          </a:p>
+        </p:txBody>
+      </p:sp>
+      <p:sp>
+        <p:nvSpPr>
+          <p:cNvPr id="52" name="State_Count_11">
+            <a:extLst>
+              <a:ext uri="{FF2B5EF4-FFF2-40B4-BE49-F238E27FC236}">
+                <a16:creationId xmlns:a16="http://schemas.microsoft.com/office/drawing/2014/main" id="{79560872-1E20-2014-F4E2-E8415233EB6B}"/>
+              </a:ext>
+            </a:extLst>
+          </p:cNvPr>
+          <p:cNvSpPr>
+            <a:spLocks noGrp="1"/>
+          </p:cNvSpPr>
+          <p:nvPr>
+            <p:ph idx="32"/>
+          </p:nvPr>
+        </p:nvSpPr>
+        <p:spPr>
+          <a:xfrm>
+            <a:off x="10868007" y="4084676"/>
+            <a:ext cx="640080" cy="365760"/>
+          </a:xfrm>
+        </p:spPr>
+        <p:txBody>
+          <a:bodyPr anchor="ctr">
+            <a:noAutofit/>
+          </a:bodyPr>
+          <a:lstStyle>
+            <a:lvl1pPr marL="0" indent="0" algn="ctr">
+              <a:spcBef>
+                <a:spcPts val="400"/>
+              </a:spcBef>
+              <a:buNone/>
+              <a:defRPr lang="de-DE" sz="1800" b="1" kern="1200" dirty="0">
+                <a:solidFill>
+                  <a:schemeClr val="bg1"/>
+                </a:solidFill>
+                <a:latin typeface="Segoe UI Light" panose="020B0502040204020203" pitchFamily="34" charset="0"/>
+                <a:ea typeface="+mn-ea"/>
+                <a:cs typeface="Segoe UI Light" panose="020B0502040204020203" pitchFamily="34" charset="0"/>
+              </a:defRPr>
+            </a:lvl1pPr>
+            <a:lvl2pPr marL="457200" indent="0" algn="ctr">
+              <a:buNone/>
+              <a:defRPr sz="2800" b="1">
+                <a:latin typeface="Segoe UI Light" panose="020B0502040204020203" pitchFamily="34" charset="0"/>
+                <a:cs typeface="Segoe UI Light" panose="020B0502040204020203" pitchFamily="34" charset="0"/>
+              </a:defRPr>
+            </a:lvl2pPr>
+            <a:lvl3pPr marL="914400" indent="0" algn="ctr">
+              <a:buNone/>
+              <a:defRPr sz="2800" b="1">
+                <a:latin typeface="Segoe UI Light" panose="020B0502040204020203" pitchFamily="34" charset="0"/>
+                <a:cs typeface="Segoe UI Light" panose="020B0502040204020203" pitchFamily="34" charset="0"/>
+              </a:defRPr>
+            </a:lvl3pPr>
+            <a:lvl4pPr marL="1371600" indent="0" algn="ctr">
+              <a:buNone/>
+              <a:defRPr sz="2800" b="1">
+                <a:latin typeface="Segoe UI Light" panose="020B0502040204020203" pitchFamily="34" charset="0"/>
+                <a:cs typeface="Segoe UI Light" panose="020B0502040204020203" pitchFamily="34" charset="0"/>
+              </a:defRPr>
+            </a:lvl4pPr>
+            <a:lvl5pPr marL="1828800" indent="0" algn="ctr">
+              <a:buNone/>
+              <a:defRPr sz="2800" b="1">
+                <a:latin typeface="Segoe UI Light" panose="020B0502040204020203" pitchFamily="34" charset="0"/>
+                <a:cs typeface="Segoe UI Light" panose="020B0502040204020203" pitchFamily="34" charset="0"/>
+              </a:defRPr>
+            </a:lvl5pPr>
+          </a:lstStyle>
+          <a:p>
+            <a:pPr lvl="0"/>
+            <a:endParaRPr lang="de-DE" dirty="0"/>
+          </a:p>
+        </p:txBody>
+      </p:sp>
+      <p:sp>
+        <p:nvSpPr>
+          <p:cNvPr id="53" name="State_Background_12">
+            <a:extLst>
+              <a:ext uri="{FF2B5EF4-FFF2-40B4-BE49-F238E27FC236}">
+                <a16:creationId xmlns:a16="http://schemas.microsoft.com/office/drawing/2014/main" id="{1EF2344D-2ED4-E407-F32F-8AEA2509CE65}"/>
+              </a:ext>
+            </a:extLst>
+          </p:cNvPr>
+          <p:cNvSpPr/>
+          <p:nvPr userDrawn="1"/>
+        </p:nvSpPr>
+        <p:spPr>
+          <a:xfrm>
+            <a:off x="7667607" y="4602790"/>
+            <a:ext cx="3840480" cy="365760"/>
+          </a:xfrm>
+          <a:prstGeom prst="rect">
+            <a:avLst/>
+          </a:prstGeom>
+          <a:gradFill flip="none" rotWithShape="1">
+            <a:gsLst>
+              <a:gs pos="0">
+                <a:srgbClr val="0279D4"/>
+              </a:gs>
+              <a:gs pos="100000">
+                <a:srgbClr val="549BEC"/>
+              </a:gs>
+            </a:gsLst>
+            <a:lin ang="2700000" scaled="1"/>
+            <a:tileRect/>
+          </a:gradFill>
+          <a:ln>
+            <a:noFill/>
+          </a:ln>
+        </p:spPr>
+        <p:style>
+          <a:lnRef idx="2">
+            <a:schemeClr val="accent1">
+              <a:shade val="15000"/>
+            </a:schemeClr>
+          </a:lnRef>
+          <a:fillRef idx="1">
+            <a:schemeClr val="accent1"/>
+          </a:fillRef>
+          <a:effectRef idx="0">
+            <a:schemeClr val="accent1"/>
+          </a:effectRef>
+          <a:fontRef idx="minor">
+            <a:schemeClr val="lt1"/>
+          </a:fontRef>
+        </p:style>
+        <p:txBody>
+          <a:bodyPr rtlCol="0" anchor="ctr"/>
+          <a:lstStyle/>
+          <a:p>
+            <a:pPr algn="ctr"/>
+            <a:endParaRPr lang="de-DE"/>
+          </a:p>
+        </p:txBody>
+      </p:sp>
+      <p:sp>
+        <p:nvSpPr>
+          <p:cNvPr id="54" name="State_Type_12">
+            <a:extLst>
+              <a:ext uri="{FF2B5EF4-FFF2-40B4-BE49-F238E27FC236}">
+                <a16:creationId xmlns:a16="http://schemas.microsoft.com/office/drawing/2014/main" id="{29D85A0C-F099-0E1E-8ADD-4109AD7135FE}"/>
+              </a:ext>
+            </a:extLst>
+          </p:cNvPr>
+          <p:cNvSpPr>
+            <a:spLocks noGrp="1"/>
+          </p:cNvSpPr>
+          <p:nvPr>
+            <p:ph idx="33"/>
+          </p:nvPr>
+        </p:nvSpPr>
+        <p:spPr>
+          <a:xfrm>
+            <a:off x="7667607" y="4602791"/>
+            <a:ext cx="3200400" cy="365760"/>
+          </a:xfrm>
+        </p:spPr>
+        <p:txBody>
+          <a:bodyPr anchor="ctr">
+            <a:noAutofit/>
+          </a:bodyPr>
+          <a:lstStyle>
+            <a:lvl1pPr marL="0" indent="0" algn="r">
+              <a:spcBef>
+                <a:spcPts val="400"/>
+              </a:spcBef>
+              <a:buNone/>
+              <a:defRPr lang="de-DE" sz="1800" b="1" kern="1200" dirty="0">
+                <a:solidFill>
+                  <a:schemeClr val="bg1"/>
+                </a:solidFill>
+                <a:latin typeface="Segoe UI Light" panose="020B0502040204020203" pitchFamily="34" charset="0"/>
+                <a:ea typeface="+mn-ea"/>
+                <a:cs typeface="Segoe UI Light" panose="020B0502040204020203" pitchFamily="34" charset="0"/>
+              </a:defRPr>
+            </a:lvl1pPr>
+            <a:lvl2pPr marL="457200" indent="0" algn="ctr">
+              <a:buNone/>
+              <a:defRPr sz="2800" b="1">
+                <a:latin typeface="Segoe UI Light" panose="020B0502040204020203" pitchFamily="34" charset="0"/>
+                <a:cs typeface="Segoe UI Light" panose="020B0502040204020203" pitchFamily="34" charset="0"/>
+              </a:defRPr>
+            </a:lvl2pPr>
+            <a:lvl3pPr marL="914400" indent="0" algn="ctr">
+              <a:buNone/>
+              <a:defRPr sz="2800" b="1">
+                <a:latin typeface="Segoe UI Light" panose="020B0502040204020203" pitchFamily="34" charset="0"/>
+                <a:cs typeface="Segoe UI Light" panose="020B0502040204020203" pitchFamily="34" charset="0"/>
+              </a:defRPr>
+            </a:lvl3pPr>
+            <a:lvl4pPr marL="1371600" indent="0" algn="ctr">
+              <a:buNone/>
+              <a:defRPr sz="2800" b="1">
+                <a:latin typeface="Segoe UI Light" panose="020B0502040204020203" pitchFamily="34" charset="0"/>
+                <a:cs typeface="Segoe UI Light" panose="020B0502040204020203" pitchFamily="34" charset="0"/>
+              </a:defRPr>
+            </a:lvl4pPr>
+            <a:lvl5pPr marL="1828800" indent="0" algn="ctr">
+              <a:buNone/>
+              <a:defRPr sz="2800" b="1">
+                <a:latin typeface="Segoe UI Light" panose="020B0502040204020203" pitchFamily="34" charset="0"/>
+                <a:cs typeface="Segoe UI Light" panose="020B0502040204020203" pitchFamily="34" charset="0"/>
+              </a:defRPr>
+            </a:lvl5pPr>
+          </a:lstStyle>
+          <a:p>
+            <a:pPr lvl="0"/>
+            <a:endParaRPr lang="de-DE" dirty="0"/>
+          </a:p>
+        </p:txBody>
+      </p:sp>
+      <p:sp>
+        <p:nvSpPr>
+          <p:cNvPr id="55" name="State_Count_12">
+            <a:extLst>
+              <a:ext uri="{FF2B5EF4-FFF2-40B4-BE49-F238E27FC236}">
+                <a16:creationId xmlns:a16="http://schemas.microsoft.com/office/drawing/2014/main" id="{A03D232E-FF76-8B83-3D2A-97E99924D5B4}"/>
+              </a:ext>
+            </a:extLst>
+          </p:cNvPr>
+          <p:cNvSpPr>
+            <a:spLocks noGrp="1"/>
+          </p:cNvSpPr>
+          <p:nvPr>
+            <p:ph idx="34"/>
+          </p:nvPr>
+        </p:nvSpPr>
+        <p:spPr>
+          <a:xfrm>
+            <a:off x="10868007" y="4602790"/>
+            <a:ext cx="640080" cy="365760"/>
+          </a:xfrm>
+        </p:spPr>
+        <p:txBody>
+          <a:bodyPr anchor="ctr">
+            <a:noAutofit/>
+          </a:bodyPr>
+          <a:lstStyle>
+            <a:lvl1pPr marL="0" indent="0" algn="ctr">
+              <a:spcBef>
+                <a:spcPts val="400"/>
+              </a:spcBef>
+              <a:buNone/>
+              <a:defRPr lang="de-DE" sz="1800" b="1" kern="1200" dirty="0">
+                <a:solidFill>
+                  <a:schemeClr val="bg1"/>
+                </a:solidFill>
+                <a:latin typeface="Segoe UI Light" panose="020B0502040204020203" pitchFamily="34" charset="0"/>
+                <a:ea typeface="+mn-ea"/>
                 <a:cs typeface="Segoe UI Light" panose="020B0502040204020203" pitchFamily="34" charset="0"/>
               </a:defRPr>
             </a:lvl1pPr>
@@ -1817,7 +4463,7 @@
           <a:p>
             <a:fld id="{506867F6-8C78-486A-93BF-FCE4C882B7D7}" type="datetimeFigureOut">
               <a:rPr lang="de-DE" smtClean="0"/>
-              <a:t>19.12.2023</a:t>
+              <a:t>01.02.2024</a:t>
             </a:fld>
             <a:endParaRPr lang="de-DE"/>
           </a:p>

</xml_diff>